<commit_message>
Updated with minor corrections
</commit_message>
<xml_diff>
--- a/Lessons/Lesson_V/Lesson_V_Questions.pptx
+++ b/Lessons/Lesson_V/Lesson_V_Questions.pptx
@@ -3,10 +3,14 @@
 <p:presentation xmlns:a="http://schemas.openxmlformats.org/drawingml/2006/main" xmlns:p="http://schemas.openxmlformats.org/presentationml/2006/main" xmlns:r="http://schemas.openxmlformats.org/officeDocument/2006/relationships">
   <p:sldMasterIdLst>
     <p:sldMasterId id="2147483648" r:id="rId2"/>
+    <p:sldMasterId id="2147483661" r:id="rId3"/>
   </p:sldMasterIdLst>
   <p:sldIdLst>
-    <p:sldId id="256" r:id="rId3"/>
-    <p:sldId id="257" r:id="rId4"/>
+    <p:sldId id="256" r:id="rId4"/>
+    <p:sldId id="257" r:id="rId5"/>
+    <p:sldId id="258" r:id="rId6"/>
+    <p:sldId id="259" r:id="rId7"/>
+    <p:sldId id="260" r:id="rId8"/>
   </p:sldIdLst>
   <p:sldSz cx="10080625" cy="7559675"/>
   <p:notesSz cx="7559675" cy="10691812"/>
@@ -54,7 +58,7 @@
       </p:grpSpPr>
       <p:sp>
         <p:nvSpPr>
-          <p:cNvPr id="26" name="PlaceHolder 1"/>
+          <p:cNvPr id="24" name="PlaceHolder 1"/>
           <p:cNvSpPr>
             <a:spLocks noGrp="1"/>
           </p:cNvSpPr>
@@ -65,7 +69,7 @@
         <p:spPr>
           <a:xfrm>
             <a:off x="504000" y="301320"/>
-            <a:ext cx="9071640" cy="1262160"/>
+            <a:ext cx="9071280" cy="1261800"/>
           </a:xfrm>
           <a:prstGeom prst="rect">
             <a:avLst/>
@@ -81,7 +85,7 @@
       </p:sp>
       <p:sp>
         <p:nvSpPr>
-          <p:cNvPr id="27" name="PlaceHolder 2"/>
+          <p:cNvPr id="25" name="PlaceHolder 2"/>
           <p:cNvSpPr>
             <a:spLocks noGrp="1"/>
           </p:cNvSpPr>
@@ -92,33 +96,33 @@
         <p:spPr>
           <a:xfrm>
             <a:off x="504000" y="1769040"/>
-            <a:ext cx="9071640" cy="2091240"/>
-          </a:xfrm>
-          <a:prstGeom prst="rect">
-            <a:avLst/>
-          </a:prstGeom>
-        </p:spPr>
-        <p:txBody>
-          <a:bodyPr lIns="0" rIns="0" tIns="0" bIns="0"/>
-          <a:p>
-            <a:endParaRPr/>
-          </a:p>
-        </p:txBody>
-      </p:sp>
-      <p:sp>
-        <p:nvSpPr>
-          <p:cNvPr id="28" name="PlaceHolder 3"/>
-          <p:cNvSpPr>
-            <a:spLocks noGrp="1"/>
-          </p:cNvSpPr>
-          <p:nvPr>
-            <p:ph type="body"/>
-          </p:nvPr>
-        </p:nvSpPr>
-        <p:spPr>
-          <a:xfrm>
-            <a:off x="504000" y="4059360"/>
-            <a:ext cx="9071640" cy="2091240"/>
+            <a:ext cx="9071280" cy="2090880"/>
+          </a:xfrm>
+          <a:prstGeom prst="rect">
+            <a:avLst/>
+          </a:prstGeom>
+        </p:spPr>
+        <p:txBody>
+          <a:bodyPr lIns="0" rIns="0" tIns="0" bIns="0"/>
+          <a:p>
+            <a:endParaRPr/>
+          </a:p>
+        </p:txBody>
+      </p:sp>
+      <p:sp>
+        <p:nvSpPr>
+          <p:cNvPr id="26" name="PlaceHolder 3"/>
+          <p:cNvSpPr>
+            <a:spLocks noGrp="1"/>
+          </p:cNvSpPr>
+          <p:nvPr>
+            <p:ph type="body"/>
+          </p:nvPr>
+        </p:nvSpPr>
+        <p:spPr>
+          <a:xfrm>
+            <a:off x="504000" y="4059000"/>
+            <a:ext cx="9071280" cy="2090880"/>
           </a:xfrm>
           <a:prstGeom prst="rect">
             <a:avLst/>
@@ -155,7 +159,7 @@
       </p:grpSpPr>
       <p:sp>
         <p:nvSpPr>
-          <p:cNvPr id="29" name="PlaceHolder 1"/>
+          <p:cNvPr id="27" name="PlaceHolder 1"/>
           <p:cNvSpPr>
             <a:spLocks noGrp="1"/>
           </p:cNvSpPr>
@@ -166,7 +170,7 @@
         <p:spPr>
           <a:xfrm>
             <a:off x="504000" y="301320"/>
-            <a:ext cx="9071640" cy="1262160"/>
+            <a:ext cx="9071280" cy="1261800"/>
           </a:xfrm>
           <a:prstGeom prst="rect">
             <a:avLst/>
@@ -182,7 +186,7 @@
       </p:sp>
       <p:sp>
         <p:nvSpPr>
-          <p:cNvPr id="30" name="PlaceHolder 2"/>
+          <p:cNvPr id="28" name="PlaceHolder 2"/>
           <p:cNvSpPr>
             <a:spLocks noGrp="1"/>
           </p:cNvSpPr>
@@ -193,85 +197,85 @@
         <p:spPr>
           <a:xfrm>
             <a:off x="504000" y="1769040"/>
-            <a:ext cx="4426920" cy="2091240"/>
-          </a:xfrm>
-          <a:prstGeom prst="rect">
-            <a:avLst/>
-          </a:prstGeom>
-        </p:spPr>
-        <p:txBody>
-          <a:bodyPr lIns="0" rIns="0" tIns="0" bIns="0"/>
-          <a:p>
-            <a:endParaRPr/>
-          </a:p>
-        </p:txBody>
-      </p:sp>
-      <p:sp>
-        <p:nvSpPr>
-          <p:cNvPr id="31" name="PlaceHolder 3"/>
-          <p:cNvSpPr>
-            <a:spLocks noGrp="1"/>
-          </p:cNvSpPr>
-          <p:nvPr>
-            <p:ph type="body"/>
-          </p:nvPr>
-        </p:nvSpPr>
-        <p:spPr>
-          <a:xfrm>
-            <a:off x="5152680" y="1769040"/>
-            <a:ext cx="4426920" cy="2091240"/>
-          </a:xfrm>
-          <a:prstGeom prst="rect">
-            <a:avLst/>
-          </a:prstGeom>
-        </p:spPr>
-        <p:txBody>
-          <a:bodyPr lIns="0" rIns="0" tIns="0" bIns="0"/>
-          <a:p>
-            <a:endParaRPr/>
-          </a:p>
-        </p:txBody>
-      </p:sp>
-      <p:sp>
-        <p:nvSpPr>
-          <p:cNvPr id="32" name="PlaceHolder 4"/>
-          <p:cNvSpPr>
-            <a:spLocks noGrp="1"/>
-          </p:cNvSpPr>
-          <p:nvPr>
-            <p:ph type="body"/>
-          </p:nvPr>
-        </p:nvSpPr>
-        <p:spPr>
-          <a:xfrm>
-            <a:off x="5152680" y="4059360"/>
-            <a:ext cx="4426920" cy="2091240"/>
-          </a:xfrm>
-          <a:prstGeom prst="rect">
-            <a:avLst/>
-          </a:prstGeom>
-        </p:spPr>
-        <p:txBody>
-          <a:bodyPr lIns="0" rIns="0" tIns="0" bIns="0"/>
-          <a:p>
-            <a:endParaRPr/>
-          </a:p>
-        </p:txBody>
-      </p:sp>
-      <p:sp>
-        <p:nvSpPr>
-          <p:cNvPr id="33" name="PlaceHolder 5"/>
-          <p:cNvSpPr>
-            <a:spLocks noGrp="1"/>
-          </p:cNvSpPr>
-          <p:nvPr>
-            <p:ph type="body"/>
-          </p:nvPr>
-        </p:nvSpPr>
-        <p:spPr>
-          <a:xfrm>
-            <a:off x="504000" y="4059360"/>
-            <a:ext cx="4426920" cy="2091240"/>
+            <a:ext cx="4426560" cy="2090880"/>
+          </a:xfrm>
+          <a:prstGeom prst="rect">
+            <a:avLst/>
+          </a:prstGeom>
+        </p:spPr>
+        <p:txBody>
+          <a:bodyPr lIns="0" rIns="0" tIns="0" bIns="0"/>
+          <a:p>
+            <a:endParaRPr/>
+          </a:p>
+        </p:txBody>
+      </p:sp>
+      <p:sp>
+        <p:nvSpPr>
+          <p:cNvPr id="29" name="PlaceHolder 3"/>
+          <p:cNvSpPr>
+            <a:spLocks noGrp="1"/>
+          </p:cNvSpPr>
+          <p:nvPr>
+            <p:ph type="body"/>
+          </p:nvPr>
+        </p:nvSpPr>
+        <p:spPr>
+          <a:xfrm>
+            <a:off x="5152320" y="1769040"/>
+            <a:ext cx="4426560" cy="2090880"/>
+          </a:xfrm>
+          <a:prstGeom prst="rect">
+            <a:avLst/>
+          </a:prstGeom>
+        </p:spPr>
+        <p:txBody>
+          <a:bodyPr lIns="0" rIns="0" tIns="0" bIns="0"/>
+          <a:p>
+            <a:endParaRPr/>
+          </a:p>
+        </p:txBody>
+      </p:sp>
+      <p:sp>
+        <p:nvSpPr>
+          <p:cNvPr id="30" name="PlaceHolder 4"/>
+          <p:cNvSpPr>
+            <a:spLocks noGrp="1"/>
+          </p:cNvSpPr>
+          <p:nvPr>
+            <p:ph type="body"/>
+          </p:nvPr>
+        </p:nvSpPr>
+        <p:spPr>
+          <a:xfrm>
+            <a:off x="5152320" y="4059000"/>
+            <a:ext cx="4426560" cy="2090880"/>
+          </a:xfrm>
+          <a:prstGeom prst="rect">
+            <a:avLst/>
+          </a:prstGeom>
+        </p:spPr>
+        <p:txBody>
+          <a:bodyPr lIns="0" rIns="0" tIns="0" bIns="0"/>
+          <a:p>
+            <a:endParaRPr/>
+          </a:p>
+        </p:txBody>
+      </p:sp>
+      <p:sp>
+        <p:nvSpPr>
+          <p:cNvPr id="31" name="PlaceHolder 5"/>
+          <p:cNvSpPr>
+            <a:spLocks noGrp="1"/>
+          </p:cNvSpPr>
+          <p:nvPr>
+            <p:ph type="body"/>
+          </p:nvPr>
+        </p:nvSpPr>
+        <p:spPr>
+          <a:xfrm>
+            <a:off x="504000" y="4059000"/>
+            <a:ext cx="4426560" cy="2090880"/>
           </a:xfrm>
           <a:prstGeom prst="rect">
             <a:avLst/>
@@ -308,7 +312,7 @@
       </p:grpSpPr>
       <p:sp>
         <p:nvSpPr>
-          <p:cNvPr id="34" name="PlaceHolder 1"/>
+          <p:cNvPr id="32" name="PlaceHolder 1"/>
           <p:cNvSpPr>
             <a:spLocks noGrp="1"/>
           </p:cNvSpPr>
@@ -319,7 +323,7 @@
         <p:spPr>
           <a:xfrm>
             <a:off x="504000" y="301320"/>
-            <a:ext cx="9071640" cy="1262160"/>
+            <a:ext cx="9071280" cy="1261800"/>
           </a:xfrm>
           <a:prstGeom prst="rect">
             <a:avLst/>
@@ -335,7 +339,7 @@
       </p:sp>
       <p:sp>
         <p:nvSpPr>
-          <p:cNvPr id="35" name="PlaceHolder 2"/>
+          <p:cNvPr id="33" name="PlaceHolder 2"/>
           <p:cNvSpPr>
             <a:spLocks noGrp="1"/>
           </p:cNvSpPr>
@@ -346,22 +350,22 @@
         <p:spPr>
           <a:xfrm>
             <a:off x="504000" y="1769040"/>
-            <a:ext cx="9071640" cy="4384440"/>
-          </a:xfrm>
-          <a:prstGeom prst="rect">
-            <a:avLst/>
-          </a:prstGeom>
-        </p:spPr>
-        <p:txBody>
-          <a:bodyPr lIns="0" rIns="0" tIns="0" bIns="0"/>
-          <a:p>
-            <a:endParaRPr/>
-          </a:p>
-        </p:txBody>
-      </p:sp>
-      <p:sp>
-        <p:nvSpPr>
-          <p:cNvPr id="36" name="PlaceHolder 3"/>
+            <a:ext cx="9071280" cy="4384080"/>
+          </a:xfrm>
+          <a:prstGeom prst="rect">
+            <a:avLst/>
+          </a:prstGeom>
+        </p:spPr>
+        <p:txBody>
+          <a:bodyPr lIns="0" rIns="0" tIns="0" bIns="0"/>
+          <a:p>
+            <a:endParaRPr/>
+          </a:p>
+        </p:txBody>
+      </p:sp>
+      <p:sp>
+        <p:nvSpPr>
+          <p:cNvPr id="34" name="PlaceHolder 3"/>
           <p:cNvSpPr>
             <a:spLocks noGrp="1"/>
           </p:cNvSpPr>
@@ -372,7 +376,7 @@
         <p:spPr>
           <a:xfrm>
             <a:off x="504000" y="1769040"/>
-            <a:ext cx="9071640" cy="4384440"/>
+            <a:ext cx="9071280" cy="4384080"/>
           </a:xfrm>
           <a:prstGeom prst="rect">
             <a:avLst/>
@@ -387,7 +391,7 @@
       </p:sp>
       <p:pic>
         <p:nvPicPr>
-          <p:cNvPr id="37" name="" descr=""/>
+          <p:cNvPr id="35" name="" descr=""/>
           <p:cNvPicPr/>
           <p:nvPr/>
         </p:nvPicPr>
@@ -397,8 +401,8 @@
         </p:blipFill>
         <p:spPr>
           <a:xfrm>
-            <a:off x="2291760" y="1768680"/>
-            <a:ext cx="5495400" cy="4384440"/>
+            <a:off x="2292120" y="1769040"/>
+            <a:ext cx="5494680" cy="4384080"/>
           </a:xfrm>
           <a:prstGeom prst="rect">
             <a:avLst/>
@@ -410,7 +414,7 @@
       </p:pic>
       <p:pic>
         <p:nvPicPr>
-          <p:cNvPr id="38" name="" descr=""/>
+          <p:cNvPr id="36" name="" descr=""/>
           <p:cNvPicPr/>
           <p:nvPr/>
         </p:nvPicPr>
@@ -420,8 +424,8 @@
         </p:blipFill>
         <p:spPr>
           <a:xfrm>
-            <a:off x="2291760" y="1768680"/>
-            <a:ext cx="5495400" cy="4384440"/>
+            <a:off x="2292120" y="1769040"/>
+            <a:ext cx="5494680" cy="4384080"/>
           </a:xfrm>
           <a:prstGeom prst="rect">
             <a:avLst/>
@@ -431,6 +435,505 @@
           </a:ln>
         </p:spPr>
       </p:pic>
+    </p:spTree>
+  </p:cSld>
+</p:sldLayout>
+</file>
+
+<file path=ppt/slideLayouts/slideLayout13.xml><?xml version="1.0" encoding="utf-8"?>
+<p:sldLayout xmlns:a="http://schemas.openxmlformats.org/drawingml/2006/main" xmlns:p="http://schemas.openxmlformats.org/presentationml/2006/main" xmlns:r="http://schemas.openxmlformats.org/officeDocument/2006/relationships" type="blank" preserve="1">
+  <p:cSld name="Blank Slide">
+    <p:spTree>
+      <p:nvGrpSpPr>
+        <p:cNvPr id="1" name=""/>
+        <p:cNvGrpSpPr/>
+        <p:nvPr/>
+      </p:nvGrpSpPr>
+      <p:grpSpPr>
+        <a:xfrm>
+          <a:off x="0" y="0"/>
+          <a:ext cx="0" cy="0"/>
+          <a:chOff x="0" y="0"/>
+          <a:chExt cx="0" cy="0"/>
+        </a:xfrm>
+      </p:grpSpPr>
+    </p:spTree>
+  </p:cSld>
+</p:sldLayout>
+</file>
+
+<file path=ppt/slideLayouts/slideLayout14.xml><?xml version="1.0" encoding="utf-8"?>
+<p:sldLayout xmlns:a="http://schemas.openxmlformats.org/drawingml/2006/main" xmlns:p="http://schemas.openxmlformats.org/presentationml/2006/main" xmlns:r="http://schemas.openxmlformats.org/officeDocument/2006/relationships" type="tx" preserve="1">
+  <p:cSld name="Title Slide">
+    <p:spTree>
+      <p:nvGrpSpPr>
+        <p:cNvPr id="1" name=""/>
+        <p:cNvGrpSpPr/>
+        <p:nvPr/>
+      </p:nvGrpSpPr>
+      <p:grpSpPr>
+        <a:xfrm>
+          <a:off x="0" y="0"/>
+          <a:ext cx="0" cy="0"/>
+          <a:chOff x="0" y="0"/>
+          <a:chExt cx="0" cy="0"/>
+        </a:xfrm>
+      </p:grpSpPr>
+      <p:sp>
+        <p:nvSpPr>
+          <p:cNvPr id="39" name="PlaceHolder 1"/>
+          <p:cNvSpPr>
+            <a:spLocks noGrp="1"/>
+          </p:cNvSpPr>
+          <p:nvPr>
+            <p:ph type="title"/>
+          </p:nvPr>
+        </p:nvSpPr>
+        <p:spPr>
+          <a:xfrm>
+            <a:off x="504000" y="301320"/>
+            <a:ext cx="9071280" cy="1261800"/>
+          </a:xfrm>
+          <a:prstGeom prst="rect">
+            <a:avLst/>
+          </a:prstGeom>
+        </p:spPr>
+        <p:txBody>
+          <a:bodyPr lIns="0" rIns="0" tIns="0" bIns="0" anchor="ctr"/>
+          <a:p>
+            <a:pPr algn="ctr"/>
+            <a:endParaRPr/>
+          </a:p>
+        </p:txBody>
+      </p:sp>
+      <p:sp>
+        <p:nvSpPr>
+          <p:cNvPr id="40" name="PlaceHolder 2"/>
+          <p:cNvSpPr>
+            <a:spLocks noGrp="1"/>
+          </p:cNvSpPr>
+          <p:nvPr>
+            <p:ph type="subTitle"/>
+          </p:nvPr>
+        </p:nvSpPr>
+        <p:spPr>
+          <a:xfrm>
+            <a:off x="504000" y="1769040"/>
+            <a:ext cx="9071280" cy="4384080"/>
+          </a:xfrm>
+          <a:prstGeom prst="rect">
+            <a:avLst/>
+          </a:prstGeom>
+        </p:spPr>
+        <p:txBody>
+          <a:bodyPr lIns="0" rIns="0" tIns="0" bIns="0" anchor="ctr"/>
+          <a:p>
+            <a:pPr algn="ctr"/>
+            <a:endParaRPr/>
+          </a:p>
+        </p:txBody>
+      </p:sp>
+    </p:spTree>
+  </p:cSld>
+</p:sldLayout>
+</file>
+
+<file path=ppt/slideLayouts/slideLayout15.xml><?xml version="1.0" encoding="utf-8"?>
+<p:sldLayout xmlns:a="http://schemas.openxmlformats.org/drawingml/2006/main" xmlns:p="http://schemas.openxmlformats.org/presentationml/2006/main" xmlns:r="http://schemas.openxmlformats.org/officeDocument/2006/relationships" type="obj" preserve="1">
+  <p:cSld name="Title, Content">
+    <p:spTree>
+      <p:nvGrpSpPr>
+        <p:cNvPr id="1" name=""/>
+        <p:cNvGrpSpPr/>
+        <p:nvPr/>
+      </p:nvGrpSpPr>
+      <p:grpSpPr>
+        <a:xfrm>
+          <a:off x="0" y="0"/>
+          <a:ext cx="0" cy="0"/>
+          <a:chOff x="0" y="0"/>
+          <a:chExt cx="0" cy="0"/>
+        </a:xfrm>
+      </p:grpSpPr>
+      <p:sp>
+        <p:nvSpPr>
+          <p:cNvPr id="41" name="PlaceHolder 1"/>
+          <p:cNvSpPr>
+            <a:spLocks noGrp="1"/>
+          </p:cNvSpPr>
+          <p:nvPr>
+            <p:ph type="title"/>
+          </p:nvPr>
+        </p:nvSpPr>
+        <p:spPr>
+          <a:xfrm>
+            <a:off x="504000" y="301320"/>
+            <a:ext cx="9071280" cy="1261800"/>
+          </a:xfrm>
+          <a:prstGeom prst="rect">
+            <a:avLst/>
+          </a:prstGeom>
+        </p:spPr>
+        <p:txBody>
+          <a:bodyPr lIns="0" rIns="0" tIns="0" bIns="0" anchor="ctr"/>
+          <a:p>
+            <a:pPr algn="ctr"/>
+            <a:endParaRPr/>
+          </a:p>
+        </p:txBody>
+      </p:sp>
+      <p:sp>
+        <p:nvSpPr>
+          <p:cNvPr id="42" name="PlaceHolder 2"/>
+          <p:cNvSpPr>
+            <a:spLocks noGrp="1"/>
+          </p:cNvSpPr>
+          <p:nvPr>
+            <p:ph type="body"/>
+          </p:nvPr>
+        </p:nvSpPr>
+        <p:spPr>
+          <a:xfrm>
+            <a:off x="504000" y="1769040"/>
+            <a:ext cx="9071280" cy="4384080"/>
+          </a:xfrm>
+          <a:prstGeom prst="rect">
+            <a:avLst/>
+          </a:prstGeom>
+        </p:spPr>
+        <p:txBody>
+          <a:bodyPr lIns="0" rIns="0" tIns="0" bIns="0"/>
+          <a:p>
+            <a:endParaRPr/>
+          </a:p>
+        </p:txBody>
+      </p:sp>
+    </p:spTree>
+  </p:cSld>
+</p:sldLayout>
+</file>
+
+<file path=ppt/slideLayouts/slideLayout16.xml><?xml version="1.0" encoding="utf-8"?>
+<p:sldLayout xmlns:a="http://schemas.openxmlformats.org/drawingml/2006/main" xmlns:p="http://schemas.openxmlformats.org/presentationml/2006/main" xmlns:r="http://schemas.openxmlformats.org/officeDocument/2006/relationships" type="twoObj" preserve="1">
+  <p:cSld name="Title, 2 Content">
+    <p:spTree>
+      <p:nvGrpSpPr>
+        <p:cNvPr id="1" name=""/>
+        <p:cNvGrpSpPr/>
+        <p:nvPr/>
+      </p:nvGrpSpPr>
+      <p:grpSpPr>
+        <a:xfrm>
+          <a:off x="0" y="0"/>
+          <a:ext cx="0" cy="0"/>
+          <a:chOff x="0" y="0"/>
+          <a:chExt cx="0" cy="0"/>
+        </a:xfrm>
+      </p:grpSpPr>
+      <p:sp>
+        <p:nvSpPr>
+          <p:cNvPr id="43" name="PlaceHolder 1"/>
+          <p:cNvSpPr>
+            <a:spLocks noGrp="1"/>
+          </p:cNvSpPr>
+          <p:nvPr>
+            <p:ph type="title"/>
+          </p:nvPr>
+        </p:nvSpPr>
+        <p:spPr>
+          <a:xfrm>
+            <a:off x="504000" y="301320"/>
+            <a:ext cx="9071280" cy="1261800"/>
+          </a:xfrm>
+          <a:prstGeom prst="rect">
+            <a:avLst/>
+          </a:prstGeom>
+        </p:spPr>
+        <p:txBody>
+          <a:bodyPr lIns="0" rIns="0" tIns="0" bIns="0" anchor="ctr"/>
+          <a:p>
+            <a:pPr algn="ctr"/>
+            <a:endParaRPr/>
+          </a:p>
+        </p:txBody>
+      </p:sp>
+      <p:sp>
+        <p:nvSpPr>
+          <p:cNvPr id="44" name="PlaceHolder 2"/>
+          <p:cNvSpPr>
+            <a:spLocks noGrp="1"/>
+          </p:cNvSpPr>
+          <p:nvPr>
+            <p:ph type="body"/>
+          </p:nvPr>
+        </p:nvSpPr>
+        <p:spPr>
+          <a:xfrm>
+            <a:off x="504000" y="1769040"/>
+            <a:ext cx="4426560" cy="4384080"/>
+          </a:xfrm>
+          <a:prstGeom prst="rect">
+            <a:avLst/>
+          </a:prstGeom>
+        </p:spPr>
+        <p:txBody>
+          <a:bodyPr lIns="0" rIns="0" tIns="0" bIns="0"/>
+          <a:p>
+            <a:endParaRPr/>
+          </a:p>
+        </p:txBody>
+      </p:sp>
+      <p:sp>
+        <p:nvSpPr>
+          <p:cNvPr id="45" name="PlaceHolder 3"/>
+          <p:cNvSpPr>
+            <a:spLocks noGrp="1"/>
+          </p:cNvSpPr>
+          <p:nvPr>
+            <p:ph type="body"/>
+          </p:nvPr>
+        </p:nvSpPr>
+        <p:spPr>
+          <a:xfrm>
+            <a:off x="5152320" y="1769040"/>
+            <a:ext cx="4426560" cy="4384080"/>
+          </a:xfrm>
+          <a:prstGeom prst="rect">
+            <a:avLst/>
+          </a:prstGeom>
+        </p:spPr>
+        <p:txBody>
+          <a:bodyPr lIns="0" rIns="0" tIns="0" bIns="0"/>
+          <a:p>
+            <a:endParaRPr/>
+          </a:p>
+        </p:txBody>
+      </p:sp>
+    </p:spTree>
+  </p:cSld>
+</p:sldLayout>
+</file>
+
+<file path=ppt/slideLayouts/slideLayout17.xml><?xml version="1.0" encoding="utf-8"?>
+<p:sldLayout xmlns:a="http://schemas.openxmlformats.org/drawingml/2006/main" xmlns:p="http://schemas.openxmlformats.org/presentationml/2006/main" xmlns:r="http://schemas.openxmlformats.org/officeDocument/2006/relationships" type="titleOnly" preserve="1">
+  <p:cSld name="Title Only">
+    <p:spTree>
+      <p:nvGrpSpPr>
+        <p:cNvPr id="1" name=""/>
+        <p:cNvGrpSpPr/>
+        <p:nvPr/>
+      </p:nvGrpSpPr>
+      <p:grpSpPr>
+        <a:xfrm>
+          <a:off x="0" y="0"/>
+          <a:ext cx="0" cy="0"/>
+          <a:chOff x="0" y="0"/>
+          <a:chExt cx="0" cy="0"/>
+        </a:xfrm>
+      </p:grpSpPr>
+      <p:sp>
+        <p:nvSpPr>
+          <p:cNvPr id="46" name="PlaceHolder 1"/>
+          <p:cNvSpPr>
+            <a:spLocks noGrp="1"/>
+          </p:cNvSpPr>
+          <p:nvPr>
+            <p:ph type="title"/>
+          </p:nvPr>
+        </p:nvSpPr>
+        <p:spPr>
+          <a:xfrm>
+            <a:off x="504000" y="301320"/>
+            <a:ext cx="9071280" cy="1261800"/>
+          </a:xfrm>
+          <a:prstGeom prst="rect">
+            <a:avLst/>
+          </a:prstGeom>
+        </p:spPr>
+        <p:txBody>
+          <a:bodyPr lIns="0" rIns="0" tIns="0" bIns="0" anchor="ctr"/>
+          <a:p>
+            <a:pPr algn="ctr"/>
+            <a:endParaRPr/>
+          </a:p>
+        </p:txBody>
+      </p:sp>
+    </p:spTree>
+  </p:cSld>
+</p:sldLayout>
+</file>
+
+<file path=ppt/slideLayouts/slideLayout18.xml><?xml version="1.0" encoding="utf-8"?>
+<p:sldLayout xmlns:a="http://schemas.openxmlformats.org/drawingml/2006/main" xmlns:p="http://schemas.openxmlformats.org/presentationml/2006/main" xmlns:r="http://schemas.openxmlformats.org/officeDocument/2006/relationships" type="objOnly" preserve="1">
+  <p:cSld name="Centered Text">
+    <p:spTree>
+      <p:nvGrpSpPr>
+        <p:cNvPr id="1" name=""/>
+        <p:cNvGrpSpPr/>
+        <p:nvPr/>
+      </p:nvGrpSpPr>
+      <p:grpSpPr>
+        <a:xfrm>
+          <a:off x="0" y="0"/>
+          <a:ext cx="0" cy="0"/>
+          <a:chOff x="0" y="0"/>
+          <a:chExt cx="0" cy="0"/>
+        </a:xfrm>
+      </p:grpSpPr>
+      <p:sp>
+        <p:nvSpPr>
+          <p:cNvPr id="47" name="PlaceHolder 1"/>
+          <p:cNvSpPr>
+            <a:spLocks noGrp="1"/>
+          </p:cNvSpPr>
+          <p:nvPr>
+            <p:ph type="subTitle"/>
+          </p:nvPr>
+        </p:nvSpPr>
+        <p:spPr>
+          <a:xfrm>
+            <a:off x="504000" y="301320"/>
+            <a:ext cx="9071280" cy="5850360"/>
+          </a:xfrm>
+          <a:prstGeom prst="rect">
+            <a:avLst/>
+          </a:prstGeom>
+        </p:spPr>
+        <p:txBody>
+          <a:bodyPr lIns="0" rIns="0" tIns="0" bIns="0" anchor="ctr"/>
+          <a:p>
+            <a:pPr algn="ctr"/>
+            <a:endParaRPr/>
+          </a:p>
+        </p:txBody>
+      </p:sp>
+    </p:spTree>
+  </p:cSld>
+</p:sldLayout>
+</file>
+
+<file path=ppt/slideLayouts/slideLayout19.xml><?xml version="1.0" encoding="utf-8"?>
+<p:sldLayout xmlns:a="http://schemas.openxmlformats.org/drawingml/2006/main" xmlns:p="http://schemas.openxmlformats.org/presentationml/2006/main" xmlns:r="http://schemas.openxmlformats.org/officeDocument/2006/relationships" type="twoObjAndObj" preserve="1">
+  <p:cSld name="Title, 2 Content and Content">
+    <p:spTree>
+      <p:nvGrpSpPr>
+        <p:cNvPr id="1" name=""/>
+        <p:cNvGrpSpPr/>
+        <p:nvPr/>
+      </p:nvGrpSpPr>
+      <p:grpSpPr>
+        <a:xfrm>
+          <a:off x="0" y="0"/>
+          <a:ext cx="0" cy="0"/>
+          <a:chOff x="0" y="0"/>
+          <a:chExt cx="0" cy="0"/>
+        </a:xfrm>
+      </p:grpSpPr>
+      <p:sp>
+        <p:nvSpPr>
+          <p:cNvPr id="48" name="PlaceHolder 1"/>
+          <p:cNvSpPr>
+            <a:spLocks noGrp="1"/>
+          </p:cNvSpPr>
+          <p:nvPr>
+            <p:ph type="title"/>
+          </p:nvPr>
+        </p:nvSpPr>
+        <p:spPr>
+          <a:xfrm>
+            <a:off x="504000" y="301320"/>
+            <a:ext cx="9071280" cy="1261800"/>
+          </a:xfrm>
+          <a:prstGeom prst="rect">
+            <a:avLst/>
+          </a:prstGeom>
+        </p:spPr>
+        <p:txBody>
+          <a:bodyPr lIns="0" rIns="0" tIns="0" bIns="0" anchor="ctr"/>
+          <a:p>
+            <a:pPr algn="ctr"/>
+            <a:endParaRPr/>
+          </a:p>
+        </p:txBody>
+      </p:sp>
+      <p:sp>
+        <p:nvSpPr>
+          <p:cNvPr id="49" name="PlaceHolder 2"/>
+          <p:cNvSpPr>
+            <a:spLocks noGrp="1"/>
+          </p:cNvSpPr>
+          <p:nvPr>
+            <p:ph type="body"/>
+          </p:nvPr>
+        </p:nvSpPr>
+        <p:spPr>
+          <a:xfrm>
+            <a:off x="504000" y="1769040"/>
+            <a:ext cx="4426560" cy="2090880"/>
+          </a:xfrm>
+          <a:prstGeom prst="rect">
+            <a:avLst/>
+          </a:prstGeom>
+        </p:spPr>
+        <p:txBody>
+          <a:bodyPr lIns="0" rIns="0" tIns="0" bIns="0"/>
+          <a:p>
+            <a:endParaRPr/>
+          </a:p>
+        </p:txBody>
+      </p:sp>
+      <p:sp>
+        <p:nvSpPr>
+          <p:cNvPr id="50" name="PlaceHolder 3"/>
+          <p:cNvSpPr>
+            <a:spLocks noGrp="1"/>
+          </p:cNvSpPr>
+          <p:nvPr>
+            <p:ph type="body"/>
+          </p:nvPr>
+        </p:nvSpPr>
+        <p:spPr>
+          <a:xfrm>
+            <a:off x="504000" y="4059000"/>
+            <a:ext cx="4426560" cy="2090880"/>
+          </a:xfrm>
+          <a:prstGeom prst="rect">
+            <a:avLst/>
+          </a:prstGeom>
+        </p:spPr>
+        <p:txBody>
+          <a:bodyPr lIns="0" rIns="0" tIns="0" bIns="0"/>
+          <a:p>
+            <a:endParaRPr/>
+          </a:p>
+        </p:txBody>
+      </p:sp>
+      <p:sp>
+        <p:nvSpPr>
+          <p:cNvPr id="51" name="PlaceHolder 4"/>
+          <p:cNvSpPr>
+            <a:spLocks noGrp="1"/>
+          </p:cNvSpPr>
+          <p:nvPr>
+            <p:ph type="body"/>
+          </p:nvPr>
+        </p:nvSpPr>
+        <p:spPr>
+          <a:xfrm>
+            <a:off x="5152320" y="1769040"/>
+            <a:ext cx="4426560" cy="4384080"/>
+          </a:xfrm>
+          <a:prstGeom prst="rect">
+            <a:avLst/>
+          </a:prstGeom>
+        </p:spPr>
+        <p:txBody>
+          <a:bodyPr lIns="0" rIns="0" tIns="0" bIns="0"/>
+          <a:p>
+            <a:endParaRPr/>
+          </a:p>
+        </p:txBody>
+      </p:sp>
     </p:spTree>
   </p:cSld>
 </p:sldLayout>
@@ -455,7 +958,7 @@
       </p:grpSpPr>
       <p:sp>
         <p:nvSpPr>
-          <p:cNvPr id="5" name="PlaceHolder 1"/>
+          <p:cNvPr id="3" name="PlaceHolder 1"/>
           <p:cNvSpPr>
             <a:spLocks noGrp="1"/>
           </p:cNvSpPr>
@@ -466,7 +969,7 @@
         <p:spPr>
           <a:xfrm>
             <a:off x="504000" y="301320"/>
-            <a:ext cx="9071640" cy="1262160"/>
+            <a:ext cx="9071280" cy="1261800"/>
           </a:xfrm>
           <a:prstGeom prst="rect">
             <a:avLst/>
@@ -482,7 +985,7 @@
       </p:sp>
       <p:sp>
         <p:nvSpPr>
-          <p:cNvPr id="6" name="PlaceHolder 2"/>
+          <p:cNvPr id="4" name="PlaceHolder 2"/>
           <p:cNvSpPr>
             <a:spLocks noGrp="1"/>
           </p:cNvSpPr>
@@ -493,7 +996,7 @@
         <p:spPr>
           <a:xfrm>
             <a:off x="504000" y="1769040"/>
-            <a:ext cx="9071640" cy="4384440"/>
+            <a:ext cx="9071280" cy="4384080"/>
           </a:xfrm>
           <a:prstGeom prst="rect">
             <a:avLst/>
@@ -507,6 +1010,661 @@
           </a:p>
         </p:txBody>
       </p:sp>
+    </p:spTree>
+  </p:cSld>
+</p:sldLayout>
+</file>
+
+<file path=ppt/slideLayouts/slideLayout20.xml><?xml version="1.0" encoding="utf-8"?>
+<p:sldLayout xmlns:a="http://schemas.openxmlformats.org/drawingml/2006/main" xmlns:p="http://schemas.openxmlformats.org/presentationml/2006/main" xmlns:r="http://schemas.openxmlformats.org/officeDocument/2006/relationships" type="objAndTwoObj" preserve="1">
+  <p:cSld name="Title Content and 2 Content">
+    <p:spTree>
+      <p:nvGrpSpPr>
+        <p:cNvPr id="1" name=""/>
+        <p:cNvGrpSpPr/>
+        <p:nvPr/>
+      </p:nvGrpSpPr>
+      <p:grpSpPr>
+        <a:xfrm>
+          <a:off x="0" y="0"/>
+          <a:ext cx="0" cy="0"/>
+          <a:chOff x="0" y="0"/>
+          <a:chExt cx="0" cy="0"/>
+        </a:xfrm>
+      </p:grpSpPr>
+      <p:sp>
+        <p:nvSpPr>
+          <p:cNvPr id="52" name="PlaceHolder 1"/>
+          <p:cNvSpPr>
+            <a:spLocks noGrp="1"/>
+          </p:cNvSpPr>
+          <p:nvPr>
+            <p:ph type="title"/>
+          </p:nvPr>
+        </p:nvSpPr>
+        <p:spPr>
+          <a:xfrm>
+            <a:off x="504000" y="301320"/>
+            <a:ext cx="9071280" cy="1261800"/>
+          </a:xfrm>
+          <a:prstGeom prst="rect">
+            <a:avLst/>
+          </a:prstGeom>
+        </p:spPr>
+        <p:txBody>
+          <a:bodyPr lIns="0" rIns="0" tIns="0" bIns="0" anchor="ctr"/>
+          <a:p>
+            <a:pPr algn="ctr"/>
+            <a:endParaRPr/>
+          </a:p>
+        </p:txBody>
+      </p:sp>
+      <p:sp>
+        <p:nvSpPr>
+          <p:cNvPr id="53" name="PlaceHolder 2"/>
+          <p:cNvSpPr>
+            <a:spLocks noGrp="1"/>
+          </p:cNvSpPr>
+          <p:nvPr>
+            <p:ph type="body"/>
+          </p:nvPr>
+        </p:nvSpPr>
+        <p:spPr>
+          <a:xfrm>
+            <a:off x="504000" y="1769040"/>
+            <a:ext cx="4426560" cy="4384080"/>
+          </a:xfrm>
+          <a:prstGeom prst="rect">
+            <a:avLst/>
+          </a:prstGeom>
+        </p:spPr>
+        <p:txBody>
+          <a:bodyPr lIns="0" rIns="0" tIns="0" bIns="0"/>
+          <a:p>
+            <a:endParaRPr/>
+          </a:p>
+        </p:txBody>
+      </p:sp>
+      <p:sp>
+        <p:nvSpPr>
+          <p:cNvPr id="54" name="PlaceHolder 3"/>
+          <p:cNvSpPr>
+            <a:spLocks noGrp="1"/>
+          </p:cNvSpPr>
+          <p:nvPr>
+            <p:ph type="body"/>
+          </p:nvPr>
+        </p:nvSpPr>
+        <p:spPr>
+          <a:xfrm>
+            <a:off x="5152320" y="1769040"/>
+            <a:ext cx="4426560" cy="2090880"/>
+          </a:xfrm>
+          <a:prstGeom prst="rect">
+            <a:avLst/>
+          </a:prstGeom>
+        </p:spPr>
+        <p:txBody>
+          <a:bodyPr lIns="0" rIns="0" tIns="0" bIns="0"/>
+          <a:p>
+            <a:endParaRPr/>
+          </a:p>
+        </p:txBody>
+      </p:sp>
+      <p:sp>
+        <p:nvSpPr>
+          <p:cNvPr id="55" name="PlaceHolder 4"/>
+          <p:cNvSpPr>
+            <a:spLocks noGrp="1"/>
+          </p:cNvSpPr>
+          <p:nvPr>
+            <p:ph type="body"/>
+          </p:nvPr>
+        </p:nvSpPr>
+        <p:spPr>
+          <a:xfrm>
+            <a:off x="5152320" y="4059000"/>
+            <a:ext cx="4426560" cy="2090880"/>
+          </a:xfrm>
+          <a:prstGeom prst="rect">
+            <a:avLst/>
+          </a:prstGeom>
+        </p:spPr>
+        <p:txBody>
+          <a:bodyPr lIns="0" rIns="0" tIns="0" bIns="0"/>
+          <a:p>
+            <a:endParaRPr/>
+          </a:p>
+        </p:txBody>
+      </p:sp>
+    </p:spTree>
+  </p:cSld>
+</p:sldLayout>
+</file>
+
+<file path=ppt/slideLayouts/slideLayout21.xml><?xml version="1.0" encoding="utf-8"?>
+<p:sldLayout xmlns:a="http://schemas.openxmlformats.org/drawingml/2006/main" xmlns:p="http://schemas.openxmlformats.org/presentationml/2006/main" xmlns:r="http://schemas.openxmlformats.org/officeDocument/2006/relationships" type="twoObjOverTx" preserve="1">
+  <p:cSld name="Title, 2 Content over Content">
+    <p:spTree>
+      <p:nvGrpSpPr>
+        <p:cNvPr id="1" name=""/>
+        <p:cNvGrpSpPr/>
+        <p:nvPr/>
+      </p:nvGrpSpPr>
+      <p:grpSpPr>
+        <a:xfrm>
+          <a:off x="0" y="0"/>
+          <a:ext cx="0" cy="0"/>
+          <a:chOff x="0" y="0"/>
+          <a:chExt cx="0" cy="0"/>
+        </a:xfrm>
+      </p:grpSpPr>
+      <p:sp>
+        <p:nvSpPr>
+          <p:cNvPr id="56" name="PlaceHolder 1"/>
+          <p:cNvSpPr>
+            <a:spLocks noGrp="1"/>
+          </p:cNvSpPr>
+          <p:nvPr>
+            <p:ph type="title"/>
+          </p:nvPr>
+        </p:nvSpPr>
+        <p:spPr>
+          <a:xfrm>
+            <a:off x="504000" y="301320"/>
+            <a:ext cx="9071280" cy="1261800"/>
+          </a:xfrm>
+          <a:prstGeom prst="rect">
+            <a:avLst/>
+          </a:prstGeom>
+        </p:spPr>
+        <p:txBody>
+          <a:bodyPr lIns="0" rIns="0" tIns="0" bIns="0" anchor="ctr"/>
+          <a:p>
+            <a:pPr algn="ctr"/>
+            <a:endParaRPr/>
+          </a:p>
+        </p:txBody>
+      </p:sp>
+      <p:sp>
+        <p:nvSpPr>
+          <p:cNvPr id="57" name="PlaceHolder 2"/>
+          <p:cNvSpPr>
+            <a:spLocks noGrp="1"/>
+          </p:cNvSpPr>
+          <p:nvPr>
+            <p:ph type="body"/>
+          </p:nvPr>
+        </p:nvSpPr>
+        <p:spPr>
+          <a:xfrm>
+            <a:off x="504000" y="1769040"/>
+            <a:ext cx="4426560" cy="2090880"/>
+          </a:xfrm>
+          <a:prstGeom prst="rect">
+            <a:avLst/>
+          </a:prstGeom>
+        </p:spPr>
+        <p:txBody>
+          <a:bodyPr lIns="0" rIns="0" tIns="0" bIns="0"/>
+          <a:p>
+            <a:endParaRPr/>
+          </a:p>
+        </p:txBody>
+      </p:sp>
+      <p:sp>
+        <p:nvSpPr>
+          <p:cNvPr id="58" name="PlaceHolder 3"/>
+          <p:cNvSpPr>
+            <a:spLocks noGrp="1"/>
+          </p:cNvSpPr>
+          <p:nvPr>
+            <p:ph type="body"/>
+          </p:nvPr>
+        </p:nvSpPr>
+        <p:spPr>
+          <a:xfrm>
+            <a:off x="5152320" y="1769040"/>
+            <a:ext cx="4426560" cy="2090880"/>
+          </a:xfrm>
+          <a:prstGeom prst="rect">
+            <a:avLst/>
+          </a:prstGeom>
+        </p:spPr>
+        <p:txBody>
+          <a:bodyPr lIns="0" rIns="0" tIns="0" bIns="0"/>
+          <a:p>
+            <a:endParaRPr/>
+          </a:p>
+        </p:txBody>
+      </p:sp>
+      <p:sp>
+        <p:nvSpPr>
+          <p:cNvPr id="59" name="PlaceHolder 4"/>
+          <p:cNvSpPr>
+            <a:spLocks noGrp="1"/>
+          </p:cNvSpPr>
+          <p:nvPr>
+            <p:ph type="body"/>
+          </p:nvPr>
+        </p:nvSpPr>
+        <p:spPr>
+          <a:xfrm>
+            <a:off x="504000" y="4059000"/>
+            <a:ext cx="9071280" cy="2090880"/>
+          </a:xfrm>
+          <a:prstGeom prst="rect">
+            <a:avLst/>
+          </a:prstGeom>
+        </p:spPr>
+        <p:txBody>
+          <a:bodyPr lIns="0" rIns="0" tIns="0" bIns="0"/>
+          <a:p>
+            <a:endParaRPr/>
+          </a:p>
+        </p:txBody>
+      </p:sp>
+    </p:spTree>
+  </p:cSld>
+</p:sldLayout>
+</file>
+
+<file path=ppt/slideLayouts/slideLayout22.xml><?xml version="1.0" encoding="utf-8"?>
+<p:sldLayout xmlns:a="http://schemas.openxmlformats.org/drawingml/2006/main" xmlns:p="http://schemas.openxmlformats.org/presentationml/2006/main" xmlns:r="http://schemas.openxmlformats.org/officeDocument/2006/relationships" type="objOverTx" preserve="1">
+  <p:cSld name="Title, Content over Content">
+    <p:spTree>
+      <p:nvGrpSpPr>
+        <p:cNvPr id="1" name=""/>
+        <p:cNvGrpSpPr/>
+        <p:nvPr/>
+      </p:nvGrpSpPr>
+      <p:grpSpPr>
+        <a:xfrm>
+          <a:off x="0" y="0"/>
+          <a:ext cx="0" cy="0"/>
+          <a:chOff x="0" y="0"/>
+          <a:chExt cx="0" cy="0"/>
+        </a:xfrm>
+      </p:grpSpPr>
+      <p:sp>
+        <p:nvSpPr>
+          <p:cNvPr id="60" name="PlaceHolder 1"/>
+          <p:cNvSpPr>
+            <a:spLocks noGrp="1"/>
+          </p:cNvSpPr>
+          <p:nvPr>
+            <p:ph type="title"/>
+          </p:nvPr>
+        </p:nvSpPr>
+        <p:spPr>
+          <a:xfrm>
+            <a:off x="504000" y="301320"/>
+            <a:ext cx="9071280" cy="1261800"/>
+          </a:xfrm>
+          <a:prstGeom prst="rect">
+            <a:avLst/>
+          </a:prstGeom>
+        </p:spPr>
+        <p:txBody>
+          <a:bodyPr lIns="0" rIns="0" tIns="0" bIns="0" anchor="ctr"/>
+          <a:p>
+            <a:pPr algn="ctr"/>
+            <a:endParaRPr/>
+          </a:p>
+        </p:txBody>
+      </p:sp>
+      <p:sp>
+        <p:nvSpPr>
+          <p:cNvPr id="61" name="PlaceHolder 2"/>
+          <p:cNvSpPr>
+            <a:spLocks noGrp="1"/>
+          </p:cNvSpPr>
+          <p:nvPr>
+            <p:ph type="body"/>
+          </p:nvPr>
+        </p:nvSpPr>
+        <p:spPr>
+          <a:xfrm>
+            <a:off x="504000" y="1769040"/>
+            <a:ext cx="9071280" cy="2090880"/>
+          </a:xfrm>
+          <a:prstGeom prst="rect">
+            <a:avLst/>
+          </a:prstGeom>
+        </p:spPr>
+        <p:txBody>
+          <a:bodyPr lIns="0" rIns="0" tIns="0" bIns="0"/>
+          <a:p>
+            <a:endParaRPr/>
+          </a:p>
+        </p:txBody>
+      </p:sp>
+      <p:sp>
+        <p:nvSpPr>
+          <p:cNvPr id="62" name="PlaceHolder 3"/>
+          <p:cNvSpPr>
+            <a:spLocks noGrp="1"/>
+          </p:cNvSpPr>
+          <p:nvPr>
+            <p:ph type="body"/>
+          </p:nvPr>
+        </p:nvSpPr>
+        <p:spPr>
+          <a:xfrm>
+            <a:off x="504000" y="4059000"/>
+            <a:ext cx="9071280" cy="2090880"/>
+          </a:xfrm>
+          <a:prstGeom prst="rect">
+            <a:avLst/>
+          </a:prstGeom>
+        </p:spPr>
+        <p:txBody>
+          <a:bodyPr lIns="0" rIns="0" tIns="0" bIns="0"/>
+          <a:p>
+            <a:endParaRPr/>
+          </a:p>
+        </p:txBody>
+      </p:sp>
+    </p:spTree>
+  </p:cSld>
+</p:sldLayout>
+</file>
+
+<file path=ppt/slideLayouts/slideLayout23.xml><?xml version="1.0" encoding="utf-8"?>
+<p:sldLayout xmlns:a="http://schemas.openxmlformats.org/drawingml/2006/main" xmlns:p="http://schemas.openxmlformats.org/presentationml/2006/main" xmlns:r="http://schemas.openxmlformats.org/officeDocument/2006/relationships" type="fourObj" preserve="1">
+  <p:cSld name="Title, 4 Content">
+    <p:spTree>
+      <p:nvGrpSpPr>
+        <p:cNvPr id="1" name=""/>
+        <p:cNvGrpSpPr/>
+        <p:nvPr/>
+      </p:nvGrpSpPr>
+      <p:grpSpPr>
+        <a:xfrm>
+          <a:off x="0" y="0"/>
+          <a:ext cx="0" cy="0"/>
+          <a:chOff x="0" y="0"/>
+          <a:chExt cx="0" cy="0"/>
+        </a:xfrm>
+      </p:grpSpPr>
+      <p:sp>
+        <p:nvSpPr>
+          <p:cNvPr id="63" name="PlaceHolder 1"/>
+          <p:cNvSpPr>
+            <a:spLocks noGrp="1"/>
+          </p:cNvSpPr>
+          <p:nvPr>
+            <p:ph type="title"/>
+          </p:nvPr>
+        </p:nvSpPr>
+        <p:spPr>
+          <a:xfrm>
+            <a:off x="504000" y="301320"/>
+            <a:ext cx="9071280" cy="1261800"/>
+          </a:xfrm>
+          <a:prstGeom prst="rect">
+            <a:avLst/>
+          </a:prstGeom>
+        </p:spPr>
+        <p:txBody>
+          <a:bodyPr lIns="0" rIns="0" tIns="0" bIns="0" anchor="ctr"/>
+          <a:p>
+            <a:pPr algn="ctr"/>
+            <a:endParaRPr/>
+          </a:p>
+        </p:txBody>
+      </p:sp>
+      <p:sp>
+        <p:nvSpPr>
+          <p:cNvPr id="64" name="PlaceHolder 2"/>
+          <p:cNvSpPr>
+            <a:spLocks noGrp="1"/>
+          </p:cNvSpPr>
+          <p:nvPr>
+            <p:ph type="body"/>
+          </p:nvPr>
+        </p:nvSpPr>
+        <p:spPr>
+          <a:xfrm>
+            <a:off x="504000" y="1769040"/>
+            <a:ext cx="4426560" cy="2090880"/>
+          </a:xfrm>
+          <a:prstGeom prst="rect">
+            <a:avLst/>
+          </a:prstGeom>
+        </p:spPr>
+        <p:txBody>
+          <a:bodyPr lIns="0" rIns="0" tIns="0" bIns="0"/>
+          <a:p>
+            <a:endParaRPr/>
+          </a:p>
+        </p:txBody>
+      </p:sp>
+      <p:sp>
+        <p:nvSpPr>
+          <p:cNvPr id="65" name="PlaceHolder 3"/>
+          <p:cNvSpPr>
+            <a:spLocks noGrp="1"/>
+          </p:cNvSpPr>
+          <p:nvPr>
+            <p:ph type="body"/>
+          </p:nvPr>
+        </p:nvSpPr>
+        <p:spPr>
+          <a:xfrm>
+            <a:off x="5152320" y="1769040"/>
+            <a:ext cx="4426560" cy="2090880"/>
+          </a:xfrm>
+          <a:prstGeom prst="rect">
+            <a:avLst/>
+          </a:prstGeom>
+        </p:spPr>
+        <p:txBody>
+          <a:bodyPr lIns="0" rIns="0" tIns="0" bIns="0"/>
+          <a:p>
+            <a:endParaRPr/>
+          </a:p>
+        </p:txBody>
+      </p:sp>
+      <p:sp>
+        <p:nvSpPr>
+          <p:cNvPr id="66" name="PlaceHolder 4"/>
+          <p:cNvSpPr>
+            <a:spLocks noGrp="1"/>
+          </p:cNvSpPr>
+          <p:nvPr>
+            <p:ph type="body"/>
+          </p:nvPr>
+        </p:nvSpPr>
+        <p:spPr>
+          <a:xfrm>
+            <a:off x="5152320" y="4059000"/>
+            <a:ext cx="4426560" cy="2090880"/>
+          </a:xfrm>
+          <a:prstGeom prst="rect">
+            <a:avLst/>
+          </a:prstGeom>
+        </p:spPr>
+        <p:txBody>
+          <a:bodyPr lIns="0" rIns="0" tIns="0" bIns="0"/>
+          <a:p>
+            <a:endParaRPr/>
+          </a:p>
+        </p:txBody>
+      </p:sp>
+      <p:sp>
+        <p:nvSpPr>
+          <p:cNvPr id="67" name="PlaceHolder 5"/>
+          <p:cNvSpPr>
+            <a:spLocks noGrp="1"/>
+          </p:cNvSpPr>
+          <p:nvPr>
+            <p:ph type="body"/>
+          </p:nvPr>
+        </p:nvSpPr>
+        <p:spPr>
+          <a:xfrm>
+            <a:off x="504000" y="4059000"/>
+            <a:ext cx="4426560" cy="2090880"/>
+          </a:xfrm>
+          <a:prstGeom prst="rect">
+            <a:avLst/>
+          </a:prstGeom>
+        </p:spPr>
+        <p:txBody>
+          <a:bodyPr lIns="0" rIns="0" tIns="0" bIns="0"/>
+          <a:p>
+            <a:endParaRPr/>
+          </a:p>
+        </p:txBody>
+      </p:sp>
+    </p:spTree>
+  </p:cSld>
+</p:sldLayout>
+</file>
+
+<file path=ppt/slideLayouts/slideLayout24.xml><?xml version="1.0" encoding="utf-8"?>
+<p:sldLayout xmlns:a="http://schemas.openxmlformats.org/drawingml/2006/main" xmlns:p="http://schemas.openxmlformats.org/presentationml/2006/main" xmlns:r="http://schemas.openxmlformats.org/officeDocument/2006/relationships" type="blank" preserve="1">
+  <p:cSld name="Title, 6 Content">
+    <p:spTree>
+      <p:nvGrpSpPr>
+        <p:cNvPr id="1" name=""/>
+        <p:cNvGrpSpPr/>
+        <p:nvPr/>
+      </p:nvGrpSpPr>
+      <p:grpSpPr>
+        <a:xfrm>
+          <a:off x="0" y="0"/>
+          <a:ext cx="0" cy="0"/>
+          <a:chOff x="0" y="0"/>
+          <a:chExt cx="0" cy="0"/>
+        </a:xfrm>
+      </p:grpSpPr>
+      <p:sp>
+        <p:nvSpPr>
+          <p:cNvPr id="68" name="PlaceHolder 1"/>
+          <p:cNvSpPr>
+            <a:spLocks noGrp="1"/>
+          </p:cNvSpPr>
+          <p:nvPr>
+            <p:ph type="title"/>
+          </p:nvPr>
+        </p:nvSpPr>
+        <p:spPr>
+          <a:xfrm>
+            <a:off x="504000" y="301320"/>
+            <a:ext cx="9071280" cy="1261800"/>
+          </a:xfrm>
+          <a:prstGeom prst="rect">
+            <a:avLst/>
+          </a:prstGeom>
+        </p:spPr>
+        <p:txBody>
+          <a:bodyPr lIns="0" rIns="0" tIns="0" bIns="0" anchor="ctr"/>
+          <a:p>
+            <a:pPr algn="ctr"/>
+            <a:endParaRPr/>
+          </a:p>
+        </p:txBody>
+      </p:sp>
+      <p:sp>
+        <p:nvSpPr>
+          <p:cNvPr id="69" name="PlaceHolder 2"/>
+          <p:cNvSpPr>
+            <a:spLocks noGrp="1"/>
+          </p:cNvSpPr>
+          <p:nvPr>
+            <p:ph type="body"/>
+          </p:nvPr>
+        </p:nvSpPr>
+        <p:spPr>
+          <a:xfrm>
+            <a:off x="504000" y="1769040"/>
+            <a:ext cx="9071280" cy="4384080"/>
+          </a:xfrm>
+          <a:prstGeom prst="rect">
+            <a:avLst/>
+          </a:prstGeom>
+        </p:spPr>
+        <p:txBody>
+          <a:bodyPr lIns="0" rIns="0" tIns="0" bIns="0"/>
+          <a:p>
+            <a:endParaRPr/>
+          </a:p>
+        </p:txBody>
+      </p:sp>
+      <p:sp>
+        <p:nvSpPr>
+          <p:cNvPr id="70" name="PlaceHolder 3"/>
+          <p:cNvSpPr>
+            <a:spLocks noGrp="1"/>
+          </p:cNvSpPr>
+          <p:nvPr>
+            <p:ph type="body"/>
+          </p:nvPr>
+        </p:nvSpPr>
+        <p:spPr>
+          <a:xfrm>
+            <a:off x="504000" y="1769040"/>
+            <a:ext cx="9071280" cy="4384080"/>
+          </a:xfrm>
+          <a:prstGeom prst="rect">
+            <a:avLst/>
+          </a:prstGeom>
+        </p:spPr>
+        <p:txBody>
+          <a:bodyPr lIns="0" rIns="0" tIns="0" bIns="0"/>
+          <a:p>
+            <a:endParaRPr/>
+          </a:p>
+        </p:txBody>
+      </p:sp>
+      <p:pic>
+        <p:nvPicPr>
+          <p:cNvPr id="71" name="" descr=""/>
+          <p:cNvPicPr/>
+          <p:nvPr/>
+        </p:nvPicPr>
+        <p:blipFill>
+          <a:blip r:embed="rId2"/>
+          <a:stretch/>
+        </p:blipFill>
+        <p:spPr>
+          <a:xfrm>
+            <a:off x="2292120" y="1769040"/>
+            <a:ext cx="5494680" cy="4384080"/>
+          </a:xfrm>
+          <a:prstGeom prst="rect">
+            <a:avLst/>
+          </a:prstGeom>
+          <a:ln>
+            <a:noFill/>
+          </a:ln>
+        </p:spPr>
+      </p:pic>
+      <p:pic>
+        <p:nvPicPr>
+          <p:cNvPr id="72" name="" descr=""/>
+          <p:cNvPicPr/>
+          <p:nvPr/>
+        </p:nvPicPr>
+        <p:blipFill>
+          <a:blip r:embed="rId3"/>
+          <a:stretch/>
+        </p:blipFill>
+        <p:spPr>
+          <a:xfrm>
+            <a:off x="2292120" y="1769040"/>
+            <a:ext cx="5494680" cy="4384080"/>
+          </a:xfrm>
+          <a:prstGeom prst="rect">
+            <a:avLst/>
+          </a:prstGeom>
+          <a:ln>
+            <a:noFill/>
+          </a:ln>
+        </p:spPr>
+      </p:pic>
     </p:spTree>
   </p:cSld>
 </p:sldLayout>
@@ -531,7 +1689,7 @@
       </p:grpSpPr>
       <p:sp>
         <p:nvSpPr>
-          <p:cNvPr id="7" name="PlaceHolder 1"/>
+          <p:cNvPr id="5" name="PlaceHolder 1"/>
           <p:cNvSpPr>
             <a:spLocks noGrp="1"/>
           </p:cNvSpPr>
@@ -542,7 +1700,7 @@
         <p:spPr>
           <a:xfrm>
             <a:off x="504000" y="301320"/>
-            <a:ext cx="9071640" cy="1262160"/>
+            <a:ext cx="9071280" cy="1261800"/>
           </a:xfrm>
           <a:prstGeom prst="rect">
             <a:avLst/>
@@ -558,7 +1716,7 @@
       </p:sp>
       <p:sp>
         <p:nvSpPr>
-          <p:cNvPr id="8" name="PlaceHolder 2"/>
+          <p:cNvPr id="6" name="PlaceHolder 2"/>
           <p:cNvSpPr>
             <a:spLocks noGrp="1"/>
           </p:cNvSpPr>
@@ -569,7 +1727,7 @@
         <p:spPr>
           <a:xfrm>
             <a:off x="504000" y="1769040"/>
-            <a:ext cx="9071640" cy="4384440"/>
+            <a:ext cx="9071280" cy="4384080"/>
           </a:xfrm>
           <a:prstGeom prst="rect">
             <a:avLst/>
@@ -606,7 +1764,7 @@
       </p:grpSpPr>
       <p:sp>
         <p:nvSpPr>
-          <p:cNvPr id="9" name="PlaceHolder 1"/>
+          <p:cNvPr id="7" name="PlaceHolder 1"/>
           <p:cNvSpPr>
             <a:spLocks noGrp="1"/>
           </p:cNvSpPr>
@@ -617,7 +1775,7 @@
         <p:spPr>
           <a:xfrm>
             <a:off x="504000" y="301320"/>
-            <a:ext cx="9071640" cy="1262160"/>
+            <a:ext cx="9071280" cy="1261800"/>
           </a:xfrm>
           <a:prstGeom prst="rect">
             <a:avLst/>
@@ -633,7 +1791,7 @@
       </p:sp>
       <p:sp>
         <p:nvSpPr>
-          <p:cNvPr id="10" name="PlaceHolder 2"/>
+          <p:cNvPr id="8" name="PlaceHolder 2"/>
           <p:cNvSpPr>
             <a:spLocks noGrp="1"/>
           </p:cNvSpPr>
@@ -644,33 +1802,33 @@
         <p:spPr>
           <a:xfrm>
             <a:off x="504000" y="1769040"/>
-            <a:ext cx="4426920" cy="4384440"/>
-          </a:xfrm>
-          <a:prstGeom prst="rect">
-            <a:avLst/>
-          </a:prstGeom>
-        </p:spPr>
-        <p:txBody>
-          <a:bodyPr lIns="0" rIns="0" tIns="0" bIns="0"/>
-          <a:p>
-            <a:endParaRPr/>
-          </a:p>
-        </p:txBody>
-      </p:sp>
-      <p:sp>
-        <p:nvSpPr>
-          <p:cNvPr id="11" name="PlaceHolder 3"/>
-          <p:cNvSpPr>
-            <a:spLocks noGrp="1"/>
-          </p:cNvSpPr>
-          <p:nvPr>
-            <p:ph type="body"/>
-          </p:nvPr>
-        </p:nvSpPr>
-        <p:spPr>
-          <a:xfrm>
-            <a:off x="5152680" y="1769040"/>
-            <a:ext cx="4426920" cy="4384440"/>
+            <a:ext cx="4426560" cy="4384080"/>
+          </a:xfrm>
+          <a:prstGeom prst="rect">
+            <a:avLst/>
+          </a:prstGeom>
+        </p:spPr>
+        <p:txBody>
+          <a:bodyPr lIns="0" rIns="0" tIns="0" bIns="0"/>
+          <a:p>
+            <a:endParaRPr/>
+          </a:p>
+        </p:txBody>
+      </p:sp>
+      <p:sp>
+        <p:nvSpPr>
+          <p:cNvPr id="9" name="PlaceHolder 3"/>
+          <p:cNvSpPr>
+            <a:spLocks noGrp="1"/>
+          </p:cNvSpPr>
+          <p:nvPr>
+            <p:ph type="body"/>
+          </p:nvPr>
+        </p:nvSpPr>
+        <p:spPr>
+          <a:xfrm>
+            <a:off x="5152320" y="1769040"/>
+            <a:ext cx="4426560" cy="4384080"/>
           </a:xfrm>
           <a:prstGeom prst="rect">
             <a:avLst/>
@@ -707,7 +1865,7 @@
       </p:grpSpPr>
       <p:sp>
         <p:nvSpPr>
-          <p:cNvPr id="12" name="PlaceHolder 1"/>
+          <p:cNvPr id="10" name="PlaceHolder 1"/>
           <p:cNvSpPr>
             <a:spLocks noGrp="1"/>
           </p:cNvSpPr>
@@ -718,7 +1876,7 @@
         <p:spPr>
           <a:xfrm>
             <a:off x="504000" y="301320"/>
-            <a:ext cx="9071640" cy="1262160"/>
+            <a:ext cx="9071280" cy="1261800"/>
           </a:xfrm>
           <a:prstGeom prst="rect">
             <a:avLst/>
@@ -756,7 +1914,7 @@
       </p:grpSpPr>
       <p:sp>
         <p:nvSpPr>
-          <p:cNvPr id="13" name="PlaceHolder 1"/>
+          <p:cNvPr id="11" name="PlaceHolder 1"/>
           <p:cNvSpPr>
             <a:spLocks noGrp="1"/>
           </p:cNvSpPr>
@@ -767,7 +1925,7 @@
         <p:spPr>
           <a:xfrm>
             <a:off x="504000" y="301320"/>
-            <a:ext cx="9071640" cy="5851800"/>
+            <a:ext cx="9071280" cy="5850360"/>
           </a:xfrm>
           <a:prstGeom prst="rect">
             <a:avLst/>
@@ -805,7 +1963,7 @@
       </p:grpSpPr>
       <p:sp>
         <p:nvSpPr>
-          <p:cNvPr id="14" name="PlaceHolder 1"/>
+          <p:cNvPr id="12" name="PlaceHolder 1"/>
           <p:cNvSpPr>
             <a:spLocks noGrp="1"/>
           </p:cNvSpPr>
@@ -816,7 +1974,7 @@
         <p:spPr>
           <a:xfrm>
             <a:off x="504000" y="301320"/>
-            <a:ext cx="9071640" cy="1262160"/>
+            <a:ext cx="9071280" cy="1261800"/>
           </a:xfrm>
           <a:prstGeom prst="rect">
             <a:avLst/>
@@ -832,7 +1990,7 @@
       </p:sp>
       <p:sp>
         <p:nvSpPr>
-          <p:cNvPr id="15" name="PlaceHolder 2"/>
+          <p:cNvPr id="13" name="PlaceHolder 2"/>
           <p:cNvSpPr>
             <a:spLocks noGrp="1"/>
           </p:cNvSpPr>
@@ -843,59 +2001,59 @@
         <p:spPr>
           <a:xfrm>
             <a:off x="504000" y="1769040"/>
-            <a:ext cx="4426920" cy="2091240"/>
-          </a:xfrm>
-          <a:prstGeom prst="rect">
-            <a:avLst/>
-          </a:prstGeom>
-        </p:spPr>
-        <p:txBody>
-          <a:bodyPr lIns="0" rIns="0" tIns="0" bIns="0"/>
-          <a:p>
-            <a:endParaRPr/>
-          </a:p>
-        </p:txBody>
-      </p:sp>
-      <p:sp>
-        <p:nvSpPr>
-          <p:cNvPr id="16" name="PlaceHolder 3"/>
-          <p:cNvSpPr>
-            <a:spLocks noGrp="1"/>
-          </p:cNvSpPr>
-          <p:nvPr>
-            <p:ph type="body"/>
-          </p:nvPr>
-        </p:nvSpPr>
-        <p:spPr>
-          <a:xfrm>
-            <a:off x="504000" y="4059360"/>
-            <a:ext cx="4426920" cy="2091240"/>
-          </a:xfrm>
-          <a:prstGeom prst="rect">
-            <a:avLst/>
-          </a:prstGeom>
-        </p:spPr>
-        <p:txBody>
-          <a:bodyPr lIns="0" rIns="0" tIns="0" bIns="0"/>
-          <a:p>
-            <a:endParaRPr/>
-          </a:p>
-        </p:txBody>
-      </p:sp>
-      <p:sp>
-        <p:nvSpPr>
-          <p:cNvPr id="17" name="PlaceHolder 4"/>
-          <p:cNvSpPr>
-            <a:spLocks noGrp="1"/>
-          </p:cNvSpPr>
-          <p:nvPr>
-            <p:ph type="body"/>
-          </p:nvPr>
-        </p:nvSpPr>
-        <p:spPr>
-          <a:xfrm>
-            <a:off x="5152680" y="1769040"/>
-            <a:ext cx="4426920" cy="4384440"/>
+            <a:ext cx="4426560" cy="2090880"/>
+          </a:xfrm>
+          <a:prstGeom prst="rect">
+            <a:avLst/>
+          </a:prstGeom>
+        </p:spPr>
+        <p:txBody>
+          <a:bodyPr lIns="0" rIns="0" tIns="0" bIns="0"/>
+          <a:p>
+            <a:endParaRPr/>
+          </a:p>
+        </p:txBody>
+      </p:sp>
+      <p:sp>
+        <p:nvSpPr>
+          <p:cNvPr id="14" name="PlaceHolder 3"/>
+          <p:cNvSpPr>
+            <a:spLocks noGrp="1"/>
+          </p:cNvSpPr>
+          <p:nvPr>
+            <p:ph type="body"/>
+          </p:nvPr>
+        </p:nvSpPr>
+        <p:spPr>
+          <a:xfrm>
+            <a:off x="504000" y="4059000"/>
+            <a:ext cx="4426560" cy="2090880"/>
+          </a:xfrm>
+          <a:prstGeom prst="rect">
+            <a:avLst/>
+          </a:prstGeom>
+        </p:spPr>
+        <p:txBody>
+          <a:bodyPr lIns="0" rIns="0" tIns="0" bIns="0"/>
+          <a:p>
+            <a:endParaRPr/>
+          </a:p>
+        </p:txBody>
+      </p:sp>
+      <p:sp>
+        <p:nvSpPr>
+          <p:cNvPr id="15" name="PlaceHolder 4"/>
+          <p:cNvSpPr>
+            <a:spLocks noGrp="1"/>
+          </p:cNvSpPr>
+          <p:nvPr>
+            <p:ph type="body"/>
+          </p:nvPr>
+        </p:nvSpPr>
+        <p:spPr>
+          <a:xfrm>
+            <a:off x="5152320" y="1769040"/>
+            <a:ext cx="4426560" cy="4384080"/>
           </a:xfrm>
           <a:prstGeom prst="rect">
             <a:avLst/>
@@ -932,7 +2090,7 @@
       </p:grpSpPr>
       <p:sp>
         <p:nvSpPr>
-          <p:cNvPr id="18" name="PlaceHolder 1"/>
+          <p:cNvPr id="16" name="PlaceHolder 1"/>
           <p:cNvSpPr>
             <a:spLocks noGrp="1"/>
           </p:cNvSpPr>
@@ -943,7 +2101,7 @@
         <p:spPr>
           <a:xfrm>
             <a:off x="504000" y="301320"/>
-            <a:ext cx="9071640" cy="1262160"/>
+            <a:ext cx="9071280" cy="1261800"/>
           </a:xfrm>
           <a:prstGeom prst="rect">
             <a:avLst/>
@@ -959,7 +2117,7 @@
       </p:sp>
       <p:sp>
         <p:nvSpPr>
-          <p:cNvPr id="19" name="PlaceHolder 2"/>
+          <p:cNvPr id="17" name="PlaceHolder 2"/>
           <p:cNvSpPr>
             <a:spLocks noGrp="1"/>
           </p:cNvSpPr>
@@ -970,59 +2128,59 @@
         <p:spPr>
           <a:xfrm>
             <a:off x="504000" y="1769040"/>
-            <a:ext cx="4426920" cy="4384440"/>
-          </a:xfrm>
-          <a:prstGeom prst="rect">
-            <a:avLst/>
-          </a:prstGeom>
-        </p:spPr>
-        <p:txBody>
-          <a:bodyPr lIns="0" rIns="0" tIns="0" bIns="0"/>
-          <a:p>
-            <a:endParaRPr/>
-          </a:p>
-        </p:txBody>
-      </p:sp>
-      <p:sp>
-        <p:nvSpPr>
-          <p:cNvPr id="20" name="PlaceHolder 3"/>
-          <p:cNvSpPr>
-            <a:spLocks noGrp="1"/>
-          </p:cNvSpPr>
-          <p:nvPr>
-            <p:ph type="body"/>
-          </p:nvPr>
-        </p:nvSpPr>
-        <p:spPr>
-          <a:xfrm>
-            <a:off x="5152680" y="1769040"/>
-            <a:ext cx="4426920" cy="2091240"/>
-          </a:xfrm>
-          <a:prstGeom prst="rect">
-            <a:avLst/>
-          </a:prstGeom>
-        </p:spPr>
-        <p:txBody>
-          <a:bodyPr lIns="0" rIns="0" tIns="0" bIns="0"/>
-          <a:p>
-            <a:endParaRPr/>
-          </a:p>
-        </p:txBody>
-      </p:sp>
-      <p:sp>
-        <p:nvSpPr>
-          <p:cNvPr id="21" name="PlaceHolder 4"/>
-          <p:cNvSpPr>
-            <a:spLocks noGrp="1"/>
-          </p:cNvSpPr>
-          <p:nvPr>
-            <p:ph type="body"/>
-          </p:nvPr>
-        </p:nvSpPr>
-        <p:spPr>
-          <a:xfrm>
-            <a:off x="5152680" y="4059360"/>
-            <a:ext cx="4426920" cy="2091240"/>
+            <a:ext cx="4426560" cy="4384080"/>
+          </a:xfrm>
+          <a:prstGeom prst="rect">
+            <a:avLst/>
+          </a:prstGeom>
+        </p:spPr>
+        <p:txBody>
+          <a:bodyPr lIns="0" rIns="0" tIns="0" bIns="0"/>
+          <a:p>
+            <a:endParaRPr/>
+          </a:p>
+        </p:txBody>
+      </p:sp>
+      <p:sp>
+        <p:nvSpPr>
+          <p:cNvPr id="18" name="PlaceHolder 3"/>
+          <p:cNvSpPr>
+            <a:spLocks noGrp="1"/>
+          </p:cNvSpPr>
+          <p:nvPr>
+            <p:ph type="body"/>
+          </p:nvPr>
+        </p:nvSpPr>
+        <p:spPr>
+          <a:xfrm>
+            <a:off x="5152320" y="1769040"/>
+            <a:ext cx="4426560" cy="2090880"/>
+          </a:xfrm>
+          <a:prstGeom prst="rect">
+            <a:avLst/>
+          </a:prstGeom>
+        </p:spPr>
+        <p:txBody>
+          <a:bodyPr lIns="0" rIns="0" tIns="0" bIns="0"/>
+          <a:p>
+            <a:endParaRPr/>
+          </a:p>
+        </p:txBody>
+      </p:sp>
+      <p:sp>
+        <p:nvSpPr>
+          <p:cNvPr id="19" name="PlaceHolder 4"/>
+          <p:cNvSpPr>
+            <a:spLocks noGrp="1"/>
+          </p:cNvSpPr>
+          <p:nvPr>
+            <p:ph type="body"/>
+          </p:nvPr>
+        </p:nvSpPr>
+        <p:spPr>
+          <a:xfrm>
+            <a:off x="5152320" y="4059000"/>
+            <a:ext cx="4426560" cy="2090880"/>
           </a:xfrm>
           <a:prstGeom prst="rect">
             <a:avLst/>
@@ -1059,7 +2217,7 @@
       </p:grpSpPr>
       <p:sp>
         <p:nvSpPr>
-          <p:cNvPr id="22" name="PlaceHolder 1"/>
+          <p:cNvPr id="20" name="PlaceHolder 1"/>
           <p:cNvSpPr>
             <a:spLocks noGrp="1"/>
           </p:cNvSpPr>
@@ -1070,7 +2228,7 @@
         <p:spPr>
           <a:xfrm>
             <a:off x="504000" y="301320"/>
-            <a:ext cx="9071640" cy="1262160"/>
+            <a:ext cx="9071280" cy="1261800"/>
           </a:xfrm>
           <a:prstGeom prst="rect">
             <a:avLst/>
@@ -1086,7 +2244,7 @@
       </p:sp>
       <p:sp>
         <p:nvSpPr>
-          <p:cNvPr id="23" name="PlaceHolder 2"/>
+          <p:cNvPr id="21" name="PlaceHolder 2"/>
           <p:cNvSpPr>
             <a:spLocks noGrp="1"/>
           </p:cNvSpPr>
@@ -1097,59 +2255,59 @@
         <p:spPr>
           <a:xfrm>
             <a:off x="504000" y="1769040"/>
-            <a:ext cx="4426920" cy="2091240"/>
-          </a:xfrm>
-          <a:prstGeom prst="rect">
-            <a:avLst/>
-          </a:prstGeom>
-        </p:spPr>
-        <p:txBody>
-          <a:bodyPr lIns="0" rIns="0" tIns="0" bIns="0"/>
-          <a:p>
-            <a:endParaRPr/>
-          </a:p>
-        </p:txBody>
-      </p:sp>
-      <p:sp>
-        <p:nvSpPr>
-          <p:cNvPr id="24" name="PlaceHolder 3"/>
-          <p:cNvSpPr>
-            <a:spLocks noGrp="1"/>
-          </p:cNvSpPr>
-          <p:nvPr>
-            <p:ph type="body"/>
-          </p:nvPr>
-        </p:nvSpPr>
-        <p:spPr>
-          <a:xfrm>
-            <a:off x="5152680" y="1769040"/>
-            <a:ext cx="4426920" cy="2091240"/>
-          </a:xfrm>
-          <a:prstGeom prst="rect">
-            <a:avLst/>
-          </a:prstGeom>
-        </p:spPr>
-        <p:txBody>
-          <a:bodyPr lIns="0" rIns="0" tIns="0" bIns="0"/>
-          <a:p>
-            <a:endParaRPr/>
-          </a:p>
-        </p:txBody>
-      </p:sp>
-      <p:sp>
-        <p:nvSpPr>
-          <p:cNvPr id="25" name="PlaceHolder 4"/>
-          <p:cNvSpPr>
-            <a:spLocks noGrp="1"/>
-          </p:cNvSpPr>
-          <p:nvPr>
-            <p:ph type="body"/>
-          </p:nvPr>
-        </p:nvSpPr>
-        <p:spPr>
-          <a:xfrm>
-            <a:off x="504000" y="4059360"/>
-            <a:ext cx="9071640" cy="2091240"/>
+            <a:ext cx="4426560" cy="2090880"/>
+          </a:xfrm>
+          <a:prstGeom prst="rect">
+            <a:avLst/>
+          </a:prstGeom>
+        </p:spPr>
+        <p:txBody>
+          <a:bodyPr lIns="0" rIns="0" tIns="0" bIns="0"/>
+          <a:p>
+            <a:endParaRPr/>
+          </a:p>
+        </p:txBody>
+      </p:sp>
+      <p:sp>
+        <p:nvSpPr>
+          <p:cNvPr id="22" name="PlaceHolder 3"/>
+          <p:cNvSpPr>
+            <a:spLocks noGrp="1"/>
+          </p:cNvSpPr>
+          <p:nvPr>
+            <p:ph type="body"/>
+          </p:nvPr>
+        </p:nvSpPr>
+        <p:spPr>
+          <a:xfrm>
+            <a:off x="5152320" y="1769040"/>
+            <a:ext cx="4426560" cy="2090880"/>
+          </a:xfrm>
+          <a:prstGeom prst="rect">
+            <a:avLst/>
+          </a:prstGeom>
+        </p:spPr>
+        <p:txBody>
+          <a:bodyPr lIns="0" rIns="0" tIns="0" bIns="0"/>
+          <a:p>
+            <a:endParaRPr/>
+          </a:p>
+        </p:txBody>
+      </p:sp>
+      <p:sp>
+        <p:nvSpPr>
+          <p:cNvPr id="23" name="PlaceHolder 4"/>
+          <p:cNvSpPr>
+            <a:spLocks noGrp="1"/>
+          </p:cNvSpPr>
+          <p:nvPr>
+            <p:ph type="body"/>
+          </p:nvPr>
+        </p:nvSpPr>
+        <p:spPr>
+          <a:xfrm>
+            <a:off x="504000" y="4059000"/>
+            <a:ext cx="9071280" cy="2090880"/>
           </a:xfrm>
           <a:prstGeom prst="rect">
             <a:avLst/>
@@ -1197,7 +2355,7 @@
         <p:spPr>
           <a:xfrm>
             <a:off x="504000" y="301320"/>
-            <a:ext cx="9071640" cy="1262160"/>
+            <a:ext cx="9071280" cy="1261800"/>
           </a:xfrm>
           <a:prstGeom prst="rect">
             <a:avLst/>
@@ -1207,12 +2365,6 @@
           <a:bodyPr lIns="0" rIns="0" tIns="0" bIns="0" anchor="ctr"/>
           <a:p>
             <a:pPr algn="ctr"/>
-            <a:r>
-              <a:rPr lang="en-AU" sz="4400">
-                <a:latin typeface="Arial"/>
-              </a:rPr>
-              <a:t>Click to edit the title text format</a:t>
-            </a:r>
             <a:endParaRPr/>
           </a:p>
         </p:txBody>
@@ -1224,13 +2376,40 @@
             <a:spLocks noGrp="1"/>
           </p:cNvSpPr>
           <p:nvPr>
-            <p:ph type="body"/>
+            <p:ph type="subTitle"/>
           </p:nvPr>
         </p:nvSpPr>
         <p:spPr>
           <a:xfrm>
             <a:off x="504000" y="1769040"/>
-            <a:ext cx="9071640" cy="4384440"/>
+            <a:ext cx="9071280" cy="4384080"/>
+          </a:xfrm>
+          <a:prstGeom prst="rect">
+            <a:avLst/>
+          </a:prstGeom>
+        </p:spPr>
+        <p:txBody>
+          <a:bodyPr lIns="0" rIns="0" tIns="0" bIns="0" anchor="ctr"/>
+          <a:p>
+            <a:pPr algn="ctr"/>
+            <a:endParaRPr/>
+          </a:p>
+        </p:txBody>
+      </p:sp>
+      <p:sp>
+        <p:nvSpPr>
+          <p:cNvPr id="2" name="PlaceHolder 3"/>
+          <p:cNvSpPr>
+            <a:spLocks noGrp="1"/>
+          </p:cNvSpPr>
+          <p:nvPr>
+            <p:ph type="body"/>
+          </p:nvPr>
+        </p:nvSpPr>
+        <p:spPr>
+          <a:xfrm>
+            <a:off x="504000" y="1768680"/>
+            <a:ext cx="9072000" cy="4384080"/>
           </a:xfrm>
           <a:prstGeom prst="rect">
             <a:avLst/>
@@ -1334,104 +2513,6 @@
               </a:rPr>
               <a:t>Seventh Outline Level</a:t>
             </a:r>
-            <a:endParaRPr/>
-          </a:p>
-        </p:txBody>
-      </p:sp>
-      <p:sp>
-        <p:nvSpPr>
-          <p:cNvPr id="2" name="PlaceHolder 3"/>
-          <p:cNvSpPr>
-            <a:spLocks noGrp="1"/>
-          </p:cNvSpPr>
-          <p:nvPr>
-            <p:ph type="dt"/>
-          </p:nvPr>
-        </p:nvSpPr>
-        <p:spPr>
-          <a:xfrm>
-            <a:off x="504000" y="6887160"/>
-            <a:ext cx="2348280" cy="521280"/>
-          </a:xfrm>
-          <a:prstGeom prst="rect">
-            <a:avLst/>
-          </a:prstGeom>
-        </p:spPr>
-        <p:txBody>
-          <a:bodyPr lIns="0" rIns="0" tIns="0" bIns="0"/>
-          <a:p>
-            <a:r>
-              <a:rPr lang="en-AU" sz="1400">
-                <a:latin typeface="Times New Roman"/>
-              </a:rPr>
-              <a:t>&lt;date/time&gt;</a:t>
-            </a:r>
-            <a:endParaRPr/>
-          </a:p>
-        </p:txBody>
-      </p:sp>
-      <p:sp>
-        <p:nvSpPr>
-          <p:cNvPr id="3" name="PlaceHolder 4"/>
-          <p:cNvSpPr>
-            <a:spLocks noGrp="1"/>
-          </p:cNvSpPr>
-          <p:nvPr>
-            <p:ph type="ftr"/>
-          </p:nvPr>
-        </p:nvSpPr>
-        <p:spPr>
-          <a:xfrm>
-            <a:off x="3447360" y="6887160"/>
-            <a:ext cx="3195000" cy="521280"/>
-          </a:xfrm>
-          <a:prstGeom prst="rect">
-            <a:avLst/>
-          </a:prstGeom>
-        </p:spPr>
-        <p:txBody>
-          <a:bodyPr lIns="0" rIns="0" tIns="0" bIns="0"/>
-          <a:p>
-            <a:pPr algn="ctr"/>
-            <a:r>
-              <a:rPr lang="en-AU" sz="1400">
-                <a:latin typeface="Times New Roman"/>
-              </a:rPr>
-              <a:t>&lt;footer&gt;</a:t>
-            </a:r>
-            <a:endParaRPr/>
-          </a:p>
-        </p:txBody>
-      </p:sp>
-      <p:sp>
-        <p:nvSpPr>
-          <p:cNvPr id="4" name="PlaceHolder 5"/>
-          <p:cNvSpPr>
-            <a:spLocks noGrp="1"/>
-          </p:cNvSpPr>
-          <p:nvPr>
-            <p:ph type="sldNum"/>
-          </p:nvPr>
-        </p:nvSpPr>
-        <p:spPr>
-          <a:xfrm>
-            <a:off x="7227360" y="6887160"/>
-            <a:ext cx="2348280" cy="521280"/>
-          </a:xfrm>
-          <a:prstGeom prst="rect">
-            <a:avLst/>
-          </a:prstGeom>
-        </p:spPr>
-        <p:txBody>
-          <a:bodyPr lIns="0" rIns="0" tIns="0" bIns="0"/>
-          <a:p>
-            <a:pPr algn="r"/>
-            <a:fld id="{2C6828C2-465B-47A2-8CEB-85470CF37775}" type="slidenum">
-              <a:rPr lang="en-AU" sz="1400">
-                <a:latin typeface="Times New Roman"/>
-              </a:rPr>
-              <a:t>&lt;number&gt;</a:t>
-            </a:fld>
             <a:endParaRPr/>
           </a:p>
         </p:txBody>
@@ -1452,6 +2533,191 @@
     <p:sldLayoutId id="2147483658" r:id="rId11"/>
     <p:sldLayoutId id="2147483659" r:id="rId12"/>
     <p:sldLayoutId id="2147483660" r:id="rId13"/>
+  </p:sldLayoutIdLst>
+</p:sldMaster>
+</file>
+
+<file path=ppt/slideMasters/slideMaster2.xml><?xml version="1.0" encoding="utf-8"?>
+<p:sldMaster xmlns:a="http://schemas.openxmlformats.org/drawingml/2006/main" xmlns:p="http://schemas.openxmlformats.org/presentationml/2006/main" xmlns:r="http://schemas.openxmlformats.org/officeDocument/2006/relationships">
+  <p:cSld>
+    <p:spTree>
+      <p:nvGrpSpPr>
+        <p:cNvPr id="1" name=""/>
+        <p:cNvGrpSpPr/>
+        <p:nvPr/>
+      </p:nvGrpSpPr>
+      <p:grpSpPr>
+        <a:xfrm>
+          <a:off x="0" y="0"/>
+          <a:ext cx="0" cy="0"/>
+          <a:chOff x="0" y="0"/>
+          <a:chExt cx="0" cy="0"/>
+        </a:xfrm>
+      </p:grpSpPr>
+      <p:sp>
+        <p:nvSpPr>
+          <p:cNvPr id="37" name="PlaceHolder 1"/>
+          <p:cNvSpPr>
+            <a:spLocks noGrp="1"/>
+          </p:cNvSpPr>
+          <p:nvPr>
+            <p:ph type="title"/>
+          </p:nvPr>
+        </p:nvSpPr>
+        <p:spPr>
+          <a:xfrm>
+            <a:off x="504000" y="301320"/>
+            <a:ext cx="9071280" cy="1261800"/>
+          </a:xfrm>
+          <a:prstGeom prst="rect">
+            <a:avLst/>
+          </a:prstGeom>
+        </p:spPr>
+        <p:txBody>
+          <a:bodyPr lIns="0" rIns="0" tIns="0" bIns="0" anchor="ctr"/>
+          <a:p>
+            <a:pPr algn="ctr"/>
+            <a:endParaRPr/>
+          </a:p>
+        </p:txBody>
+      </p:sp>
+      <p:sp>
+        <p:nvSpPr>
+          <p:cNvPr id="38" name="PlaceHolder 2"/>
+          <p:cNvSpPr>
+            <a:spLocks noGrp="1"/>
+          </p:cNvSpPr>
+          <p:nvPr>
+            <p:ph type="body"/>
+          </p:nvPr>
+        </p:nvSpPr>
+        <p:spPr>
+          <a:xfrm>
+            <a:off x="504000" y="1769040"/>
+            <a:ext cx="9071280" cy="4384080"/>
+          </a:xfrm>
+          <a:prstGeom prst="rect">
+            <a:avLst/>
+          </a:prstGeom>
+        </p:spPr>
+        <p:txBody>
+          <a:bodyPr lIns="0" rIns="0" tIns="0" bIns="0"/>
+          <a:p>
+            <a:pPr>
+              <a:buSzPct val="45000"/>
+              <a:buFont typeface="StarSymbol"/>
+              <a:buChar char=""/>
+            </a:pPr>
+            <a:r>
+              <a:rPr lang="en-AU">
+                <a:latin typeface="Arial"/>
+              </a:rPr>
+              <a:t>Click to edit the outline text format</a:t>
+            </a:r>
+            <a:endParaRPr/>
+          </a:p>
+          <a:p>
+            <a:pPr lvl="1">
+              <a:buSzPct val="75000"/>
+              <a:buFont typeface="StarSymbol"/>
+              <a:buChar char=""/>
+            </a:pPr>
+            <a:r>
+              <a:rPr lang="en-AU">
+                <a:latin typeface="Arial"/>
+              </a:rPr>
+              <a:t>Second Outline Level</a:t>
+            </a:r>
+            <a:endParaRPr/>
+          </a:p>
+          <a:p>
+            <a:pPr lvl="2">
+              <a:buSzPct val="45000"/>
+              <a:buFont typeface="StarSymbol"/>
+              <a:buChar char=""/>
+            </a:pPr>
+            <a:r>
+              <a:rPr lang="en-AU">
+                <a:latin typeface="Arial"/>
+              </a:rPr>
+              <a:t>Third Outline Level</a:t>
+            </a:r>
+            <a:endParaRPr/>
+          </a:p>
+          <a:p>
+            <a:pPr lvl="3">
+              <a:buSzPct val="75000"/>
+              <a:buFont typeface="StarSymbol"/>
+              <a:buChar char=""/>
+            </a:pPr>
+            <a:r>
+              <a:rPr lang="en-AU">
+                <a:latin typeface="Arial"/>
+              </a:rPr>
+              <a:t>Fourth Outline Level</a:t>
+            </a:r>
+            <a:endParaRPr/>
+          </a:p>
+          <a:p>
+            <a:pPr lvl="4">
+              <a:buSzPct val="45000"/>
+              <a:buFont typeface="StarSymbol"/>
+              <a:buChar char=""/>
+            </a:pPr>
+            <a:r>
+              <a:rPr lang="en-AU">
+                <a:latin typeface="Arial"/>
+              </a:rPr>
+              <a:t>Fifth Outline Level</a:t>
+            </a:r>
+            <a:endParaRPr/>
+          </a:p>
+          <a:p>
+            <a:pPr lvl="5">
+              <a:buSzPct val="45000"/>
+              <a:buFont typeface="StarSymbol"/>
+              <a:buChar char=""/>
+            </a:pPr>
+            <a:r>
+              <a:rPr lang="en-AU">
+                <a:latin typeface="Arial"/>
+              </a:rPr>
+              <a:t>Sixth Outline Level</a:t>
+            </a:r>
+            <a:endParaRPr/>
+          </a:p>
+          <a:p>
+            <a:pPr lvl="6">
+              <a:buSzPct val="45000"/>
+              <a:buFont typeface="StarSymbol"/>
+              <a:buChar char=""/>
+            </a:pPr>
+            <a:r>
+              <a:rPr lang="en-AU">
+                <a:latin typeface="Arial"/>
+              </a:rPr>
+              <a:t>Seventh Outline Level</a:t>
+            </a:r>
+            <a:endParaRPr/>
+          </a:p>
+        </p:txBody>
+      </p:sp>
+    </p:spTree>
+  </p:cSld>
+  <p:clrMap bg1="lt1" bg2="lt2" tx1="dk1" tx2="dk2" accent1="accent1" accent2="accent2" accent3="accent3" accent4="accent4" accent5="accent5" accent6="accent6" hlink="hlink" folHlink="folHlink"/>
+  <p:sldLayoutIdLst>
+    <p:sldLayoutId id="2147483662" r:id="rId2"/>
+    <p:sldLayoutId id="2147483663" r:id="rId3"/>
+    <p:sldLayoutId id="2147483664" r:id="rId4"/>
+    <p:sldLayoutId id="2147483665" r:id="rId5"/>
+    <p:sldLayoutId id="2147483666" r:id="rId6"/>
+    <p:sldLayoutId id="2147483667" r:id="rId7"/>
+    <p:sldLayoutId id="2147483668" r:id="rId8"/>
+    <p:sldLayoutId id="2147483669" r:id="rId9"/>
+    <p:sldLayoutId id="2147483670" r:id="rId10"/>
+    <p:sldLayoutId id="2147483671" r:id="rId11"/>
+    <p:sldLayoutId id="2147483672" r:id="rId12"/>
+    <p:sldLayoutId id="2147483673" r:id="rId13"/>
   </p:sldLayoutIdLst>
 </p:sldMaster>
 </file>
@@ -1475,14 +2741,14 @@
       </p:grpSpPr>
       <p:sp>
         <p:nvSpPr>
-          <p:cNvPr id="39" name="TextShape 1"/>
-          <p:cNvSpPr txBox="1"/>
+          <p:cNvPr id="73" name="CustomShape 1"/>
+          <p:cNvSpPr/>
           <p:nvPr/>
         </p:nvSpPr>
         <p:spPr>
           <a:xfrm>
             <a:off x="504000" y="301320"/>
-            <a:ext cx="9071640" cy="1262160"/>
+            <a:ext cx="9071280" cy="1261800"/>
           </a:xfrm>
           <a:prstGeom prst="rect">
             <a:avLst/>
@@ -1492,12 +2758,22 @@
             <a:noFill/>
           </a:ln>
         </p:spPr>
+        <p:style>
+          <a:lnRef idx="0"/>
+          <a:fillRef idx="0"/>
+          <a:effectRef idx="0"/>
+          <a:fontRef idx="minor"/>
+        </p:style>
         <p:txBody>
           <a:bodyPr lIns="0" rIns="0" tIns="0" bIns="0" anchor="ctr"/>
           <a:p>
-            <a:pPr algn="ctr"/>
+            <a:pPr algn="ctr">
+              <a:lnSpc>
+                <a:spcPct val="100000"/>
+              </a:lnSpc>
+            </a:pPr>
             <a:r>
-              <a:rPr lang="en-AU" sz="4400">
+              <a:rPr lang="en-AU" sz="4400" strike="noStrike">
                 <a:latin typeface="Arial"/>
               </a:rPr>
               <a:t>Anna's ssh command</a:t>
@@ -1508,14 +2784,14 @@
       </p:sp>
       <p:sp>
         <p:nvSpPr>
-          <p:cNvPr id="40" name="TextShape 2"/>
-          <p:cNvSpPr txBox="1"/>
+          <p:cNvPr id="74" name="CustomShape 2"/>
+          <p:cNvSpPr/>
           <p:nvPr/>
         </p:nvSpPr>
         <p:spPr>
           <a:xfrm>
             <a:off x="504000" y="1769040"/>
-            <a:ext cx="9071640" cy="4384440"/>
+            <a:ext cx="9071280" cy="4384080"/>
           </a:xfrm>
           <a:prstGeom prst="rect">
             <a:avLst/>
@@ -1525,10 +2801,20 @@
             <a:noFill/>
           </a:ln>
         </p:spPr>
+        <p:style>
+          <a:lnRef idx="0"/>
+          <a:fillRef idx="0"/>
+          <a:effectRef idx="0"/>
+          <a:fontRef idx="minor"/>
+        </p:style>
         <p:txBody>
           <a:bodyPr lIns="0" rIns="0" tIns="0" bIns="0" anchor="ctr"/>
           <a:p>
-            <a:pPr algn="ctr"/>
+            <a:pPr algn="ctr">
+              <a:lnSpc>
+                <a:spcPct val="100000"/>
+              </a:lnSpc>
+            </a:pPr>
             <a:r>
               <a:rPr i="1" lang="en-AU" sz="2400" strike="noStrike">
                 <a:solidFill>
@@ -1594,14 +2880,14 @@
       </p:grpSpPr>
       <p:sp>
         <p:nvSpPr>
-          <p:cNvPr id="41" name="TextShape 1"/>
-          <p:cNvSpPr txBox="1"/>
+          <p:cNvPr id="75" name="CustomShape 1"/>
+          <p:cNvSpPr/>
           <p:nvPr/>
         </p:nvSpPr>
         <p:spPr>
           <a:xfrm>
             <a:off x="504000" y="301320"/>
-            <a:ext cx="9071640" cy="1262160"/>
+            <a:ext cx="9071280" cy="1261800"/>
           </a:xfrm>
           <a:prstGeom prst="rect">
             <a:avLst/>
@@ -1611,11 +2897,17 @@
             <a:noFill/>
           </a:ln>
         </p:spPr>
+        <p:style>
+          <a:lnRef idx="0"/>
+          <a:fillRef idx="0"/>
+          <a:effectRef idx="0"/>
+          <a:fontRef idx="minor"/>
+        </p:style>
         <p:txBody>
           <a:bodyPr lIns="0" rIns="0" tIns="0" bIns="0" anchor="ctr"/>
           <a:p>
             <a:r>
-              <a:rPr lang="en-AU" sz="4400">
+              <a:rPr lang="en-AU" sz="4400" strike="noStrike">
                 <a:latin typeface="Arial"/>
               </a:rPr>
               <a:t>Question 1</a:t>
@@ -1626,14 +2918,14 @@
       </p:sp>
       <p:sp>
         <p:nvSpPr>
-          <p:cNvPr id="42" name="TextShape 2"/>
-          <p:cNvSpPr txBox="1"/>
+          <p:cNvPr id="76" name="CustomShape 2"/>
+          <p:cNvSpPr/>
           <p:nvPr/>
         </p:nvSpPr>
         <p:spPr>
           <a:xfrm>
             <a:off x="504000" y="1769040"/>
-            <a:ext cx="9071640" cy="4384440"/>
+            <a:ext cx="9071280" cy="4384080"/>
           </a:xfrm>
           <a:prstGeom prst="rect">
             <a:avLst/>
@@ -1643,11 +2935,17 @@
             <a:noFill/>
           </a:ln>
         </p:spPr>
+        <p:style>
+          <a:lnRef idx="0"/>
+          <a:fillRef idx="0"/>
+          <a:effectRef idx="0"/>
+          <a:fontRef idx="minor"/>
+        </p:style>
         <p:txBody>
           <a:bodyPr lIns="0" rIns="0" tIns="0" bIns="0"/>
           <a:p>
             <a:r>
-              <a:rPr lang="en-AU" sz="3200">
+              <a:rPr lang="en-AU" sz="3200" strike="noStrike">
                 <a:latin typeface="Arial"/>
               </a:rPr>
               <a:t>Using the 'man' command, what is the -Y flag adding to the ssh command?</a:t>
@@ -1656,17 +2954,20 @@
           </a:p>
           <a:p>
             <a:pPr>
+              <a:lnSpc>
+                <a:spcPct val="100000"/>
+              </a:lnSpc>
               <a:buFont typeface="StarSymbol"/>
               <a:buAutoNum type="alphaUcParenR"/>
             </a:pPr>
             <a:r>
-              <a:rPr lang="en-AU" sz="3200">
+              <a:rPr lang="en-AU" sz="3200" strike="noStrike">
                 <a:latin typeface="Arial"/>
               </a:rPr>
               <a:t> </a:t>
             </a:r>
             <a:r>
-              <a:rPr lang="en-AU" sz="3200">
+              <a:rPr lang="en-AU" sz="3200" strike="noStrike">
                 <a:latin typeface="Arial"/>
               </a:rPr>
               <a:t>Forces ssh into loud mode</a:t>
@@ -1675,17 +2976,20 @@
           </a:p>
           <a:p>
             <a:pPr>
+              <a:lnSpc>
+                <a:spcPct val="100000"/>
+              </a:lnSpc>
               <a:buFont typeface="StarSymbol"/>
               <a:buAutoNum type="alphaUcParenR"/>
             </a:pPr>
             <a:r>
-              <a:rPr lang="en-AU" sz="3200">
+              <a:rPr lang="en-AU" sz="3200" strike="noStrike">
                 <a:latin typeface="Arial"/>
               </a:rPr>
               <a:t> </a:t>
             </a:r>
             <a:r>
-              <a:rPr lang="en-AU" sz="3200">
+              <a:rPr lang="en-AU" sz="3200" strike="noStrike">
                 <a:latin typeface="Arial"/>
               </a:rPr>
               <a:t>Specifies the user to log in as on the remote machine</a:t>
@@ -1694,17 +2998,20 @@
           </a:p>
           <a:p>
             <a:pPr>
+              <a:lnSpc>
+                <a:spcPct val="100000"/>
+              </a:lnSpc>
               <a:buFont typeface="StarSymbol"/>
               <a:buAutoNum type="alphaUcParenR"/>
             </a:pPr>
             <a:r>
-              <a:rPr lang="en-AU" sz="3200">
+              <a:rPr lang="en-AU" sz="3200" strike="noStrike">
                 <a:latin typeface="Arial"/>
               </a:rPr>
               <a:t> </a:t>
             </a:r>
             <a:r>
-              <a:rPr lang="en-AU" sz="3200">
+              <a:rPr lang="en-AU" sz="3200" strike="noStrike">
                 <a:latin typeface="Arial"/>
               </a:rPr>
               <a:t>Enables trusted X11 forwarding</a:t>
@@ -1713,17 +3020,20 @@
           </a:p>
           <a:p>
             <a:pPr>
+              <a:lnSpc>
+                <a:spcPct val="100000"/>
+              </a:lnSpc>
               <a:buFont typeface="StarSymbol"/>
               <a:buAutoNum type="alphaUcParenR"/>
             </a:pPr>
             <a:r>
-              <a:rPr lang="en-AU" sz="3200">
+              <a:rPr lang="en-AU" sz="3200" strike="noStrike">
                 <a:latin typeface="Arial"/>
               </a:rPr>
               <a:t> </a:t>
             </a:r>
             <a:r>
-              <a:rPr lang="en-AU" sz="3200">
+              <a:rPr lang="en-AU" sz="3200" strike="noStrike">
                 <a:latin typeface="Arial"/>
               </a:rPr>
               <a:t>Asks ssh to display the version number and exit</a:t>
@@ -1732,17 +3042,20 @@
           </a:p>
           <a:p>
             <a:pPr>
+              <a:lnSpc>
+                <a:spcPct val="100000"/>
+              </a:lnSpc>
               <a:buFont typeface="StarSymbol"/>
               <a:buAutoNum type="alphaUcParenR"/>
             </a:pPr>
             <a:r>
-              <a:rPr lang="en-AU" sz="3200">
+              <a:rPr lang="en-AU" sz="3200" strike="noStrike">
                 <a:latin typeface="Arial"/>
               </a:rPr>
               <a:t> </a:t>
             </a:r>
             <a:r>
-              <a:rPr lang="en-AU" sz="3200">
+              <a:rPr lang="en-AU" sz="3200" strike="noStrike">
                 <a:latin typeface="Arial"/>
               </a:rPr>
               <a:t>Forces ssh into quiet mode</a:t>
@@ -1750,9 +3063,13 @@
             <a:endParaRPr/>
           </a:p>
           <a:p>
-            <a:pPr algn="ctr"/>
+            <a:pPr algn="ctr">
+              <a:lnSpc>
+                <a:spcPct val="100000"/>
+              </a:lnSpc>
+            </a:pPr>
             <a:r>
-              <a:rPr lang="en-AU" sz="3200">
+              <a:rPr lang="en-AU" sz="3200" strike="noStrike">
                 <a:latin typeface="Arial"/>
               </a:rPr>
               <a:t>?</a:t>
@@ -1763,6 +3080,476 @@
       </p:sp>
     </p:spTree>
   </p:cSld>
+  <p:timing>
+    <p:tnLst>
+      <p:par>
+        <p:cTn id="3" dur="indefinite" restart="never" nodeType="tmRoot">
+          <p:childTnLst>
+            <p:seq>
+              <p:cTn id="4" nodeType="mainSeq"/>
+              <p:prevCondLst>
+                <p:cond delay="0" evt="onPrev">
+                  <p:tgtEl>
+                    <p:sldTgt/>
+                  </p:tgtEl>
+                </p:cond>
+              </p:prevCondLst>
+              <p:nextCondLst>
+                <p:cond delay="0" evt="onNext">
+                  <p:tgtEl>
+                    <p:sldTgt/>
+                  </p:tgtEl>
+                </p:cond>
+              </p:nextCondLst>
+            </p:seq>
+          </p:childTnLst>
+        </p:cTn>
+      </p:par>
+    </p:tnLst>
+  </p:timing>
+</p:sld>
+</file>
+
+<file path=ppt/slides/slide3.xml><?xml version="1.0" encoding="utf-8"?>
+<p:sld xmlns:a="http://schemas.openxmlformats.org/drawingml/2006/main" xmlns:p="http://schemas.openxmlformats.org/presentationml/2006/main" xmlns:r="http://schemas.openxmlformats.org/officeDocument/2006/relationships">
+  <p:cSld>
+    <p:spTree>
+      <p:nvGrpSpPr>
+        <p:cNvPr id="1" name=""/>
+        <p:cNvGrpSpPr/>
+        <p:nvPr/>
+      </p:nvGrpSpPr>
+      <p:grpSpPr>
+        <a:xfrm>
+          <a:off x="0" y="0"/>
+          <a:ext cx="0" cy="0"/>
+          <a:chOff x="0" y="0"/>
+          <a:chExt cx="0" cy="0"/>
+        </a:xfrm>
+      </p:grpSpPr>
+      <p:sp>
+        <p:nvSpPr>
+          <p:cNvPr id="77" name="CustomShape 1"/>
+          <p:cNvSpPr/>
+          <p:nvPr/>
+        </p:nvSpPr>
+        <p:spPr>
+          <a:xfrm>
+            <a:off x="504000" y="301320"/>
+            <a:ext cx="9071280" cy="1261800"/>
+          </a:xfrm>
+          <a:prstGeom prst="rect">
+            <a:avLst/>
+          </a:prstGeom>
+          <a:noFill/>
+          <a:ln>
+            <a:noFill/>
+          </a:ln>
+        </p:spPr>
+        <p:style>
+          <a:lnRef idx="0"/>
+          <a:fillRef idx="0"/>
+          <a:effectRef idx="0"/>
+          <a:fontRef idx="minor"/>
+        </p:style>
+        <p:txBody>
+          <a:bodyPr lIns="0" rIns="0" tIns="0" bIns="0" anchor="ctr"/>
+          <a:p>
+            <a:pPr algn="ctr">
+              <a:lnSpc>
+                <a:spcPct val="100000"/>
+              </a:lnSpc>
+            </a:pPr>
+            <a:r>
+              <a:rPr lang="en-AU" sz="4400" strike="noStrike">
+                <a:latin typeface="Arial"/>
+              </a:rPr>
+              <a:t>Exercise 1</a:t>
+            </a:r>
+            <a:endParaRPr/>
+          </a:p>
+        </p:txBody>
+      </p:sp>
+      <p:sp>
+        <p:nvSpPr>
+          <p:cNvPr id="78" name="CustomShape 2"/>
+          <p:cNvSpPr/>
+          <p:nvPr/>
+        </p:nvSpPr>
+        <p:spPr>
+          <a:xfrm>
+            <a:off x="504000" y="1769040"/>
+            <a:ext cx="9071280" cy="4384080"/>
+          </a:xfrm>
+          <a:prstGeom prst="rect">
+            <a:avLst/>
+          </a:prstGeom>
+          <a:noFill/>
+          <a:ln>
+            <a:noFill/>
+          </a:ln>
+        </p:spPr>
+        <p:style>
+          <a:lnRef idx="0"/>
+          <a:fillRef idx="0"/>
+          <a:effectRef idx="0"/>
+          <a:fontRef idx="minor"/>
+        </p:style>
+        <p:txBody>
+          <a:bodyPr lIns="0" rIns="0" tIns="0" bIns="0" anchor="ctr"/>
+          <a:p>
+            <a:pPr algn="ctr">
+              <a:lnSpc>
+                <a:spcPct val="100000"/>
+              </a:lnSpc>
+            </a:pPr>
+            <a:r>
+              <a:rPr i="1" lang="en-AU" sz="2400" strike="noStrike">
+                <a:solidFill>
+                  <a:srgbClr val="808080"/>
+                </a:solidFill>
+                <a:latin typeface="Menlo"/>
+                <a:ea typeface="Menlo"/>
+              </a:rPr>
+              <a:t>sudo apt-get install firefox</a:t>
+            </a:r>
+            <a:endParaRPr/>
+          </a:p>
+        </p:txBody>
+      </p:sp>
+    </p:spTree>
+  </p:cSld>
+  <p:timing>
+    <p:tnLst>
+      <p:par>
+        <p:cTn id="5" dur="indefinite" restart="never" nodeType="tmRoot">
+          <p:childTnLst>
+            <p:seq>
+              <p:cTn id="6" nodeType="mainSeq"/>
+              <p:prevCondLst>
+                <p:cond delay="0" evt="onPrev">
+                  <p:tgtEl>
+                    <p:sldTgt/>
+                  </p:tgtEl>
+                </p:cond>
+              </p:prevCondLst>
+              <p:nextCondLst>
+                <p:cond delay="0" evt="onNext">
+                  <p:tgtEl>
+                    <p:sldTgt/>
+                  </p:tgtEl>
+                </p:cond>
+              </p:nextCondLst>
+            </p:seq>
+          </p:childTnLst>
+        </p:cTn>
+      </p:par>
+    </p:tnLst>
+  </p:timing>
+</p:sld>
+</file>
+
+<file path=ppt/slides/slide4.xml><?xml version="1.0" encoding="utf-8"?>
+<p:sld xmlns:a="http://schemas.openxmlformats.org/drawingml/2006/main" xmlns:p="http://schemas.openxmlformats.org/presentationml/2006/main" xmlns:r="http://schemas.openxmlformats.org/officeDocument/2006/relationships">
+  <p:cSld>
+    <p:spTree>
+      <p:nvGrpSpPr>
+        <p:cNvPr id="1" name=""/>
+        <p:cNvGrpSpPr/>
+        <p:nvPr/>
+      </p:nvGrpSpPr>
+      <p:grpSpPr>
+        <a:xfrm>
+          <a:off x="0" y="0"/>
+          <a:ext cx="0" cy="0"/>
+          <a:chOff x="0" y="0"/>
+          <a:chExt cx="0" cy="0"/>
+        </a:xfrm>
+      </p:grpSpPr>
+      <p:sp>
+        <p:nvSpPr>
+          <p:cNvPr id="79" name="CustomShape 1"/>
+          <p:cNvSpPr/>
+          <p:nvPr/>
+        </p:nvSpPr>
+        <p:spPr>
+          <a:xfrm>
+            <a:off x="504000" y="301320"/>
+            <a:ext cx="9071280" cy="1261800"/>
+          </a:xfrm>
+          <a:prstGeom prst="rect">
+            <a:avLst/>
+          </a:prstGeom>
+          <a:noFill/>
+          <a:ln>
+            <a:noFill/>
+          </a:ln>
+        </p:spPr>
+        <p:style>
+          <a:lnRef idx="0"/>
+          <a:fillRef idx="0"/>
+          <a:effectRef idx="0"/>
+          <a:fontRef idx="minor"/>
+        </p:style>
+        <p:txBody>
+          <a:bodyPr lIns="0" rIns="0" tIns="0" bIns="0" anchor="ctr"/>
+          <a:p>
+            <a:pPr algn="ctr">
+              <a:lnSpc>
+                <a:spcPct val="100000"/>
+              </a:lnSpc>
+            </a:pPr>
+            <a:r>
+              <a:rPr lang="en-AU" sz="4400" strike="noStrike">
+                <a:latin typeface="Arial"/>
+              </a:rPr>
+              <a:t>Exercise 2</a:t>
+            </a:r>
+            <a:endParaRPr/>
+          </a:p>
+        </p:txBody>
+      </p:sp>
+      <p:sp>
+        <p:nvSpPr>
+          <p:cNvPr id="80" name="CustomShape 2"/>
+          <p:cNvSpPr/>
+          <p:nvPr/>
+        </p:nvSpPr>
+        <p:spPr>
+          <a:xfrm>
+            <a:off x="504000" y="1769040"/>
+            <a:ext cx="9071280" cy="4384080"/>
+          </a:xfrm>
+          <a:prstGeom prst="rect">
+            <a:avLst/>
+          </a:prstGeom>
+          <a:noFill/>
+          <a:ln>
+            <a:noFill/>
+          </a:ln>
+        </p:spPr>
+        <p:style>
+          <a:lnRef idx="0"/>
+          <a:fillRef idx="0"/>
+          <a:effectRef idx="0"/>
+          <a:fontRef idx="minor"/>
+        </p:style>
+        <p:txBody>
+          <a:bodyPr lIns="0" rIns="0" tIns="0" bIns="0" anchor="ctr"/>
+          <a:p>
+            <a:pPr algn="ctr">
+              <a:lnSpc>
+                <a:spcPct val="100000"/>
+              </a:lnSpc>
+            </a:pPr>
+            <a:r>
+              <a:rPr i="1" lang="en-AU" sz="2400" strike="noStrike">
+                <a:solidFill>
+                  <a:srgbClr val="808080"/>
+                </a:solidFill>
+                <a:latin typeface="Menlo"/>
+                <a:ea typeface="Menlo"/>
+              </a:rPr>
+              <a:t>sudo apt-get install gedit</a:t>
+            </a:r>
+            <a:endParaRPr/>
+          </a:p>
+          <a:p>
+            <a:pPr algn="ctr">
+              <a:lnSpc>
+                <a:spcPct val="100000"/>
+              </a:lnSpc>
+            </a:pPr>
+            <a:endParaRPr/>
+          </a:p>
+          <a:p>
+            <a:pPr algn="ctr">
+              <a:lnSpc>
+                <a:spcPct val="100000"/>
+              </a:lnSpc>
+            </a:pPr>
+            <a:r>
+              <a:rPr i="1" lang="en-AU" sz="2400" strike="noStrike">
+                <a:solidFill>
+                  <a:srgbClr val="808080"/>
+                </a:solidFill>
+                <a:latin typeface="Menlo"/>
+                <a:ea typeface="Menlo"/>
+              </a:rPr>
+              <a:t>gedit today.txt</a:t>
+            </a:r>
+            <a:endParaRPr/>
+          </a:p>
+        </p:txBody>
+      </p:sp>
+    </p:spTree>
+  </p:cSld>
+  <p:timing>
+    <p:tnLst>
+      <p:par>
+        <p:cTn id="7" dur="indefinite" restart="never" nodeType="tmRoot">
+          <p:childTnLst>
+            <p:seq>
+              <p:cTn id="8" nodeType="mainSeq"/>
+              <p:prevCondLst>
+                <p:cond delay="0" evt="onPrev">
+                  <p:tgtEl>
+                    <p:sldTgt/>
+                  </p:tgtEl>
+                </p:cond>
+              </p:prevCondLst>
+              <p:nextCondLst>
+                <p:cond delay="0" evt="onNext">
+                  <p:tgtEl>
+                    <p:sldTgt/>
+                  </p:tgtEl>
+                </p:cond>
+              </p:nextCondLst>
+            </p:seq>
+          </p:childTnLst>
+        </p:cTn>
+      </p:par>
+    </p:tnLst>
+  </p:timing>
+</p:sld>
+</file>
+
+<file path=ppt/slides/slide5.xml><?xml version="1.0" encoding="utf-8"?>
+<p:sld xmlns:a="http://schemas.openxmlformats.org/drawingml/2006/main" xmlns:p="http://schemas.openxmlformats.org/presentationml/2006/main" xmlns:r="http://schemas.openxmlformats.org/officeDocument/2006/relationships">
+  <p:cSld>
+    <p:spTree>
+      <p:nvGrpSpPr>
+        <p:cNvPr id="1" name=""/>
+        <p:cNvGrpSpPr/>
+        <p:nvPr/>
+      </p:nvGrpSpPr>
+      <p:grpSpPr>
+        <a:xfrm>
+          <a:off x="0" y="0"/>
+          <a:ext cx="0" cy="0"/>
+          <a:chOff x="0" y="0"/>
+          <a:chExt cx="0" cy="0"/>
+        </a:xfrm>
+      </p:grpSpPr>
+      <p:sp>
+        <p:nvSpPr>
+          <p:cNvPr id="81" name="CustomShape 1"/>
+          <p:cNvSpPr/>
+          <p:nvPr/>
+        </p:nvSpPr>
+        <p:spPr>
+          <a:xfrm>
+            <a:off x="504000" y="301320"/>
+            <a:ext cx="9071280" cy="1261800"/>
+          </a:xfrm>
+          <a:prstGeom prst="rect">
+            <a:avLst/>
+          </a:prstGeom>
+          <a:noFill/>
+          <a:ln>
+            <a:noFill/>
+          </a:ln>
+        </p:spPr>
+        <p:style>
+          <a:lnRef idx="0"/>
+          <a:fillRef idx="0"/>
+          <a:effectRef idx="0"/>
+          <a:fontRef idx="minor"/>
+        </p:style>
+        <p:txBody>
+          <a:bodyPr lIns="0" rIns="0" tIns="0" bIns="0" anchor="ctr"/>
+          <a:p>
+            <a:pPr algn="ctr">
+              <a:lnSpc>
+                <a:spcPct val="100000"/>
+              </a:lnSpc>
+            </a:pPr>
+            <a:r>
+              <a:rPr lang="en-AU" sz="4400" strike="noStrike">
+                <a:latin typeface="Arial"/>
+              </a:rPr>
+              <a:t>Exercise 3</a:t>
+            </a:r>
+            <a:endParaRPr/>
+          </a:p>
+        </p:txBody>
+      </p:sp>
+      <p:sp>
+        <p:nvSpPr>
+          <p:cNvPr id="82" name="CustomShape 2"/>
+          <p:cNvSpPr/>
+          <p:nvPr/>
+        </p:nvSpPr>
+        <p:spPr>
+          <a:xfrm>
+            <a:off x="504000" y="1769040"/>
+            <a:ext cx="9071280" cy="4384080"/>
+          </a:xfrm>
+          <a:prstGeom prst="rect">
+            <a:avLst/>
+          </a:prstGeom>
+          <a:noFill/>
+          <a:ln>
+            <a:noFill/>
+          </a:ln>
+        </p:spPr>
+        <p:style>
+          <a:lnRef idx="0"/>
+          <a:fillRef idx="0"/>
+          <a:effectRef idx="0"/>
+          <a:fontRef idx="minor"/>
+        </p:style>
+        <p:txBody>
+          <a:bodyPr lIns="0" rIns="0" tIns="0" bIns="0" anchor="ctr"/>
+          <a:p>
+            <a:pPr algn="ctr">
+              <a:lnSpc>
+                <a:spcPct val="100000"/>
+              </a:lnSpc>
+            </a:pPr>
+            <a:r>
+              <a:rPr i="1" lang="en-AU" sz="2400" strike="noStrike">
+                <a:solidFill>
+                  <a:srgbClr val="808080"/>
+                </a:solidFill>
+                <a:latin typeface="Menlo"/>
+                <a:ea typeface="Menlo"/>
+              </a:rPr>
+              <a:t>sudo apt-get remove gedit</a:t>
+            </a:r>
+            <a:endParaRPr/>
+          </a:p>
+        </p:txBody>
+      </p:sp>
+    </p:spTree>
+  </p:cSld>
+  <p:timing>
+    <p:tnLst>
+      <p:par>
+        <p:cTn id="9" dur="indefinite" restart="never" nodeType="tmRoot">
+          <p:childTnLst>
+            <p:seq>
+              <p:cTn id="10" nodeType="mainSeq"/>
+              <p:prevCondLst>
+                <p:cond delay="0" evt="onPrev">
+                  <p:tgtEl>
+                    <p:sldTgt/>
+                  </p:tgtEl>
+                </p:cond>
+              </p:prevCondLst>
+              <p:nextCondLst>
+                <p:cond delay="0" evt="onNext">
+                  <p:tgtEl>
+                    <p:sldTgt/>
+                  </p:tgtEl>
+                </p:cond>
+              </p:nextCondLst>
+            </p:seq>
+          </p:childTnLst>
+        </p:cTn>
+      </p:par>
+    </p:tnLst>
+  </p:timing>
 </p:sld>
 </file>
 
@@ -1987,4 +3774,227 @@
     </a:fmtScheme>
   </a:themeElements>
 </a:theme>
+</file>
+
+<file path=ppt/theme/theme2.xml><?xml version="1.0" encoding="utf-8"?>
+<a:theme xmlns:a="http://schemas.openxmlformats.org/drawingml/2006/main" name="Office Theme">
+  <a:themeElements>
+    <a:clrScheme name="Office">
+      <a:dk1>
+        <a:sysClr val="windowText" lastClr="000000"/>
+      </a:dk1>
+      <a:lt1>
+        <a:sysClr val="window" lastClr="FFFFFF"/>
+      </a:lt1>
+      <a:dk2>
+        <a:srgbClr val="1F497D"/>
+      </a:dk2>
+      <a:lt2>
+        <a:srgbClr val="EEECE1"/>
+      </a:lt2>
+      <a:accent1>
+        <a:srgbClr val="4F81BD"/>
+      </a:accent1>
+      <a:accent2>
+        <a:srgbClr val="C0504D"/>
+      </a:accent2>
+      <a:accent3>
+        <a:srgbClr val="9BBB59"/>
+      </a:accent3>
+      <a:accent4>
+        <a:srgbClr val="8064A2"/>
+      </a:accent4>
+      <a:accent5>
+        <a:srgbClr val="4BACC6"/>
+      </a:accent5>
+      <a:accent6>
+        <a:srgbClr val="F79646"/>
+      </a:accent6>
+      <a:hlink>
+        <a:srgbClr val="0000FF"/>
+      </a:hlink>
+      <a:folHlink>
+        <a:srgbClr val="800080"/>
+      </a:folHlink>
+    </a:clrScheme>
+    <a:fontScheme name="Office">
+      <a:majorFont>
+        <a:latin typeface="Arial"/>
+        <a:ea typeface="DejaVu Sans"/>
+        <a:cs typeface="DejaVu Sans"/>
+      </a:majorFont>
+      <a:minorFont>
+        <a:latin typeface="Arial"/>
+        <a:ea typeface="DejaVu Sans"/>
+        <a:cs typeface="DejaVu Sans"/>
+      </a:minorFont>
+    </a:fontScheme>
+    <a:fmtScheme name="Office">
+      <a:fillStyleLst>
+        <a:solidFill>
+          <a:schemeClr val="phClr"/>
+        </a:solidFill>
+        <a:gradFill rotWithShape="1">
+          <a:gsLst>
+            <a:gs pos="0">
+              <a:schemeClr val="phClr">
+                <a:tint val="50000"/>
+                <a:satMod val="300000"/>
+              </a:schemeClr>
+            </a:gs>
+            <a:gs pos="35000">
+              <a:schemeClr val="phClr">
+                <a:tint val="37000"/>
+                <a:satMod val="300000"/>
+              </a:schemeClr>
+            </a:gs>
+            <a:gs pos="100000">
+              <a:schemeClr val="phClr">
+                <a:tint val="15000"/>
+                <a:satMod val="350000"/>
+              </a:schemeClr>
+            </a:gs>
+          </a:gsLst>
+          <a:lin ang="16200000" scaled="1"/>
+        </a:gradFill>
+        <a:gradFill rotWithShape="1">
+          <a:gsLst>
+            <a:gs pos="0">
+              <a:schemeClr val="phClr">
+                <a:shade val="51000"/>
+                <a:satMod val="130000"/>
+              </a:schemeClr>
+            </a:gs>
+            <a:gs pos="80000">
+              <a:schemeClr val="phClr">
+                <a:shade val="93000"/>
+                <a:satMod val="130000"/>
+              </a:schemeClr>
+            </a:gs>
+            <a:gs pos="100000">
+              <a:schemeClr val="phClr">
+                <a:shade val="94000"/>
+                <a:satMod val="135000"/>
+              </a:schemeClr>
+            </a:gs>
+          </a:gsLst>
+          <a:lin ang="16200000" scaled="0"/>
+        </a:gradFill>
+      </a:fillStyleLst>
+      <a:lnStyleLst>
+        <a:ln w="9525" cap="flat" cmpd="sng" algn="ctr">
+          <a:solidFill>
+            <a:schemeClr val="phClr">
+              <a:shade val="95000"/>
+              <a:satMod val="105000"/>
+            </a:schemeClr>
+          </a:solidFill>
+          <a:prstDash val="solid"/>
+        </a:ln>
+        <a:ln w="25400" cap="flat" cmpd="sng" algn="ctr">
+          <a:solidFill>
+            <a:schemeClr val="phClr"/>
+          </a:solidFill>
+          <a:prstDash val="solid"/>
+        </a:ln>
+        <a:ln w="38100" cap="flat" cmpd="sng" algn="ctr">
+          <a:solidFill>
+            <a:schemeClr val="phClr"/>
+          </a:solidFill>
+          <a:prstDash val="solid"/>
+        </a:ln>
+      </a:lnStyleLst>
+      <a:effectStyleLst>
+        <a:effectStyle>
+          <a:effectLst>
+            <a:outerShdw blurRad="40000" dist="20000" dir="5400000" rotWithShape="0">
+              <a:srgbClr val="000000">
+                <a:alpha val="38000"/>
+              </a:srgbClr>
+            </a:outerShdw>
+          </a:effectLst>
+        </a:effectStyle>
+        <a:effectStyle>
+          <a:effectLst>
+            <a:outerShdw blurRad="40000" dist="23000" dir="5400000" rotWithShape="0">
+              <a:srgbClr val="000000">
+                <a:alpha val="35000"/>
+              </a:srgbClr>
+            </a:outerShdw>
+          </a:effectLst>
+        </a:effectStyle>
+        <a:effectStyle>
+          <a:effectLst>
+            <a:outerShdw blurRad="40000" dist="23000" dir="5400000" rotWithShape="0">
+              <a:srgbClr val="000000">
+                <a:alpha val="35000"/>
+              </a:srgbClr>
+            </a:outerShdw>
+          </a:effectLst>
+          <a:scene3d>
+            <a:camera prst="orthographicFront">
+              <a:rot lat="0" lon="0" rev="0"/>
+            </a:camera>
+            <a:lightRig rig="threePt" dir="t">
+              <a:rot lat="0" lon="0" rev="1200000"/>
+            </a:lightRig>
+          </a:scene3d>
+          <a:sp3d>
+            <a:bevelT w="63500" h="25400"/>
+          </a:sp3d>
+        </a:effectStyle>
+      </a:effectStyleLst>
+      <a:bgFillStyleLst>
+        <a:solidFill>
+          <a:schemeClr val="phClr"/>
+        </a:solidFill>
+        <a:gradFill rotWithShape="1">
+          <a:gsLst>
+            <a:gs pos="0">
+              <a:schemeClr val="phClr">
+                <a:tint val="40000"/>
+                <a:satMod val="350000"/>
+              </a:schemeClr>
+            </a:gs>
+            <a:gs pos="40000">
+              <a:schemeClr val="phClr">
+                <a:tint val="45000"/>
+                <a:shade val="99000"/>
+                <a:satMod val="350000"/>
+              </a:schemeClr>
+            </a:gs>
+            <a:gs pos="100000">
+              <a:schemeClr val="phClr">
+                <a:shade val="20000"/>
+                <a:satMod val="255000"/>
+              </a:schemeClr>
+            </a:gs>
+          </a:gsLst>
+          <a:path path="circle">
+            <a:fillToRect l="50000" t="-80000" r="50000" b="180000"/>
+          </a:path>
+        </a:gradFill>
+        <a:gradFill rotWithShape="1">
+          <a:gsLst>
+            <a:gs pos="0">
+              <a:schemeClr val="phClr">
+                <a:tint val="80000"/>
+                <a:satMod val="300000"/>
+              </a:schemeClr>
+            </a:gs>
+            <a:gs pos="100000">
+              <a:schemeClr val="phClr">
+                <a:shade val="30000"/>
+                <a:satMod val="200000"/>
+              </a:schemeClr>
+            </a:gs>
+          </a:gsLst>
+          <a:path path="circle">
+            <a:fillToRect l="50000" t="50000" r="50000" b="50000"/>
+          </a:path>
+        </a:gradFill>
+      </a:bgFillStyleLst>
+    </a:fmtScheme>
+  </a:themeElements>
+</a:theme>
 </file>
</xml_diff>

<commit_message>
Added slide with link to X11 for osx
</commit_message>
<xml_diff>
--- a/Lessons/Lesson_V/Lesson_V_Questions.pptx
+++ b/Lessons/Lesson_V/Lesson_V_Questions.pptx
@@ -11,6 +11,7 @@
     <p:sldId id="258" r:id="rId6"/>
     <p:sldId id="259" r:id="rId7"/>
     <p:sldId id="260" r:id="rId8"/>
+    <p:sldId id="261" r:id="rId9"/>
   </p:sldIdLst>
   <p:sldSz cx="10080625" cy="7559675"/>
   <p:notesSz cx="7559675" cy="10691812"/>
@@ -58,7 +59,7 @@
       </p:grpSpPr>
       <p:sp>
         <p:nvSpPr>
-          <p:cNvPr id="24" name="PlaceHolder 1"/>
+          <p:cNvPr id="23" name="PlaceHolder 1"/>
           <p:cNvSpPr>
             <a:spLocks noGrp="1"/>
           </p:cNvSpPr>
@@ -69,7 +70,7 @@
         <p:spPr>
           <a:xfrm>
             <a:off x="504000" y="301320"/>
-            <a:ext cx="9071280" cy="1261800"/>
+            <a:ext cx="9070920" cy="1261440"/>
           </a:xfrm>
           <a:prstGeom prst="rect">
             <a:avLst/>
@@ -85,7 +86,7 @@
       </p:sp>
       <p:sp>
         <p:nvSpPr>
-          <p:cNvPr id="25" name="PlaceHolder 2"/>
+          <p:cNvPr id="24" name="PlaceHolder 2"/>
           <p:cNvSpPr>
             <a:spLocks noGrp="1"/>
           </p:cNvSpPr>
@@ -96,7 +97,7 @@
         <p:spPr>
           <a:xfrm>
             <a:off x="504000" y="1769040"/>
-            <a:ext cx="9071280" cy="2090880"/>
+            <a:ext cx="9070920" cy="2090880"/>
           </a:xfrm>
           <a:prstGeom prst="rect">
             <a:avLst/>
@@ -111,7 +112,7 @@
       </p:sp>
       <p:sp>
         <p:nvSpPr>
-          <p:cNvPr id="26" name="PlaceHolder 3"/>
+          <p:cNvPr id="25" name="PlaceHolder 3"/>
           <p:cNvSpPr>
             <a:spLocks noGrp="1"/>
           </p:cNvSpPr>
@@ -122,7 +123,7 @@
         <p:spPr>
           <a:xfrm>
             <a:off x="504000" y="4059000"/>
-            <a:ext cx="9071280" cy="2090880"/>
+            <a:ext cx="9070920" cy="2090880"/>
           </a:xfrm>
           <a:prstGeom prst="rect">
             <a:avLst/>
@@ -159,7 +160,7 @@
       </p:grpSpPr>
       <p:sp>
         <p:nvSpPr>
-          <p:cNvPr id="27" name="PlaceHolder 1"/>
+          <p:cNvPr id="26" name="PlaceHolder 1"/>
           <p:cNvSpPr>
             <a:spLocks noGrp="1"/>
           </p:cNvSpPr>
@@ -170,7 +171,7 @@
         <p:spPr>
           <a:xfrm>
             <a:off x="504000" y="301320"/>
-            <a:ext cx="9071280" cy="1261800"/>
+            <a:ext cx="9070920" cy="1261440"/>
           </a:xfrm>
           <a:prstGeom prst="rect">
             <a:avLst/>
@@ -186,7 +187,7 @@
       </p:sp>
       <p:sp>
         <p:nvSpPr>
-          <p:cNvPr id="28" name="PlaceHolder 2"/>
+          <p:cNvPr id="27" name="PlaceHolder 2"/>
           <p:cNvSpPr>
             <a:spLocks noGrp="1"/>
           </p:cNvSpPr>
@@ -212,7 +213,7 @@
       </p:sp>
       <p:sp>
         <p:nvSpPr>
-          <p:cNvPr id="29" name="PlaceHolder 3"/>
+          <p:cNvPr id="28" name="PlaceHolder 3"/>
           <p:cNvSpPr>
             <a:spLocks noGrp="1"/>
           </p:cNvSpPr>
@@ -238,7 +239,7 @@
       </p:sp>
       <p:sp>
         <p:nvSpPr>
-          <p:cNvPr id="30" name="PlaceHolder 4"/>
+          <p:cNvPr id="29" name="PlaceHolder 4"/>
           <p:cNvSpPr>
             <a:spLocks noGrp="1"/>
           </p:cNvSpPr>
@@ -264,7 +265,7 @@
       </p:sp>
       <p:sp>
         <p:nvSpPr>
-          <p:cNvPr id="31" name="PlaceHolder 5"/>
+          <p:cNvPr id="30" name="PlaceHolder 5"/>
           <p:cNvSpPr>
             <a:spLocks noGrp="1"/>
           </p:cNvSpPr>
@@ -312,7 +313,7 @@
       </p:grpSpPr>
       <p:sp>
         <p:nvSpPr>
-          <p:cNvPr id="32" name="PlaceHolder 1"/>
+          <p:cNvPr id="31" name="PlaceHolder 1"/>
           <p:cNvSpPr>
             <a:spLocks noGrp="1"/>
           </p:cNvSpPr>
@@ -323,7 +324,7 @@
         <p:spPr>
           <a:xfrm>
             <a:off x="504000" y="301320"/>
-            <a:ext cx="9071280" cy="1261800"/>
+            <a:ext cx="9070920" cy="1261440"/>
           </a:xfrm>
           <a:prstGeom prst="rect">
             <a:avLst/>
@@ -339,7 +340,7 @@
       </p:sp>
       <p:sp>
         <p:nvSpPr>
-          <p:cNvPr id="33" name="PlaceHolder 2"/>
+          <p:cNvPr id="32" name="PlaceHolder 2"/>
           <p:cNvSpPr>
             <a:spLocks noGrp="1"/>
           </p:cNvSpPr>
@@ -350,7 +351,7 @@
         <p:spPr>
           <a:xfrm>
             <a:off x="504000" y="1769040"/>
-            <a:ext cx="9071280" cy="4384080"/>
+            <a:ext cx="9070920" cy="4383720"/>
           </a:xfrm>
           <a:prstGeom prst="rect">
             <a:avLst/>
@@ -365,7 +366,7 @@
       </p:sp>
       <p:sp>
         <p:nvSpPr>
-          <p:cNvPr id="34" name="PlaceHolder 3"/>
+          <p:cNvPr id="33" name="PlaceHolder 3"/>
           <p:cNvSpPr>
             <a:spLocks noGrp="1"/>
           </p:cNvSpPr>
@@ -376,7 +377,7 @@
         <p:spPr>
           <a:xfrm>
             <a:off x="504000" y="1769040"/>
-            <a:ext cx="9071280" cy="4384080"/>
+            <a:ext cx="9070920" cy="4383720"/>
           </a:xfrm>
           <a:prstGeom prst="rect">
             <a:avLst/>
@@ -389,6 +390,29 @@
           </a:p>
         </p:txBody>
       </p:sp>
+      <p:pic>
+        <p:nvPicPr>
+          <p:cNvPr id="34" name="" descr=""/>
+          <p:cNvPicPr/>
+          <p:nvPr/>
+        </p:nvPicPr>
+        <p:blipFill>
+          <a:blip r:embed="rId2"/>
+          <a:stretch/>
+        </p:blipFill>
+        <p:spPr>
+          <a:xfrm>
+            <a:off x="2292120" y="1768680"/>
+            <a:ext cx="5494320" cy="4383720"/>
+          </a:xfrm>
+          <a:prstGeom prst="rect">
+            <a:avLst/>
+          </a:prstGeom>
+          <a:ln>
+            <a:noFill/>
+          </a:ln>
+        </p:spPr>
+      </p:pic>
       <p:pic>
         <p:nvPicPr>
           <p:cNvPr id="35" name="" descr=""/>
@@ -396,36 +420,13 @@
           <p:nvPr/>
         </p:nvPicPr>
         <p:blipFill>
-          <a:blip r:embed="rId2"/>
-          <a:stretch/>
-        </p:blipFill>
-        <p:spPr>
-          <a:xfrm>
-            <a:off x="2292120" y="1769040"/>
-            <a:ext cx="5494680" cy="4384080"/>
-          </a:xfrm>
-          <a:prstGeom prst="rect">
-            <a:avLst/>
-          </a:prstGeom>
-          <a:ln>
-            <a:noFill/>
-          </a:ln>
-        </p:spPr>
-      </p:pic>
-      <p:pic>
-        <p:nvPicPr>
-          <p:cNvPr id="36" name="" descr=""/>
-          <p:cNvPicPr/>
-          <p:nvPr/>
-        </p:nvPicPr>
-        <p:blipFill>
           <a:blip r:embed="rId3"/>
           <a:stretch/>
         </p:blipFill>
         <p:spPr>
           <a:xfrm>
-            <a:off x="2292120" y="1769040"/>
-            <a:ext cx="5494680" cy="4384080"/>
+            <a:off x="2292120" y="1768680"/>
+            <a:ext cx="5494320" cy="4383720"/>
           </a:xfrm>
           <a:prstGeom prst="rect">
             <a:avLst/>
@@ -481,7 +482,7 @@
       </p:grpSpPr>
       <p:sp>
         <p:nvSpPr>
-          <p:cNvPr id="39" name="PlaceHolder 1"/>
+          <p:cNvPr id="38" name="PlaceHolder 1"/>
           <p:cNvSpPr>
             <a:spLocks noGrp="1"/>
           </p:cNvSpPr>
@@ -492,7 +493,7 @@
         <p:spPr>
           <a:xfrm>
             <a:off x="504000" y="301320"/>
-            <a:ext cx="9071280" cy="1261800"/>
+            <a:ext cx="9070920" cy="1261440"/>
           </a:xfrm>
           <a:prstGeom prst="rect">
             <a:avLst/>
@@ -508,7 +509,7 @@
       </p:sp>
       <p:sp>
         <p:nvSpPr>
-          <p:cNvPr id="40" name="PlaceHolder 2"/>
+          <p:cNvPr id="39" name="PlaceHolder 2"/>
           <p:cNvSpPr>
             <a:spLocks noGrp="1"/>
           </p:cNvSpPr>
@@ -519,7 +520,7 @@
         <p:spPr>
           <a:xfrm>
             <a:off x="504000" y="1769040"/>
-            <a:ext cx="9071280" cy="4384080"/>
+            <a:ext cx="9070920" cy="4383720"/>
           </a:xfrm>
           <a:prstGeom prst="rect">
             <a:avLst/>
@@ -557,7 +558,7 @@
       </p:grpSpPr>
       <p:sp>
         <p:nvSpPr>
-          <p:cNvPr id="41" name="PlaceHolder 1"/>
+          <p:cNvPr id="40" name="PlaceHolder 1"/>
           <p:cNvSpPr>
             <a:spLocks noGrp="1"/>
           </p:cNvSpPr>
@@ -568,7 +569,7 @@
         <p:spPr>
           <a:xfrm>
             <a:off x="504000" y="301320"/>
-            <a:ext cx="9071280" cy="1261800"/>
+            <a:ext cx="9070920" cy="1261440"/>
           </a:xfrm>
           <a:prstGeom prst="rect">
             <a:avLst/>
@@ -584,7 +585,7 @@
       </p:sp>
       <p:sp>
         <p:nvSpPr>
-          <p:cNvPr id="42" name="PlaceHolder 2"/>
+          <p:cNvPr id="41" name="PlaceHolder 2"/>
           <p:cNvSpPr>
             <a:spLocks noGrp="1"/>
           </p:cNvSpPr>
@@ -595,7 +596,7 @@
         <p:spPr>
           <a:xfrm>
             <a:off x="504000" y="1769040"/>
-            <a:ext cx="9071280" cy="4384080"/>
+            <a:ext cx="9070920" cy="4383720"/>
           </a:xfrm>
           <a:prstGeom prst="rect">
             <a:avLst/>
@@ -632,7 +633,7 @@
       </p:grpSpPr>
       <p:sp>
         <p:nvSpPr>
-          <p:cNvPr id="43" name="PlaceHolder 1"/>
+          <p:cNvPr id="42" name="PlaceHolder 1"/>
           <p:cNvSpPr>
             <a:spLocks noGrp="1"/>
           </p:cNvSpPr>
@@ -643,7 +644,7 @@
         <p:spPr>
           <a:xfrm>
             <a:off x="504000" y="301320"/>
-            <a:ext cx="9071280" cy="1261800"/>
+            <a:ext cx="9070920" cy="1261440"/>
           </a:xfrm>
           <a:prstGeom prst="rect">
             <a:avLst/>
@@ -659,7 +660,7 @@
       </p:sp>
       <p:sp>
         <p:nvSpPr>
-          <p:cNvPr id="44" name="PlaceHolder 2"/>
+          <p:cNvPr id="43" name="PlaceHolder 2"/>
           <p:cNvSpPr>
             <a:spLocks noGrp="1"/>
           </p:cNvSpPr>
@@ -670,7 +671,7 @@
         <p:spPr>
           <a:xfrm>
             <a:off x="504000" y="1769040"/>
-            <a:ext cx="4426560" cy="4384080"/>
+            <a:ext cx="4426560" cy="4383720"/>
           </a:xfrm>
           <a:prstGeom prst="rect">
             <a:avLst/>
@@ -685,7 +686,7 @@
       </p:sp>
       <p:sp>
         <p:nvSpPr>
-          <p:cNvPr id="45" name="PlaceHolder 3"/>
+          <p:cNvPr id="44" name="PlaceHolder 3"/>
           <p:cNvSpPr>
             <a:spLocks noGrp="1"/>
           </p:cNvSpPr>
@@ -696,7 +697,7 @@
         <p:spPr>
           <a:xfrm>
             <a:off x="5152320" y="1769040"/>
-            <a:ext cx="4426560" cy="4384080"/>
+            <a:ext cx="4426560" cy="4383720"/>
           </a:xfrm>
           <a:prstGeom prst="rect">
             <a:avLst/>
@@ -733,7 +734,7 @@
       </p:grpSpPr>
       <p:sp>
         <p:nvSpPr>
-          <p:cNvPr id="46" name="PlaceHolder 1"/>
+          <p:cNvPr id="45" name="PlaceHolder 1"/>
           <p:cNvSpPr>
             <a:spLocks noGrp="1"/>
           </p:cNvSpPr>
@@ -744,7 +745,7 @@
         <p:spPr>
           <a:xfrm>
             <a:off x="504000" y="301320"/>
-            <a:ext cx="9071280" cy="1261800"/>
+            <a:ext cx="9070920" cy="1261440"/>
           </a:xfrm>
           <a:prstGeom prst="rect">
             <a:avLst/>
@@ -782,7 +783,7 @@
       </p:grpSpPr>
       <p:sp>
         <p:nvSpPr>
-          <p:cNvPr id="47" name="PlaceHolder 1"/>
+          <p:cNvPr id="46" name="PlaceHolder 1"/>
           <p:cNvSpPr>
             <a:spLocks noGrp="1"/>
           </p:cNvSpPr>
@@ -793,7 +794,7 @@
         <p:spPr>
           <a:xfrm>
             <a:off x="504000" y="301320"/>
-            <a:ext cx="9071280" cy="5850360"/>
+            <a:ext cx="9070920" cy="5848560"/>
           </a:xfrm>
           <a:prstGeom prst="rect">
             <a:avLst/>
@@ -831,7 +832,7 @@
       </p:grpSpPr>
       <p:sp>
         <p:nvSpPr>
-          <p:cNvPr id="48" name="PlaceHolder 1"/>
+          <p:cNvPr id="47" name="PlaceHolder 1"/>
           <p:cNvSpPr>
             <a:spLocks noGrp="1"/>
           </p:cNvSpPr>
@@ -842,7 +843,7 @@
         <p:spPr>
           <a:xfrm>
             <a:off x="504000" y="301320"/>
-            <a:ext cx="9071280" cy="1261800"/>
+            <a:ext cx="9070920" cy="1261440"/>
           </a:xfrm>
           <a:prstGeom prst="rect">
             <a:avLst/>
@@ -858,7 +859,7 @@
       </p:sp>
       <p:sp>
         <p:nvSpPr>
-          <p:cNvPr id="49" name="PlaceHolder 2"/>
+          <p:cNvPr id="48" name="PlaceHolder 2"/>
           <p:cNvSpPr>
             <a:spLocks noGrp="1"/>
           </p:cNvSpPr>
@@ -884,7 +885,7 @@
       </p:sp>
       <p:sp>
         <p:nvSpPr>
-          <p:cNvPr id="50" name="PlaceHolder 3"/>
+          <p:cNvPr id="49" name="PlaceHolder 3"/>
           <p:cNvSpPr>
             <a:spLocks noGrp="1"/>
           </p:cNvSpPr>
@@ -910,7 +911,7 @@
       </p:sp>
       <p:sp>
         <p:nvSpPr>
-          <p:cNvPr id="51" name="PlaceHolder 4"/>
+          <p:cNvPr id="50" name="PlaceHolder 4"/>
           <p:cNvSpPr>
             <a:spLocks noGrp="1"/>
           </p:cNvSpPr>
@@ -921,7 +922,7 @@
         <p:spPr>
           <a:xfrm>
             <a:off x="5152320" y="1769040"/>
-            <a:ext cx="4426560" cy="4384080"/>
+            <a:ext cx="4426560" cy="4383720"/>
           </a:xfrm>
           <a:prstGeom prst="rect">
             <a:avLst/>
@@ -958,7 +959,7 @@
       </p:grpSpPr>
       <p:sp>
         <p:nvSpPr>
-          <p:cNvPr id="3" name="PlaceHolder 1"/>
+          <p:cNvPr id="2" name="PlaceHolder 1"/>
           <p:cNvSpPr>
             <a:spLocks noGrp="1"/>
           </p:cNvSpPr>
@@ -969,7 +970,7 @@
         <p:spPr>
           <a:xfrm>
             <a:off x="504000" y="301320"/>
-            <a:ext cx="9071280" cy="1261800"/>
+            <a:ext cx="9070920" cy="1261440"/>
           </a:xfrm>
           <a:prstGeom prst="rect">
             <a:avLst/>
@@ -985,7 +986,7 @@
       </p:sp>
       <p:sp>
         <p:nvSpPr>
-          <p:cNvPr id="4" name="PlaceHolder 2"/>
+          <p:cNvPr id="3" name="PlaceHolder 2"/>
           <p:cNvSpPr>
             <a:spLocks noGrp="1"/>
           </p:cNvSpPr>
@@ -996,7 +997,7 @@
         <p:spPr>
           <a:xfrm>
             <a:off x="504000" y="1769040"/>
-            <a:ext cx="9071280" cy="4384080"/>
+            <a:ext cx="9070920" cy="4383720"/>
           </a:xfrm>
           <a:prstGeom prst="rect">
             <a:avLst/>
@@ -1034,7 +1035,7 @@
       </p:grpSpPr>
       <p:sp>
         <p:nvSpPr>
-          <p:cNvPr id="52" name="PlaceHolder 1"/>
+          <p:cNvPr id="51" name="PlaceHolder 1"/>
           <p:cNvSpPr>
             <a:spLocks noGrp="1"/>
           </p:cNvSpPr>
@@ -1045,7 +1046,7 @@
         <p:spPr>
           <a:xfrm>
             <a:off x="504000" y="301320"/>
-            <a:ext cx="9071280" cy="1261800"/>
+            <a:ext cx="9070920" cy="1261440"/>
           </a:xfrm>
           <a:prstGeom prst="rect">
             <a:avLst/>
@@ -1061,7 +1062,7 @@
       </p:sp>
       <p:sp>
         <p:nvSpPr>
-          <p:cNvPr id="53" name="PlaceHolder 2"/>
+          <p:cNvPr id="52" name="PlaceHolder 2"/>
           <p:cNvSpPr>
             <a:spLocks noGrp="1"/>
           </p:cNvSpPr>
@@ -1072,7 +1073,7 @@
         <p:spPr>
           <a:xfrm>
             <a:off x="504000" y="1769040"/>
-            <a:ext cx="4426560" cy="4384080"/>
+            <a:ext cx="4426560" cy="4383720"/>
           </a:xfrm>
           <a:prstGeom prst="rect">
             <a:avLst/>
@@ -1087,7 +1088,7 @@
       </p:sp>
       <p:sp>
         <p:nvSpPr>
-          <p:cNvPr id="54" name="PlaceHolder 3"/>
+          <p:cNvPr id="53" name="PlaceHolder 3"/>
           <p:cNvSpPr>
             <a:spLocks noGrp="1"/>
           </p:cNvSpPr>
@@ -1113,7 +1114,7 @@
       </p:sp>
       <p:sp>
         <p:nvSpPr>
-          <p:cNvPr id="55" name="PlaceHolder 4"/>
+          <p:cNvPr id="54" name="PlaceHolder 4"/>
           <p:cNvSpPr>
             <a:spLocks noGrp="1"/>
           </p:cNvSpPr>
@@ -1161,7 +1162,7 @@
       </p:grpSpPr>
       <p:sp>
         <p:nvSpPr>
-          <p:cNvPr id="56" name="PlaceHolder 1"/>
+          <p:cNvPr id="55" name="PlaceHolder 1"/>
           <p:cNvSpPr>
             <a:spLocks noGrp="1"/>
           </p:cNvSpPr>
@@ -1172,7 +1173,7 @@
         <p:spPr>
           <a:xfrm>
             <a:off x="504000" y="301320"/>
-            <a:ext cx="9071280" cy="1261800"/>
+            <a:ext cx="9070920" cy="1261440"/>
           </a:xfrm>
           <a:prstGeom prst="rect">
             <a:avLst/>
@@ -1188,7 +1189,7 @@
       </p:sp>
       <p:sp>
         <p:nvSpPr>
-          <p:cNvPr id="57" name="PlaceHolder 2"/>
+          <p:cNvPr id="56" name="PlaceHolder 2"/>
           <p:cNvSpPr>
             <a:spLocks noGrp="1"/>
           </p:cNvSpPr>
@@ -1214,7 +1215,7 @@
       </p:sp>
       <p:sp>
         <p:nvSpPr>
-          <p:cNvPr id="58" name="PlaceHolder 3"/>
+          <p:cNvPr id="57" name="PlaceHolder 3"/>
           <p:cNvSpPr>
             <a:spLocks noGrp="1"/>
           </p:cNvSpPr>
@@ -1240,7 +1241,7 @@
       </p:sp>
       <p:sp>
         <p:nvSpPr>
-          <p:cNvPr id="59" name="PlaceHolder 4"/>
+          <p:cNvPr id="58" name="PlaceHolder 4"/>
           <p:cNvSpPr>
             <a:spLocks noGrp="1"/>
           </p:cNvSpPr>
@@ -1251,7 +1252,7 @@
         <p:spPr>
           <a:xfrm>
             <a:off x="504000" y="4059000"/>
-            <a:ext cx="9071280" cy="2090880"/>
+            <a:ext cx="9070920" cy="2090880"/>
           </a:xfrm>
           <a:prstGeom prst="rect">
             <a:avLst/>
@@ -1288,7 +1289,7 @@
       </p:grpSpPr>
       <p:sp>
         <p:nvSpPr>
-          <p:cNvPr id="60" name="PlaceHolder 1"/>
+          <p:cNvPr id="59" name="PlaceHolder 1"/>
           <p:cNvSpPr>
             <a:spLocks noGrp="1"/>
           </p:cNvSpPr>
@@ -1299,7 +1300,7 @@
         <p:spPr>
           <a:xfrm>
             <a:off x="504000" y="301320"/>
-            <a:ext cx="9071280" cy="1261800"/>
+            <a:ext cx="9070920" cy="1261440"/>
           </a:xfrm>
           <a:prstGeom prst="rect">
             <a:avLst/>
@@ -1315,7 +1316,7 @@
       </p:sp>
       <p:sp>
         <p:nvSpPr>
-          <p:cNvPr id="61" name="PlaceHolder 2"/>
+          <p:cNvPr id="60" name="PlaceHolder 2"/>
           <p:cNvSpPr>
             <a:spLocks noGrp="1"/>
           </p:cNvSpPr>
@@ -1326,7 +1327,7 @@
         <p:spPr>
           <a:xfrm>
             <a:off x="504000" y="1769040"/>
-            <a:ext cx="9071280" cy="2090880"/>
+            <a:ext cx="9070920" cy="2090880"/>
           </a:xfrm>
           <a:prstGeom prst="rect">
             <a:avLst/>
@@ -1341,7 +1342,7 @@
       </p:sp>
       <p:sp>
         <p:nvSpPr>
-          <p:cNvPr id="62" name="PlaceHolder 3"/>
+          <p:cNvPr id="61" name="PlaceHolder 3"/>
           <p:cNvSpPr>
             <a:spLocks noGrp="1"/>
           </p:cNvSpPr>
@@ -1352,7 +1353,7 @@
         <p:spPr>
           <a:xfrm>
             <a:off x="504000" y="4059000"/>
-            <a:ext cx="9071280" cy="2090880"/>
+            <a:ext cx="9070920" cy="2090880"/>
           </a:xfrm>
           <a:prstGeom prst="rect">
             <a:avLst/>
@@ -1389,7 +1390,7 @@
       </p:grpSpPr>
       <p:sp>
         <p:nvSpPr>
-          <p:cNvPr id="63" name="PlaceHolder 1"/>
+          <p:cNvPr id="62" name="PlaceHolder 1"/>
           <p:cNvSpPr>
             <a:spLocks noGrp="1"/>
           </p:cNvSpPr>
@@ -1400,7 +1401,7 @@
         <p:spPr>
           <a:xfrm>
             <a:off x="504000" y="301320"/>
-            <a:ext cx="9071280" cy="1261800"/>
+            <a:ext cx="9070920" cy="1261440"/>
           </a:xfrm>
           <a:prstGeom prst="rect">
             <a:avLst/>
@@ -1416,7 +1417,7 @@
       </p:sp>
       <p:sp>
         <p:nvSpPr>
-          <p:cNvPr id="64" name="PlaceHolder 2"/>
+          <p:cNvPr id="63" name="PlaceHolder 2"/>
           <p:cNvSpPr>
             <a:spLocks noGrp="1"/>
           </p:cNvSpPr>
@@ -1442,7 +1443,7 @@
       </p:sp>
       <p:sp>
         <p:nvSpPr>
-          <p:cNvPr id="65" name="PlaceHolder 3"/>
+          <p:cNvPr id="64" name="PlaceHolder 3"/>
           <p:cNvSpPr>
             <a:spLocks noGrp="1"/>
           </p:cNvSpPr>
@@ -1468,7 +1469,7 @@
       </p:sp>
       <p:sp>
         <p:nvSpPr>
-          <p:cNvPr id="66" name="PlaceHolder 4"/>
+          <p:cNvPr id="65" name="PlaceHolder 4"/>
           <p:cNvSpPr>
             <a:spLocks noGrp="1"/>
           </p:cNvSpPr>
@@ -1494,7 +1495,7 @@
       </p:sp>
       <p:sp>
         <p:nvSpPr>
-          <p:cNvPr id="67" name="PlaceHolder 5"/>
+          <p:cNvPr id="66" name="PlaceHolder 5"/>
           <p:cNvSpPr>
             <a:spLocks noGrp="1"/>
           </p:cNvSpPr>
@@ -1542,7 +1543,7 @@
       </p:grpSpPr>
       <p:sp>
         <p:nvSpPr>
-          <p:cNvPr id="68" name="PlaceHolder 1"/>
+          <p:cNvPr id="67" name="PlaceHolder 1"/>
           <p:cNvSpPr>
             <a:spLocks noGrp="1"/>
           </p:cNvSpPr>
@@ -1553,7 +1554,7 @@
         <p:spPr>
           <a:xfrm>
             <a:off x="504000" y="301320"/>
-            <a:ext cx="9071280" cy="1261800"/>
+            <a:ext cx="9070920" cy="1261440"/>
           </a:xfrm>
           <a:prstGeom prst="rect">
             <a:avLst/>
@@ -1569,7 +1570,7 @@
       </p:sp>
       <p:sp>
         <p:nvSpPr>
-          <p:cNvPr id="69" name="PlaceHolder 2"/>
+          <p:cNvPr id="68" name="PlaceHolder 2"/>
           <p:cNvSpPr>
             <a:spLocks noGrp="1"/>
           </p:cNvSpPr>
@@ -1580,7 +1581,7 @@
         <p:spPr>
           <a:xfrm>
             <a:off x="504000" y="1769040"/>
-            <a:ext cx="9071280" cy="4384080"/>
+            <a:ext cx="9070920" cy="4383720"/>
           </a:xfrm>
           <a:prstGeom prst="rect">
             <a:avLst/>
@@ -1595,7 +1596,7 @@
       </p:sp>
       <p:sp>
         <p:nvSpPr>
-          <p:cNvPr id="70" name="PlaceHolder 3"/>
+          <p:cNvPr id="69" name="PlaceHolder 3"/>
           <p:cNvSpPr>
             <a:spLocks noGrp="1"/>
           </p:cNvSpPr>
@@ -1606,7 +1607,7 @@
         <p:spPr>
           <a:xfrm>
             <a:off x="504000" y="1769040"/>
-            <a:ext cx="9071280" cy="4384080"/>
+            <a:ext cx="9070920" cy="4383720"/>
           </a:xfrm>
           <a:prstGeom prst="rect">
             <a:avLst/>
@@ -1619,6 +1620,29 @@
           </a:p>
         </p:txBody>
       </p:sp>
+      <p:pic>
+        <p:nvPicPr>
+          <p:cNvPr id="70" name="" descr=""/>
+          <p:cNvPicPr/>
+          <p:nvPr/>
+        </p:nvPicPr>
+        <p:blipFill>
+          <a:blip r:embed="rId2"/>
+          <a:stretch/>
+        </p:blipFill>
+        <p:spPr>
+          <a:xfrm>
+            <a:off x="2292120" y="1768680"/>
+            <a:ext cx="5494320" cy="4383720"/>
+          </a:xfrm>
+          <a:prstGeom prst="rect">
+            <a:avLst/>
+          </a:prstGeom>
+          <a:ln>
+            <a:noFill/>
+          </a:ln>
+        </p:spPr>
+      </p:pic>
       <p:pic>
         <p:nvPicPr>
           <p:cNvPr id="71" name="" descr=""/>
@@ -1626,36 +1650,13 @@
           <p:nvPr/>
         </p:nvPicPr>
         <p:blipFill>
-          <a:blip r:embed="rId2"/>
-          <a:stretch/>
-        </p:blipFill>
-        <p:spPr>
-          <a:xfrm>
-            <a:off x="2292120" y="1769040"/>
-            <a:ext cx="5494680" cy="4384080"/>
-          </a:xfrm>
-          <a:prstGeom prst="rect">
-            <a:avLst/>
-          </a:prstGeom>
-          <a:ln>
-            <a:noFill/>
-          </a:ln>
-        </p:spPr>
-      </p:pic>
-      <p:pic>
-        <p:nvPicPr>
-          <p:cNvPr id="72" name="" descr=""/>
-          <p:cNvPicPr/>
-          <p:nvPr/>
-        </p:nvPicPr>
-        <p:blipFill>
           <a:blip r:embed="rId3"/>
           <a:stretch/>
         </p:blipFill>
         <p:spPr>
           <a:xfrm>
-            <a:off x="2292120" y="1769040"/>
-            <a:ext cx="5494680" cy="4384080"/>
+            <a:off x="2292120" y="1768680"/>
+            <a:ext cx="5494320" cy="4383720"/>
           </a:xfrm>
           <a:prstGeom prst="rect">
             <a:avLst/>
@@ -1689,7 +1690,7 @@
       </p:grpSpPr>
       <p:sp>
         <p:nvSpPr>
-          <p:cNvPr id="5" name="PlaceHolder 1"/>
+          <p:cNvPr id="4" name="PlaceHolder 1"/>
           <p:cNvSpPr>
             <a:spLocks noGrp="1"/>
           </p:cNvSpPr>
@@ -1700,7 +1701,7 @@
         <p:spPr>
           <a:xfrm>
             <a:off x="504000" y="301320"/>
-            <a:ext cx="9071280" cy="1261800"/>
+            <a:ext cx="9070920" cy="1261440"/>
           </a:xfrm>
           <a:prstGeom prst="rect">
             <a:avLst/>
@@ -1716,7 +1717,7 @@
       </p:sp>
       <p:sp>
         <p:nvSpPr>
-          <p:cNvPr id="6" name="PlaceHolder 2"/>
+          <p:cNvPr id="5" name="PlaceHolder 2"/>
           <p:cNvSpPr>
             <a:spLocks noGrp="1"/>
           </p:cNvSpPr>
@@ -1727,7 +1728,7 @@
         <p:spPr>
           <a:xfrm>
             <a:off x="504000" y="1769040"/>
-            <a:ext cx="9071280" cy="4384080"/>
+            <a:ext cx="9070920" cy="4383720"/>
           </a:xfrm>
           <a:prstGeom prst="rect">
             <a:avLst/>
@@ -1764,7 +1765,7 @@
       </p:grpSpPr>
       <p:sp>
         <p:nvSpPr>
-          <p:cNvPr id="7" name="PlaceHolder 1"/>
+          <p:cNvPr id="6" name="PlaceHolder 1"/>
           <p:cNvSpPr>
             <a:spLocks noGrp="1"/>
           </p:cNvSpPr>
@@ -1775,7 +1776,7 @@
         <p:spPr>
           <a:xfrm>
             <a:off x="504000" y="301320"/>
-            <a:ext cx="9071280" cy="1261800"/>
+            <a:ext cx="9070920" cy="1261440"/>
           </a:xfrm>
           <a:prstGeom prst="rect">
             <a:avLst/>
@@ -1791,7 +1792,7 @@
       </p:sp>
       <p:sp>
         <p:nvSpPr>
-          <p:cNvPr id="8" name="PlaceHolder 2"/>
+          <p:cNvPr id="7" name="PlaceHolder 2"/>
           <p:cNvSpPr>
             <a:spLocks noGrp="1"/>
           </p:cNvSpPr>
@@ -1802,7 +1803,7 @@
         <p:spPr>
           <a:xfrm>
             <a:off x="504000" y="1769040"/>
-            <a:ext cx="4426560" cy="4384080"/>
+            <a:ext cx="4426560" cy="4383720"/>
           </a:xfrm>
           <a:prstGeom prst="rect">
             <a:avLst/>
@@ -1817,7 +1818,7 @@
       </p:sp>
       <p:sp>
         <p:nvSpPr>
-          <p:cNvPr id="9" name="PlaceHolder 3"/>
+          <p:cNvPr id="8" name="PlaceHolder 3"/>
           <p:cNvSpPr>
             <a:spLocks noGrp="1"/>
           </p:cNvSpPr>
@@ -1828,7 +1829,7 @@
         <p:spPr>
           <a:xfrm>
             <a:off x="5152320" y="1769040"/>
-            <a:ext cx="4426560" cy="4384080"/>
+            <a:ext cx="4426560" cy="4383720"/>
           </a:xfrm>
           <a:prstGeom prst="rect">
             <a:avLst/>
@@ -1865,7 +1866,7 @@
       </p:grpSpPr>
       <p:sp>
         <p:nvSpPr>
-          <p:cNvPr id="10" name="PlaceHolder 1"/>
+          <p:cNvPr id="9" name="PlaceHolder 1"/>
           <p:cNvSpPr>
             <a:spLocks noGrp="1"/>
           </p:cNvSpPr>
@@ -1876,7 +1877,7 @@
         <p:spPr>
           <a:xfrm>
             <a:off x="504000" y="301320"/>
-            <a:ext cx="9071280" cy="1261800"/>
+            <a:ext cx="9070920" cy="1261440"/>
           </a:xfrm>
           <a:prstGeom prst="rect">
             <a:avLst/>
@@ -1914,7 +1915,7 @@
       </p:grpSpPr>
       <p:sp>
         <p:nvSpPr>
-          <p:cNvPr id="11" name="PlaceHolder 1"/>
+          <p:cNvPr id="10" name="PlaceHolder 1"/>
           <p:cNvSpPr>
             <a:spLocks noGrp="1"/>
           </p:cNvSpPr>
@@ -1925,7 +1926,7 @@
         <p:spPr>
           <a:xfrm>
             <a:off x="504000" y="301320"/>
-            <a:ext cx="9071280" cy="5850360"/>
+            <a:ext cx="9070920" cy="5848560"/>
           </a:xfrm>
           <a:prstGeom prst="rect">
             <a:avLst/>
@@ -1963,7 +1964,7 @@
       </p:grpSpPr>
       <p:sp>
         <p:nvSpPr>
-          <p:cNvPr id="12" name="PlaceHolder 1"/>
+          <p:cNvPr id="11" name="PlaceHolder 1"/>
           <p:cNvSpPr>
             <a:spLocks noGrp="1"/>
           </p:cNvSpPr>
@@ -1974,7 +1975,7 @@
         <p:spPr>
           <a:xfrm>
             <a:off x="504000" y="301320"/>
-            <a:ext cx="9071280" cy="1261800"/>
+            <a:ext cx="9070920" cy="1261440"/>
           </a:xfrm>
           <a:prstGeom prst="rect">
             <a:avLst/>
@@ -1990,7 +1991,7 @@
       </p:sp>
       <p:sp>
         <p:nvSpPr>
-          <p:cNvPr id="13" name="PlaceHolder 2"/>
+          <p:cNvPr id="12" name="PlaceHolder 2"/>
           <p:cNvSpPr>
             <a:spLocks noGrp="1"/>
           </p:cNvSpPr>
@@ -2016,7 +2017,7 @@
       </p:sp>
       <p:sp>
         <p:nvSpPr>
-          <p:cNvPr id="14" name="PlaceHolder 3"/>
+          <p:cNvPr id="13" name="PlaceHolder 3"/>
           <p:cNvSpPr>
             <a:spLocks noGrp="1"/>
           </p:cNvSpPr>
@@ -2042,7 +2043,7 @@
       </p:sp>
       <p:sp>
         <p:nvSpPr>
-          <p:cNvPr id="15" name="PlaceHolder 4"/>
+          <p:cNvPr id="14" name="PlaceHolder 4"/>
           <p:cNvSpPr>
             <a:spLocks noGrp="1"/>
           </p:cNvSpPr>
@@ -2053,7 +2054,7 @@
         <p:spPr>
           <a:xfrm>
             <a:off x="5152320" y="1769040"/>
-            <a:ext cx="4426560" cy="4384080"/>
+            <a:ext cx="4426560" cy="4383720"/>
           </a:xfrm>
           <a:prstGeom prst="rect">
             <a:avLst/>
@@ -2090,7 +2091,7 @@
       </p:grpSpPr>
       <p:sp>
         <p:nvSpPr>
-          <p:cNvPr id="16" name="PlaceHolder 1"/>
+          <p:cNvPr id="15" name="PlaceHolder 1"/>
           <p:cNvSpPr>
             <a:spLocks noGrp="1"/>
           </p:cNvSpPr>
@@ -2101,7 +2102,7 @@
         <p:spPr>
           <a:xfrm>
             <a:off x="504000" y="301320"/>
-            <a:ext cx="9071280" cy="1261800"/>
+            <a:ext cx="9070920" cy="1261440"/>
           </a:xfrm>
           <a:prstGeom prst="rect">
             <a:avLst/>
@@ -2117,7 +2118,7 @@
       </p:sp>
       <p:sp>
         <p:nvSpPr>
-          <p:cNvPr id="17" name="PlaceHolder 2"/>
+          <p:cNvPr id="16" name="PlaceHolder 2"/>
           <p:cNvSpPr>
             <a:spLocks noGrp="1"/>
           </p:cNvSpPr>
@@ -2128,7 +2129,7 @@
         <p:spPr>
           <a:xfrm>
             <a:off x="504000" y="1769040"/>
-            <a:ext cx="4426560" cy="4384080"/>
+            <a:ext cx="4426560" cy="4383720"/>
           </a:xfrm>
           <a:prstGeom prst="rect">
             <a:avLst/>
@@ -2143,7 +2144,7 @@
       </p:sp>
       <p:sp>
         <p:nvSpPr>
-          <p:cNvPr id="18" name="PlaceHolder 3"/>
+          <p:cNvPr id="17" name="PlaceHolder 3"/>
           <p:cNvSpPr>
             <a:spLocks noGrp="1"/>
           </p:cNvSpPr>
@@ -2169,7 +2170,7 @@
       </p:sp>
       <p:sp>
         <p:nvSpPr>
-          <p:cNvPr id="19" name="PlaceHolder 4"/>
+          <p:cNvPr id="18" name="PlaceHolder 4"/>
           <p:cNvSpPr>
             <a:spLocks noGrp="1"/>
           </p:cNvSpPr>
@@ -2217,7 +2218,7 @@
       </p:grpSpPr>
       <p:sp>
         <p:nvSpPr>
-          <p:cNvPr id="20" name="PlaceHolder 1"/>
+          <p:cNvPr id="19" name="PlaceHolder 1"/>
           <p:cNvSpPr>
             <a:spLocks noGrp="1"/>
           </p:cNvSpPr>
@@ -2228,7 +2229,7 @@
         <p:spPr>
           <a:xfrm>
             <a:off x="504000" y="301320"/>
-            <a:ext cx="9071280" cy="1261800"/>
+            <a:ext cx="9070920" cy="1261440"/>
           </a:xfrm>
           <a:prstGeom prst="rect">
             <a:avLst/>
@@ -2244,7 +2245,7 @@
       </p:sp>
       <p:sp>
         <p:nvSpPr>
-          <p:cNvPr id="21" name="PlaceHolder 2"/>
+          <p:cNvPr id="20" name="PlaceHolder 2"/>
           <p:cNvSpPr>
             <a:spLocks noGrp="1"/>
           </p:cNvSpPr>
@@ -2270,7 +2271,7 @@
       </p:sp>
       <p:sp>
         <p:nvSpPr>
-          <p:cNvPr id="22" name="PlaceHolder 3"/>
+          <p:cNvPr id="21" name="PlaceHolder 3"/>
           <p:cNvSpPr>
             <a:spLocks noGrp="1"/>
           </p:cNvSpPr>
@@ -2296,7 +2297,7 @@
       </p:sp>
       <p:sp>
         <p:nvSpPr>
-          <p:cNvPr id="23" name="PlaceHolder 4"/>
+          <p:cNvPr id="22" name="PlaceHolder 4"/>
           <p:cNvSpPr>
             <a:spLocks noGrp="1"/>
           </p:cNvSpPr>
@@ -2307,7 +2308,7 @@
         <p:spPr>
           <a:xfrm>
             <a:off x="504000" y="4059000"/>
-            <a:ext cx="9071280" cy="2090880"/>
+            <a:ext cx="9070920" cy="2090880"/>
           </a:xfrm>
           <a:prstGeom prst="rect">
             <a:avLst/>
@@ -2355,7 +2356,7 @@
         <p:spPr>
           <a:xfrm>
             <a:off x="504000" y="301320"/>
-            <a:ext cx="9071280" cy="1261800"/>
+            <a:ext cx="9070920" cy="1261440"/>
           </a:xfrm>
           <a:prstGeom prst="rect">
             <a:avLst/>
@@ -2376,40 +2377,13 @@
             <a:spLocks noGrp="1"/>
           </p:cNvSpPr>
           <p:nvPr>
-            <p:ph type="subTitle"/>
+            <p:ph type="body"/>
           </p:nvPr>
         </p:nvSpPr>
         <p:spPr>
           <a:xfrm>
             <a:off x="504000" y="1769040"/>
-            <a:ext cx="9071280" cy="4384080"/>
-          </a:xfrm>
-          <a:prstGeom prst="rect">
-            <a:avLst/>
-          </a:prstGeom>
-        </p:spPr>
-        <p:txBody>
-          <a:bodyPr lIns="0" rIns="0" tIns="0" bIns="0" anchor="ctr"/>
-          <a:p>
-            <a:pPr algn="ctr"/>
-            <a:endParaRPr/>
-          </a:p>
-        </p:txBody>
-      </p:sp>
-      <p:sp>
-        <p:nvSpPr>
-          <p:cNvPr id="2" name="PlaceHolder 3"/>
-          <p:cNvSpPr>
-            <a:spLocks noGrp="1"/>
-          </p:cNvSpPr>
-          <p:nvPr>
-            <p:ph type="body"/>
-          </p:nvPr>
-        </p:nvSpPr>
-        <p:spPr>
-          <a:xfrm>
-            <a:off x="504000" y="1768680"/>
-            <a:ext cx="9072000" cy="4384080"/>
+            <a:ext cx="9070920" cy="4383720"/>
           </a:xfrm>
           <a:prstGeom prst="rect">
             <a:avLst/>
@@ -2424,7 +2398,7 @@
               <a:buChar char=""/>
             </a:pPr>
             <a:r>
-              <a:rPr lang="en-AU" sz="3200">
+              <a:rPr lang="en-AU">
                 <a:latin typeface="Arial"/>
               </a:rPr>
               <a:t>Click to edit the outline text format</a:t>
@@ -2438,7 +2412,7 @@
               <a:buChar char=""/>
             </a:pPr>
             <a:r>
-              <a:rPr lang="en-AU" sz="2800">
+              <a:rPr lang="en-AU">
                 <a:latin typeface="Arial"/>
               </a:rPr>
               <a:t>Second Outline Level</a:t>
@@ -2452,7 +2426,7 @@
               <a:buChar char=""/>
             </a:pPr>
             <a:r>
-              <a:rPr lang="en-AU" sz="2400">
+              <a:rPr lang="en-AU">
                 <a:latin typeface="Arial"/>
               </a:rPr>
               <a:t>Third Outline Level</a:t>
@@ -2466,7 +2440,7 @@
               <a:buChar char=""/>
             </a:pPr>
             <a:r>
-              <a:rPr lang="en-AU" sz="2000">
+              <a:rPr lang="en-AU">
                 <a:latin typeface="Arial"/>
               </a:rPr>
               <a:t>Fourth Outline Level</a:t>
@@ -2480,7 +2454,7 @@
               <a:buChar char=""/>
             </a:pPr>
             <a:r>
-              <a:rPr lang="en-AU" sz="2000">
+              <a:rPr lang="en-AU">
                 <a:latin typeface="Arial"/>
               </a:rPr>
               <a:t>Fifth Outline Level</a:t>
@@ -2494,7 +2468,7 @@
               <a:buChar char=""/>
             </a:pPr>
             <a:r>
-              <a:rPr lang="en-AU" sz="2000">
+              <a:rPr lang="en-AU">
                 <a:latin typeface="Arial"/>
               </a:rPr>
               <a:t>Sixth Outline Level</a:t>
@@ -2508,7 +2482,7 @@
               <a:buChar char=""/>
             </a:pPr>
             <a:r>
-              <a:rPr lang="en-AU" sz="2000">
+              <a:rPr lang="en-AU">
                 <a:latin typeface="Arial"/>
               </a:rPr>
               <a:t>Seventh Outline Level</a:t>
@@ -2556,7 +2530,7 @@
       </p:grpSpPr>
       <p:sp>
         <p:nvSpPr>
-          <p:cNvPr id="37" name="PlaceHolder 1"/>
+          <p:cNvPr id="36" name="PlaceHolder 1"/>
           <p:cNvSpPr>
             <a:spLocks noGrp="1"/>
           </p:cNvSpPr>
@@ -2567,7 +2541,7 @@
         <p:spPr>
           <a:xfrm>
             <a:off x="504000" y="301320"/>
-            <a:ext cx="9071280" cy="1261800"/>
+            <a:ext cx="9072000" cy="1261800"/>
           </a:xfrm>
           <a:prstGeom prst="rect">
             <a:avLst/>
@@ -2577,13 +2551,19 @@
           <a:bodyPr lIns="0" rIns="0" tIns="0" bIns="0" anchor="ctr"/>
           <a:p>
             <a:pPr algn="ctr"/>
-            <a:endParaRPr/>
-          </a:p>
-        </p:txBody>
-      </p:sp>
-      <p:sp>
-        <p:nvSpPr>
-          <p:cNvPr id="38" name="PlaceHolder 2"/>
+            <a:r>
+              <a:rPr lang="en-AU" sz="4400">
+                <a:latin typeface="Arial"/>
+              </a:rPr>
+              <a:t>Click to edit the title text format</a:t>
+            </a:r>
+            <a:endParaRPr/>
+          </a:p>
+        </p:txBody>
+      </p:sp>
+      <p:sp>
+        <p:nvSpPr>
+          <p:cNvPr id="37" name="PlaceHolder 2"/>
           <p:cNvSpPr>
             <a:spLocks noGrp="1"/>
           </p:cNvSpPr>
@@ -2593,8 +2573,8 @@
         </p:nvSpPr>
         <p:spPr>
           <a:xfrm>
-            <a:off x="504000" y="1769040"/>
-            <a:ext cx="9071280" cy="4384080"/>
+            <a:off x="504000" y="1768680"/>
+            <a:ext cx="9072000" cy="4384080"/>
           </a:xfrm>
           <a:prstGeom prst="rect">
             <a:avLst/>
@@ -2609,7 +2589,7 @@
               <a:buChar char=""/>
             </a:pPr>
             <a:r>
-              <a:rPr lang="en-AU">
+              <a:rPr lang="en-AU" sz="3200">
                 <a:latin typeface="Arial"/>
               </a:rPr>
               <a:t>Click to edit the outline text format</a:t>
@@ -2623,7 +2603,7 @@
               <a:buChar char=""/>
             </a:pPr>
             <a:r>
-              <a:rPr lang="en-AU">
+              <a:rPr lang="en-AU" sz="2800">
                 <a:latin typeface="Arial"/>
               </a:rPr>
               <a:t>Second Outline Level</a:t>
@@ -2637,7 +2617,7 @@
               <a:buChar char=""/>
             </a:pPr>
             <a:r>
-              <a:rPr lang="en-AU">
+              <a:rPr lang="en-AU" sz="2400">
                 <a:latin typeface="Arial"/>
               </a:rPr>
               <a:t>Third Outline Level</a:t>
@@ -2651,7 +2631,7 @@
               <a:buChar char=""/>
             </a:pPr>
             <a:r>
-              <a:rPr lang="en-AU">
+              <a:rPr lang="en-AU" sz="2000">
                 <a:latin typeface="Arial"/>
               </a:rPr>
               <a:t>Fourth Outline Level</a:t>
@@ -2665,7 +2645,7 @@
               <a:buChar char=""/>
             </a:pPr>
             <a:r>
-              <a:rPr lang="en-AU">
+              <a:rPr lang="en-AU" sz="2000">
                 <a:latin typeface="Arial"/>
               </a:rPr>
               <a:t>Fifth Outline Level</a:t>
@@ -2679,7 +2659,7 @@
               <a:buChar char=""/>
             </a:pPr>
             <a:r>
-              <a:rPr lang="en-AU">
+              <a:rPr lang="en-AU" sz="2000">
                 <a:latin typeface="Arial"/>
               </a:rPr>
               <a:t>Sixth Outline Level</a:t>
@@ -2693,7 +2673,7 @@
               <a:buChar char=""/>
             </a:pPr>
             <a:r>
-              <a:rPr lang="en-AU">
+              <a:rPr lang="en-AU" sz="2000">
                 <a:latin typeface="Arial"/>
               </a:rPr>
               <a:t>Seventh Outline Level</a:t>
@@ -2741,14 +2721,14 @@
       </p:grpSpPr>
       <p:sp>
         <p:nvSpPr>
-          <p:cNvPr id="73" name="CustomShape 1"/>
+          <p:cNvPr id="72" name="CustomShape 1"/>
           <p:cNvSpPr/>
           <p:nvPr/>
         </p:nvSpPr>
         <p:spPr>
           <a:xfrm>
             <a:off x="504000" y="301320"/>
-            <a:ext cx="9071280" cy="1261800"/>
+            <a:ext cx="9070920" cy="1261440"/>
           </a:xfrm>
           <a:prstGeom prst="rect">
             <a:avLst/>
@@ -2774,9 +2754,13 @@
             </a:pPr>
             <a:r>
               <a:rPr lang="en-AU" sz="4400" strike="noStrike">
+                <a:solidFill>
+                  <a:srgbClr val="000000"/>
+                </a:solidFill>
                 <a:latin typeface="Arial"/>
+                <a:ea typeface="DejaVu Sans"/>
               </a:rPr>
-              <a:t>Anna's ssh command</a:t>
+              <a:t>OSX: Install X11</a:t>
             </a:r>
             <a:endParaRPr/>
           </a:p>
@@ -2784,14 +2768,14 @@
       </p:sp>
       <p:sp>
         <p:nvSpPr>
-          <p:cNvPr id="74" name="CustomShape 2"/>
+          <p:cNvPr id="73" name="CustomShape 2"/>
           <p:cNvSpPr/>
           <p:nvPr/>
         </p:nvSpPr>
         <p:spPr>
           <a:xfrm>
             <a:off x="504000" y="1769040"/>
-            <a:ext cx="9071280" cy="4384080"/>
+            <a:ext cx="9070920" cy="4383720"/>
           </a:xfrm>
           <a:prstGeom prst="rect">
             <a:avLst/>
@@ -2809,6 +2793,42 @@
         </p:style>
         <p:txBody>
           <a:bodyPr lIns="0" rIns="0" tIns="0" bIns="0" anchor="ctr"/>
+          <a:p>
+            <a:pPr algn="ctr">
+              <a:lnSpc>
+                <a:spcPct val="100000"/>
+              </a:lnSpc>
+            </a:pPr>
+            <a:r>
+              <a:rPr i="1" lang="en-AU" sz="2400" strike="noStrike">
+                <a:solidFill>
+                  <a:srgbClr val="3333ff"/>
+                </a:solidFill>
+                <a:latin typeface="Menlo"/>
+                <a:ea typeface="Menlo"/>
+              </a:rPr>
+              <a:t>https://support.apple.com/downloads/X11_for_Mac_OS_X_1_0</a:t>
+            </a:r>
+            <a:r>
+              <a:rPr i="1" lang="en-AU" sz="2400" strike="noStrike">
+                <a:solidFill>
+                  <a:srgbClr val="808080"/>
+                </a:solidFill>
+                <a:latin typeface="Menlo"/>
+                <a:ea typeface="Menlo"/>
+              </a:rPr>
+              <a:t> </a:t>
+            </a:r>
+            <a:endParaRPr/>
+          </a:p>
+          <a:p>
+            <a:pPr algn="ctr">
+              <a:lnSpc>
+                <a:spcPct val="100000"/>
+              </a:lnSpc>
+            </a:pPr>
+            <a:endParaRPr/>
+          </a:p>
           <a:p>
             <a:pPr algn="ctr">
               <a:lnSpc>
@@ -2823,7 +2843,33 @@
                 <a:latin typeface="Menlo"/>
                 <a:ea typeface="Menlo"/>
               </a:rPr>
-              <a:t>ssh -i key.pem -Y ubuntu@115.146.84.207</a:t>
+              <a:t>Or</a:t>
+            </a:r>
+            <a:endParaRPr/>
+          </a:p>
+          <a:p>
+            <a:pPr algn="ctr">
+              <a:lnSpc>
+                <a:spcPct val="100000"/>
+              </a:lnSpc>
+            </a:pPr>
+            <a:endParaRPr/>
+          </a:p>
+          <a:p>
+            <a:pPr algn="ctr">
+              <a:lnSpc>
+                <a:spcPct val="100000"/>
+              </a:lnSpc>
+            </a:pPr>
+            <a:r>
+              <a:rPr i="1" lang="en-AU" sz="2400" strike="noStrike">
+                <a:solidFill>
+                  <a:srgbClr val="3333ff"/>
+                </a:solidFill>
+                <a:latin typeface="Menlo"/>
+                <a:ea typeface="Menlo"/>
+              </a:rPr>
+              <a:t>http://tinyurl.com/noqfbto</a:t>
             </a:r>
             <a:endParaRPr/>
           </a:p>
@@ -2880,14 +2926,14 @@
       </p:grpSpPr>
       <p:sp>
         <p:nvSpPr>
-          <p:cNvPr id="75" name="CustomShape 1"/>
+          <p:cNvPr id="74" name="CustomShape 1"/>
           <p:cNvSpPr/>
           <p:nvPr/>
         </p:nvSpPr>
         <p:spPr>
           <a:xfrm>
             <a:off x="504000" y="301320"/>
-            <a:ext cx="9071280" cy="1261800"/>
+            <a:ext cx="9070920" cy="1261440"/>
           </a:xfrm>
           <a:prstGeom prst="rect">
             <a:avLst/>
@@ -2906,11 +2952,20 @@
         <p:txBody>
           <a:bodyPr lIns="0" rIns="0" tIns="0" bIns="0" anchor="ctr"/>
           <a:p>
+            <a:pPr algn="ctr">
+              <a:lnSpc>
+                <a:spcPct val="100000"/>
+              </a:lnSpc>
+            </a:pPr>
             <a:r>
               <a:rPr lang="en-AU" sz="4400" strike="noStrike">
+                <a:solidFill>
+                  <a:srgbClr val="000000"/>
+                </a:solidFill>
                 <a:latin typeface="Arial"/>
+                <a:ea typeface="DejaVu Sans"/>
               </a:rPr>
-              <a:t>Question 1</a:t>
+              <a:t>Anna's ssh command</a:t>
             </a:r>
             <a:endParaRPr/>
           </a:p>
@@ -2918,14 +2973,14 @@
       </p:sp>
       <p:sp>
         <p:nvSpPr>
-          <p:cNvPr id="76" name="CustomShape 2"/>
+          <p:cNvPr id="75" name="CustomShape 2"/>
           <p:cNvSpPr/>
           <p:nvPr/>
         </p:nvSpPr>
         <p:spPr>
           <a:xfrm>
             <a:off x="504000" y="1769040"/>
-            <a:ext cx="9071280" cy="4384080"/>
+            <a:ext cx="9070920" cy="4383720"/>
           </a:xfrm>
           <a:prstGeom prst="rect">
             <a:avLst/>
@@ -2942,126 +2997,7 @@
           <a:fontRef idx="minor"/>
         </p:style>
         <p:txBody>
-          <a:bodyPr lIns="0" rIns="0" tIns="0" bIns="0"/>
-          <a:p>
-            <a:r>
-              <a:rPr lang="en-AU" sz="3200" strike="noStrike">
-                <a:latin typeface="Arial"/>
-              </a:rPr>
-              <a:t>Using the 'man' command, what is the -Y flag adding to the ssh command?</a:t>
-            </a:r>
-            <a:endParaRPr/>
-          </a:p>
-          <a:p>
-            <a:pPr>
-              <a:lnSpc>
-                <a:spcPct val="100000"/>
-              </a:lnSpc>
-              <a:buFont typeface="StarSymbol"/>
-              <a:buAutoNum type="alphaUcParenR"/>
-            </a:pPr>
-            <a:r>
-              <a:rPr lang="en-AU" sz="3200" strike="noStrike">
-                <a:latin typeface="Arial"/>
-              </a:rPr>
-              <a:t> </a:t>
-            </a:r>
-            <a:r>
-              <a:rPr lang="en-AU" sz="3200" strike="noStrike">
-                <a:latin typeface="Arial"/>
-              </a:rPr>
-              <a:t>Forces ssh into loud mode</a:t>
-            </a:r>
-            <a:endParaRPr/>
-          </a:p>
-          <a:p>
-            <a:pPr>
-              <a:lnSpc>
-                <a:spcPct val="100000"/>
-              </a:lnSpc>
-              <a:buFont typeface="StarSymbol"/>
-              <a:buAutoNum type="alphaUcParenR"/>
-            </a:pPr>
-            <a:r>
-              <a:rPr lang="en-AU" sz="3200" strike="noStrike">
-                <a:latin typeface="Arial"/>
-              </a:rPr>
-              <a:t> </a:t>
-            </a:r>
-            <a:r>
-              <a:rPr lang="en-AU" sz="3200" strike="noStrike">
-                <a:latin typeface="Arial"/>
-              </a:rPr>
-              <a:t>Specifies the user to log in as on the remote machine</a:t>
-            </a:r>
-            <a:endParaRPr/>
-          </a:p>
-          <a:p>
-            <a:pPr>
-              <a:lnSpc>
-                <a:spcPct val="100000"/>
-              </a:lnSpc>
-              <a:buFont typeface="StarSymbol"/>
-              <a:buAutoNum type="alphaUcParenR"/>
-            </a:pPr>
-            <a:r>
-              <a:rPr lang="en-AU" sz="3200" strike="noStrike">
-                <a:latin typeface="Arial"/>
-              </a:rPr>
-              <a:t> </a:t>
-            </a:r>
-            <a:r>
-              <a:rPr lang="en-AU" sz="3200" strike="noStrike">
-                <a:latin typeface="Arial"/>
-              </a:rPr>
-              <a:t>Enables trusted X11 forwarding</a:t>
-            </a:r>
-            <a:endParaRPr/>
-          </a:p>
-          <a:p>
-            <a:pPr>
-              <a:lnSpc>
-                <a:spcPct val="100000"/>
-              </a:lnSpc>
-              <a:buFont typeface="StarSymbol"/>
-              <a:buAutoNum type="alphaUcParenR"/>
-            </a:pPr>
-            <a:r>
-              <a:rPr lang="en-AU" sz="3200" strike="noStrike">
-                <a:latin typeface="Arial"/>
-              </a:rPr>
-              <a:t> </a:t>
-            </a:r>
-            <a:r>
-              <a:rPr lang="en-AU" sz="3200" strike="noStrike">
-                <a:latin typeface="Arial"/>
-              </a:rPr>
-              <a:t>Asks ssh to display the version number and exit</a:t>
-            </a:r>
-            <a:endParaRPr/>
-          </a:p>
-          <a:p>
-            <a:pPr>
-              <a:lnSpc>
-                <a:spcPct val="100000"/>
-              </a:lnSpc>
-              <a:buFont typeface="StarSymbol"/>
-              <a:buAutoNum type="alphaUcParenR"/>
-            </a:pPr>
-            <a:r>
-              <a:rPr lang="en-AU" sz="3200" strike="noStrike">
-                <a:latin typeface="Arial"/>
-              </a:rPr>
-              <a:t> </a:t>
-            </a:r>
-            <a:r>
-              <a:rPr lang="en-AU" sz="3200" strike="noStrike">
-                <a:latin typeface="Arial"/>
-              </a:rPr>
-              <a:t>Forces ssh into quiet mode</a:t>
-            </a:r>
-            <a:endParaRPr/>
-          </a:p>
+          <a:bodyPr lIns="0" rIns="0" tIns="0" bIns="0" anchor="ctr"/>
           <a:p>
             <a:pPr algn="ctr">
               <a:lnSpc>
@@ -3069,10 +3005,14 @@
               </a:lnSpc>
             </a:pPr>
             <a:r>
-              <a:rPr lang="en-AU" sz="3200" strike="noStrike">
-                <a:latin typeface="Arial"/>
+              <a:rPr i="1" lang="en-AU" sz="2400" strike="noStrike">
+                <a:solidFill>
+                  <a:srgbClr val="808080"/>
+                </a:solidFill>
+                <a:latin typeface="Menlo"/>
+                <a:ea typeface="Menlo"/>
               </a:rPr>
-              <a:t>?</a:t>
+              <a:t>ssh -i key.pem -Y ubuntu@115.146.84.207</a:t>
             </a:r>
             <a:endParaRPr/>
           </a:p>
@@ -3129,14 +3069,14 @@
       </p:grpSpPr>
       <p:sp>
         <p:nvSpPr>
-          <p:cNvPr id="77" name="CustomShape 1"/>
+          <p:cNvPr id="76" name="CustomShape 1"/>
           <p:cNvSpPr/>
           <p:nvPr/>
         </p:nvSpPr>
         <p:spPr>
           <a:xfrm>
             <a:off x="504000" y="301320"/>
-            <a:ext cx="9071280" cy="1261800"/>
+            <a:ext cx="9070920" cy="1261440"/>
           </a:xfrm>
           <a:prstGeom prst="rect">
             <a:avLst/>
@@ -3155,63 +3095,225 @@
         <p:txBody>
           <a:bodyPr lIns="0" rIns="0" tIns="0" bIns="0" anchor="ctr"/>
           <a:p>
+            <a:r>
+              <a:rPr lang="en-AU" sz="4400" strike="noStrike">
+                <a:solidFill>
+                  <a:srgbClr val="000000"/>
+                </a:solidFill>
+                <a:latin typeface="Arial"/>
+                <a:ea typeface="DejaVu Sans"/>
+              </a:rPr>
+              <a:t>Question 1</a:t>
+            </a:r>
+            <a:endParaRPr/>
+          </a:p>
+        </p:txBody>
+      </p:sp>
+      <p:sp>
+        <p:nvSpPr>
+          <p:cNvPr id="77" name="CustomShape 2"/>
+          <p:cNvSpPr/>
+          <p:nvPr/>
+        </p:nvSpPr>
+        <p:spPr>
+          <a:xfrm>
+            <a:off x="504000" y="1769040"/>
+            <a:ext cx="9070920" cy="4383720"/>
+          </a:xfrm>
+          <a:prstGeom prst="rect">
+            <a:avLst/>
+          </a:prstGeom>
+          <a:noFill/>
+          <a:ln>
+            <a:noFill/>
+          </a:ln>
+        </p:spPr>
+        <p:style>
+          <a:lnRef idx="0"/>
+          <a:fillRef idx="0"/>
+          <a:effectRef idx="0"/>
+          <a:fontRef idx="minor"/>
+        </p:style>
+        <p:txBody>
+          <a:bodyPr lIns="0" rIns="0" tIns="0" bIns="0"/>
+          <a:p>
+            <a:r>
+              <a:rPr lang="en-AU" sz="3200" strike="noStrike">
+                <a:solidFill>
+                  <a:srgbClr val="000000"/>
+                </a:solidFill>
+                <a:latin typeface="Arial"/>
+                <a:ea typeface="DejaVu Sans"/>
+              </a:rPr>
+              <a:t>Using the 'man' command, what is the -Y flag adding to the ssh command?</a:t>
+            </a:r>
+            <a:endParaRPr/>
+          </a:p>
+          <a:p>
+            <a:pPr>
+              <a:lnSpc>
+                <a:spcPct val="100000"/>
+              </a:lnSpc>
+              <a:buFont typeface="StarSymbol"/>
+              <a:buAutoNum type="alphaUcParenR"/>
+            </a:pPr>
+            <a:r>
+              <a:rPr lang="en-AU" sz="3200" strike="noStrike">
+                <a:solidFill>
+                  <a:srgbClr val="000000"/>
+                </a:solidFill>
+                <a:latin typeface="Arial"/>
+                <a:ea typeface="DejaVu Sans"/>
+              </a:rPr>
+              <a:t> </a:t>
+            </a:r>
+            <a:r>
+              <a:rPr lang="en-AU" sz="3200" strike="noStrike">
+                <a:solidFill>
+                  <a:srgbClr val="000000"/>
+                </a:solidFill>
+                <a:latin typeface="Arial"/>
+                <a:ea typeface="DejaVu Sans"/>
+              </a:rPr>
+              <a:t>Forces ssh into loud mode</a:t>
+            </a:r>
+            <a:endParaRPr/>
+          </a:p>
+          <a:p>
+            <a:pPr>
+              <a:lnSpc>
+                <a:spcPct val="100000"/>
+              </a:lnSpc>
+              <a:buFont typeface="StarSymbol"/>
+              <a:buAutoNum type="alphaUcParenR"/>
+            </a:pPr>
+            <a:r>
+              <a:rPr lang="en-AU" sz="3200" strike="noStrike">
+                <a:solidFill>
+                  <a:srgbClr val="000000"/>
+                </a:solidFill>
+                <a:latin typeface="Arial"/>
+                <a:ea typeface="DejaVu Sans"/>
+              </a:rPr>
+              <a:t> </a:t>
+            </a:r>
+            <a:r>
+              <a:rPr lang="en-AU" sz="3200" strike="noStrike">
+                <a:solidFill>
+                  <a:srgbClr val="000000"/>
+                </a:solidFill>
+                <a:latin typeface="Arial"/>
+                <a:ea typeface="DejaVu Sans"/>
+              </a:rPr>
+              <a:t>Specifies the user to log in as on the remote machine</a:t>
+            </a:r>
+            <a:endParaRPr/>
+          </a:p>
+          <a:p>
+            <a:pPr>
+              <a:lnSpc>
+                <a:spcPct val="100000"/>
+              </a:lnSpc>
+              <a:buFont typeface="StarSymbol"/>
+              <a:buAutoNum type="alphaUcParenR"/>
+            </a:pPr>
+            <a:r>
+              <a:rPr lang="en-AU" sz="3200" strike="noStrike">
+                <a:solidFill>
+                  <a:srgbClr val="000000"/>
+                </a:solidFill>
+                <a:latin typeface="Arial"/>
+                <a:ea typeface="DejaVu Sans"/>
+              </a:rPr>
+              <a:t> </a:t>
+            </a:r>
+            <a:r>
+              <a:rPr lang="en-AU" sz="3200" strike="noStrike">
+                <a:solidFill>
+                  <a:srgbClr val="000000"/>
+                </a:solidFill>
+                <a:latin typeface="Arial"/>
+                <a:ea typeface="DejaVu Sans"/>
+              </a:rPr>
+              <a:t>Enables trusted X11 forwarding</a:t>
+            </a:r>
+            <a:endParaRPr/>
+          </a:p>
+          <a:p>
+            <a:pPr>
+              <a:lnSpc>
+                <a:spcPct val="100000"/>
+              </a:lnSpc>
+              <a:buFont typeface="StarSymbol"/>
+              <a:buAutoNum type="alphaUcParenR"/>
+            </a:pPr>
+            <a:r>
+              <a:rPr lang="en-AU" sz="3200" strike="noStrike">
+                <a:solidFill>
+                  <a:srgbClr val="000000"/>
+                </a:solidFill>
+                <a:latin typeface="Arial"/>
+                <a:ea typeface="DejaVu Sans"/>
+              </a:rPr>
+              <a:t> </a:t>
+            </a:r>
+            <a:r>
+              <a:rPr lang="en-AU" sz="3200" strike="noStrike">
+                <a:solidFill>
+                  <a:srgbClr val="000000"/>
+                </a:solidFill>
+                <a:latin typeface="Arial"/>
+                <a:ea typeface="DejaVu Sans"/>
+              </a:rPr>
+              <a:t>Asks ssh to display the version number and exit</a:t>
+            </a:r>
+            <a:endParaRPr/>
+          </a:p>
+          <a:p>
+            <a:pPr>
+              <a:lnSpc>
+                <a:spcPct val="100000"/>
+              </a:lnSpc>
+              <a:buFont typeface="StarSymbol"/>
+              <a:buAutoNum type="alphaUcParenR"/>
+            </a:pPr>
+            <a:r>
+              <a:rPr lang="en-AU" sz="3200" strike="noStrike">
+                <a:solidFill>
+                  <a:srgbClr val="000000"/>
+                </a:solidFill>
+                <a:latin typeface="Arial"/>
+                <a:ea typeface="DejaVu Sans"/>
+              </a:rPr>
+              <a:t> </a:t>
+            </a:r>
+            <a:r>
+              <a:rPr lang="en-AU" sz="3200" strike="noStrike">
+                <a:solidFill>
+                  <a:srgbClr val="000000"/>
+                </a:solidFill>
+                <a:latin typeface="Arial"/>
+                <a:ea typeface="DejaVu Sans"/>
+              </a:rPr>
+              <a:t>Forces ssh into quiet mode</a:t>
+            </a:r>
+            <a:endParaRPr/>
+          </a:p>
+          <a:p>
             <a:pPr algn="ctr">
               <a:lnSpc>
                 <a:spcPct val="100000"/>
               </a:lnSpc>
             </a:pPr>
             <a:r>
-              <a:rPr lang="en-AU" sz="4400" strike="noStrike">
+              <a:rPr lang="en-AU" sz="3200" strike="noStrike">
+                <a:solidFill>
+                  <a:srgbClr val="000000"/>
+                </a:solidFill>
                 <a:latin typeface="Arial"/>
+                <a:ea typeface="DejaVu Sans"/>
               </a:rPr>
-              <a:t>Exercise 1</a:t>
-            </a:r>
-            <a:endParaRPr/>
-          </a:p>
-        </p:txBody>
-      </p:sp>
-      <p:sp>
-        <p:nvSpPr>
-          <p:cNvPr id="78" name="CustomShape 2"/>
-          <p:cNvSpPr/>
-          <p:nvPr/>
-        </p:nvSpPr>
-        <p:spPr>
-          <a:xfrm>
-            <a:off x="504000" y="1769040"/>
-            <a:ext cx="9071280" cy="4384080"/>
-          </a:xfrm>
-          <a:prstGeom prst="rect">
-            <a:avLst/>
-          </a:prstGeom>
-          <a:noFill/>
-          <a:ln>
-            <a:noFill/>
-          </a:ln>
-        </p:spPr>
-        <p:style>
-          <a:lnRef idx="0"/>
-          <a:fillRef idx="0"/>
-          <a:effectRef idx="0"/>
-          <a:fontRef idx="minor"/>
-        </p:style>
-        <p:txBody>
-          <a:bodyPr lIns="0" rIns="0" tIns="0" bIns="0" anchor="ctr"/>
-          <a:p>
-            <a:pPr algn="ctr">
-              <a:lnSpc>
-                <a:spcPct val="100000"/>
-              </a:lnSpc>
-            </a:pPr>
-            <a:r>
-              <a:rPr i="1" lang="en-AU" sz="2400" strike="noStrike">
-                <a:solidFill>
-                  <a:srgbClr val="808080"/>
-                </a:solidFill>
-                <a:latin typeface="Menlo"/>
-                <a:ea typeface="Menlo"/>
-              </a:rPr>
-              <a:t>sudo apt-get install firefox</a:t>
+              <a:t>?</a:t>
             </a:r>
             <a:endParaRPr/>
           </a:p>
@@ -3268,14 +3370,14 @@
       </p:grpSpPr>
       <p:sp>
         <p:nvSpPr>
-          <p:cNvPr id="79" name="CustomShape 1"/>
+          <p:cNvPr id="78" name="CustomShape 1"/>
           <p:cNvSpPr/>
           <p:nvPr/>
         </p:nvSpPr>
         <p:spPr>
           <a:xfrm>
             <a:off x="504000" y="301320"/>
-            <a:ext cx="9071280" cy="1261800"/>
+            <a:ext cx="9070920" cy="1261440"/>
           </a:xfrm>
           <a:prstGeom prst="rect">
             <a:avLst/>
@@ -3301,9 +3403,13 @@
             </a:pPr>
             <a:r>
               <a:rPr lang="en-AU" sz="4400" strike="noStrike">
+                <a:solidFill>
+                  <a:srgbClr val="000000"/>
+                </a:solidFill>
                 <a:latin typeface="Arial"/>
+                <a:ea typeface="DejaVu Sans"/>
               </a:rPr>
-              <a:t>Exercise 2</a:t>
+              <a:t>Exercise 1</a:t>
             </a:r>
             <a:endParaRPr/>
           </a:p>
@@ -3311,14 +3417,14 @@
       </p:sp>
       <p:sp>
         <p:nvSpPr>
-          <p:cNvPr id="80" name="CustomShape 2"/>
+          <p:cNvPr id="79" name="CustomShape 2"/>
           <p:cNvSpPr/>
           <p:nvPr/>
         </p:nvSpPr>
         <p:spPr>
           <a:xfrm>
             <a:off x="504000" y="1769040"/>
-            <a:ext cx="9071280" cy="4384080"/>
+            <a:ext cx="9070920" cy="4383720"/>
           </a:xfrm>
           <a:prstGeom prst="rect">
             <a:avLst/>
@@ -3350,33 +3456,7 @@
                 <a:latin typeface="Menlo"/>
                 <a:ea typeface="Menlo"/>
               </a:rPr>
-              <a:t>sudo apt-get install gedit</a:t>
-            </a:r>
-            <a:endParaRPr/>
-          </a:p>
-          <a:p>
-            <a:pPr algn="ctr">
-              <a:lnSpc>
-                <a:spcPct val="100000"/>
-              </a:lnSpc>
-            </a:pPr>
-            <a:endParaRPr/>
-          </a:p>
-          <a:p>
-            <a:pPr algn="ctr">
-              <a:lnSpc>
-                <a:spcPct val="100000"/>
-              </a:lnSpc>
-            </a:pPr>
-            <a:r>
-              <a:rPr i="1" lang="en-AU" sz="2400" strike="noStrike">
-                <a:solidFill>
-                  <a:srgbClr val="808080"/>
-                </a:solidFill>
-                <a:latin typeface="Menlo"/>
-                <a:ea typeface="Menlo"/>
-              </a:rPr>
-              <a:t>gedit today.txt</a:t>
+              <a:t>sudo apt-get install firefox</a:t>
             </a:r>
             <a:endParaRPr/>
           </a:p>
@@ -3433,14 +3513,14 @@
       </p:grpSpPr>
       <p:sp>
         <p:nvSpPr>
-          <p:cNvPr id="81" name="CustomShape 1"/>
+          <p:cNvPr id="80" name="CustomShape 1"/>
           <p:cNvSpPr/>
           <p:nvPr/>
         </p:nvSpPr>
         <p:spPr>
           <a:xfrm>
             <a:off x="504000" y="301320"/>
-            <a:ext cx="9071280" cy="1261800"/>
+            <a:ext cx="9070920" cy="1261440"/>
           </a:xfrm>
           <a:prstGeom prst="rect">
             <a:avLst/>
@@ -3466,7 +3546,180 @@
             </a:pPr>
             <a:r>
               <a:rPr lang="en-AU" sz="4400" strike="noStrike">
+                <a:solidFill>
+                  <a:srgbClr val="000000"/>
+                </a:solidFill>
                 <a:latin typeface="Arial"/>
+                <a:ea typeface="DejaVu Sans"/>
+              </a:rPr>
+              <a:t>Exercise 2</a:t>
+            </a:r>
+            <a:endParaRPr/>
+          </a:p>
+        </p:txBody>
+      </p:sp>
+      <p:sp>
+        <p:nvSpPr>
+          <p:cNvPr id="81" name="CustomShape 2"/>
+          <p:cNvSpPr/>
+          <p:nvPr/>
+        </p:nvSpPr>
+        <p:spPr>
+          <a:xfrm>
+            <a:off x="504000" y="1769040"/>
+            <a:ext cx="9070920" cy="4383720"/>
+          </a:xfrm>
+          <a:prstGeom prst="rect">
+            <a:avLst/>
+          </a:prstGeom>
+          <a:noFill/>
+          <a:ln>
+            <a:noFill/>
+          </a:ln>
+        </p:spPr>
+        <p:style>
+          <a:lnRef idx="0"/>
+          <a:fillRef idx="0"/>
+          <a:effectRef idx="0"/>
+          <a:fontRef idx="minor"/>
+        </p:style>
+        <p:txBody>
+          <a:bodyPr lIns="0" rIns="0" tIns="0" bIns="0" anchor="ctr"/>
+          <a:p>
+            <a:pPr algn="ctr">
+              <a:lnSpc>
+                <a:spcPct val="100000"/>
+              </a:lnSpc>
+            </a:pPr>
+            <a:r>
+              <a:rPr i="1" lang="en-AU" sz="2400" strike="noStrike">
+                <a:solidFill>
+                  <a:srgbClr val="808080"/>
+                </a:solidFill>
+                <a:latin typeface="Menlo"/>
+                <a:ea typeface="Menlo"/>
+              </a:rPr>
+              <a:t>sudo apt-get install gedit</a:t>
+            </a:r>
+            <a:endParaRPr/>
+          </a:p>
+          <a:p>
+            <a:pPr algn="ctr">
+              <a:lnSpc>
+                <a:spcPct val="100000"/>
+              </a:lnSpc>
+            </a:pPr>
+            <a:endParaRPr/>
+          </a:p>
+          <a:p>
+            <a:pPr algn="ctr">
+              <a:lnSpc>
+                <a:spcPct val="100000"/>
+              </a:lnSpc>
+            </a:pPr>
+            <a:r>
+              <a:rPr i="1" lang="en-AU" sz="2400" strike="noStrike">
+                <a:solidFill>
+                  <a:srgbClr val="808080"/>
+                </a:solidFill>
+                <a:latin typeface="Menlo"/>
+                <a:ea typeface="Menlo"/>
+              </a:rPr>
+              <a:t>gedit today.txt</a:t>
+            </a:r>
+            <a:endParaRPr/>
+          </a:p>
+        </p:txBody>
+      </p:sp>
+    </p:spTree>
+  </p:cSld>
+  <p:timing>
+    <p:tnLst>
+      <p:par>
+        <p:cTn id="9" dur="indefinite" restart="never" nodeType="tmRoot">
+          <p:childTnLst>
+            <p:seq>
+              <p:cTn id="10" nodeType="mainSeq"/>
+              <p:prevCondLst>
+                <p:cond delay="0" evt="onPrev">
+                  <p:tgtEl>
+                    <p:sldTgt/>
+                  </p:tgtEl>
+                </p:cond>
+              </p:prevCondLst>
+              <p:nextCondLst>
+                <p:cond delay="0" evt="onNext">
+                  <p:tgtEl>
+                    <p:sldTgt/>
+                  </p:tgtEl>
+                </p:cond>
+              </p:nextCondLst>
+            </p:seq>
+          </p:childTnLst>
+        </p:cTn>
+      </p:par>
+    </p:tnLst>
+  </p:timing>
+</p:sld>
+</file>
+
+<file path=ppt/slides/slide6.xml><?xml version="1.0" encoding="utf-8"?>
+<p:sld xmlns:a="http://schemas.openxmlformats.org/drawingml/2006/main" xmlns:p="http://schemas.openxmlformats.org/presentationml/2006/main" xmlns:r="http://schemas.openxmlformats.org/officeDocument/2006/relationships">
+  <p:cSld>
+    <p:spTree>
+      <p:nvGrpSpPr>
+        <p:cNvPr id="1" name=""/>
+        <p:cNvGrpSpPr/>
+        <p:nvPr/>
+      </p:nvGrpSpPr>
+      <p:grpSpPr>
+        <a:xfrm>
+          <a:off x="0" y="0"/>
+          <a:ext cx="0" cy="0"/>
+          <a:chOff x="0" y="0"/>
+          <a:chExt cx="0" cy="0"/>
+        </a:xfrm>
+      </p:grpSpPr>
+      <p:sp>
+        <p:nvSpPr>
+          <p:cNvPr id="82" name="CustomShape 1"/>
+          <p:cNvSpPr/>
+          <p:nvPr/>
+        </p:nvSpPr>
+        <p:spPr>
+          <a:xfrm>
+            <a:off x="504000" y="301320"/>
+            <a:ext cx="9070920" cy="1261440"/>
+          </a:xfrm>
+          <a:prstGeom prst="rect">
+            <a:avLst/>
+          </a:prstGeom>
+          <a:noFill/>
+          <a:ln>
+            <a:noFill/>
+          </a:ln>
+        </p:spPr>
+        <p:style>
+          <a:lnRef idx="0"/>
+          <a:fillRef idx="0"/>
+          <a:effectRef idx="0"/>
+          <a:fontRef idx="minor"/>
+        </p:style>
+        <p:txBody>
+          <a:bodyPr lIns="0" rIns="0" tIns="0" bIns="0" anchor="ctr"/>
+          <a:p>
+            <a:pPr algn="ctr">
+              <a:lnSpc>
+                <a:spcPct val="100000"/>
+              </a:lnSpc>
+            </a:pPr>
+            <a:r>
+              <a:rPr lang="en-AU" sz="4400" strike="noStrike">
+                <a:solidFill>
+                  <a:srgbClr val="000000"/>
+                </a:solidFill>
+                <a:latin typeface="Arial"/>
+                <a:ea typeface="DejaVu Sans"/>
               </a:rPr>
               <a:t>Exercise 3</a:t>
             </a:r>
@@ -3476,14 +3729,14 @@
       </p:sp>
       <p:sp>
         <p:nvSpPr>
-          <p:cNvPr id="82" name="CustomShape 2"/>
+          <p:cNvPr id="83" name="CustomShape 2"/>
           <p:cNvSpPr/>
           <p:nvPr/>
         </p:nvSpPr>
         <p:spPr>
           <a:xfrm>
             <a:off x="504000" y="1769040"/>
-            <a:ext cx="9071280" cy="4384080"/>
+            <a:ext cx="9070920" cy="4383720"/>
           </a:xfrm>
           <a:prstGeom prst="rect">
             <a:avLst/>
@@ -3526,10 +3779,10 @@
   <p:timing>
     <p:tnLst>
       <p:par>
-        <p:cTn id="9" dur="indefinite" restart="never" nodeType="tmRoot">
+        <p:cTn id="11" dur="indefinite" restart="never" nodeType="tmRoot">
           <p:childTnLst>
             <p:seq>
-              <p:cTn id="10" nodeType="mainSeq"/>
+              <p:cTn id="12" nodeType="mainSeq"/>
               <p:prevCondLst>
                 <p:cond delay="0" evt="onPrev">
                   <p:tgtEl>

</xml_diff>